<commit_message>
modified:   "Class 6 \345\207\275\346\225\270\343\200\201\351\201\236\350\277\264.pptx"
</commit_message>
<xml_diff>
--- a/Class 6 函數、遞迴.pptx
+++ b/Class 6 函數、遞迴.pptx
@@ -1,14 +1,55 @@
 
 <file path=ppt/presentation.xml><?xml version="1.0" encoding="utf-8"?>
-<p:presentation xmlns:a="http://schemas.openxmlformats.org/drawingml/2006/main" xmlns:r="http://schemas.openxmlformats.org/officeDocument/2006/relationships" xmlns:p="http://schemas.openxmlformats.org/presentationml/2006/main" saveSubsetFonts="1">
+<p:presentation xmlns:a="http://schemas.openxmlformats.org/drawingml/2006/main" xmlns:r="http://schemas.openxmlformats.org/officeDocument/2006/relationships" xmlns:p="http://schemas.openxmlformats.org/presentationml/2006/main" embedTrueTypeFonts="1" saveSubsetFonts="1">
   <p:sldMasterIdLst>
     <p:sldMasterId id="2147483660" r:id="rId1"/>
   </p:sldMasterIdLst>
   <p:sldIdLst>
     <p:sldId id="256" r:id="rId2"/>
+    <p:sldId id="258" r:id="rId3"/>
+    <p:sldId id="257" r:id="rId4"/>
+    <p:sldId id="259" r:id="rId5"/>
+    <p:sldId id="264" r:id="rId6"/>
+    <p:sldId id="266" r:id="rId7"/>
+    <p:sldId id="267" r:id="rId8"/>
+    <p:sldId id="289" r:id="rId9"/>
+    <p:sldId id="263" r:id="rId10"/>
+    <p:sldId id="268" r:id="rId11"/>
+    <p:sldId id="270" r:id="rId12"/>
+    <p:sldId id="269" r:id="rId13"/>
+    <p:sldId id="286" r:id="rId14"/>
+    <p:sldId id="284" r:id="rId15"/>
+    <p:sldId id="285" r:id="rId16"/>
+    <p:sldId id="288" r:id="rId17"/>
+    <p:sldId id="290" r:id="rId18"/>
+    <p:sldId id="291" r:id="rId19"/>
   </p:sldIdLst>
   <p:sldSz cx="12192000" cy="6858000"/>
   <p:notesSz cx="6858000" cy="9144000"/>
+  <p:embeddedFontLst>
+    <p:embeddedFont>
+      <p:font typeface="Calibri" panose="020F0502020204030204" pitchFamily="34" charset="0"/>
+      <p:regular r:id="rId20"/>
+      <p:bold r:id="rId21"/>
+      <p:italic r:id="rId22"/>
+      <p:boldItalic r:id="rId23"/>
+    </p:embeddedFont>
+    <p:embeddedFont>
+      <p:font typeface="Consolas" panose="020B0609020204030204" pitchFamily="49" charset="0"/>
+      <p:regular r:id="rId24"/>
+      <p:bold r:id="rId25"/>
+      <p:italic r:id="rId26"/>
+      <p:boldItalic r:id="rId27"/>
+    </p:embeddedFont>
+    <p:embeddedFont>
+      <p:font typeface="Wingdings 2" panose="05020102010507070707" pitchFamily="18" charset="2"/>
+      <p:regular r:id="rId28"/>
+    </p:embeddedFont>
+    <p:embeddedFont>
+      <p:font typeface="源流明體 SB" panose="02020600000000000000" pitchFamily="18" charset="-120"/>
+      <p:bold r:id="rId29"/>
+    </p:embeddedFont>
+  </p:embeddedFontLst>
   <p:defaultTextStyle>
     <a:defPPr>
       <a:defRPr lang="en-US"/>
@@ -104,6 +145,11 @@
       </a:defRPr>
     </a:lvl9pPr>
   </p:defaultTextStyle>
+  <p:extLst>
+    <p:ext uri="{EFAFB233-063F-42B5-8137-9DF3F51BA10A}">
+      <p15:sldGuideLst xmlns:p15="http://schemas.microsoft.com/office/powerpoint/2012/main"/>
+    </p:ext>
+  </p:extLst>
 </p:presentation>
 </file>
 
@@ -275,7 +321,7 @@
           <a:p>
             <a:fld id="{77A94614-F77C-4C1E-BECB-DA39A1BE2E75}" type="datetimeFigureOut">
               <a:rPr lang="zh-TW" altLang="en-US" smtClean="0"/>
-              <a:t>2022/10/18</a:t>
+              <a:t>2022/10/19</a:t>
             </a:fld>
             <a:endParaRPr lang="zh-TW" altLang="en-US"/>
           </a:p>
@@ -503,7 +549,7 @@
           <a:p>
             <a:fld id="{77A94614-F77C-4C1E-BECB-DA39A1BE2E75}" type="datetimeFigureOut">
               <a:rPr lang="zh-TW" altLang="en-US" smtClean="0"/>
-              <a:t>2022/10/18</a:t>
+              <a:t>2022/10/19</a:t>
             </a:fld>
             <a:endParaRPr lang="zh-TW" altLang="en-US"/>
           </a:p>
@@ -683,7 +729,7 @@
           <a:p>
             <a:fld id="{77A94614-F77C-4C1E-BECB-DA39A1BE2E75}" type="datetimeFigureOut">
               <a:rPr lang="zh-TW" altLang="en-US" smtClean="0"/>
-              <a:t>2022/10/18</a:t>
+              <a:t>2022/10/19</a:t>
             </a:fld>
             <a:endParaRPr lang="zh-TW" altLang="en-US"/>
           </a:p>
@@ -853,7 +899,7 @@
           <a:p>
             <a:fld id="{77A94614-F77C-4C1E-BECB-DA39A1BE2E75}" type="datetimeFigureOut">
               <a:rPr lang="zh-TW" altLang="en-US" smtClean="0"/>
-              <a:t>2022/10/18</a:t>
+              <a:t>2022/10/19</a:t>
             </a:fld>
             <a:endParaRPr lang="zh-TW" altLang="en-US"/>
           </a:p>
@@ -1107,7 +1153,7 @@
           <a:p>
             <a:fld id="{77A94614-F77C-4C1E-BECB-DA39A1BE2E75}" type="datetimeFigureOut">
               <a:rPr lang="zh-TW" altLang="en-US" smtClean="0"/>
-              <a:t>2022/10/18</a:t>
+              <a:t>2022/10/19</a:t>
             </a:fld>
             <a:endParaRPr lang="zh-TW" altLang="en-US"/>
           </a:p>
@@ -1433,7 +1479,7 @@
           <a:p>
             <a:fld id="{77A94614-F77C-4C1E-BECB-DA39A1BE2E75}" type="datetimeFigureOut">
               <a:rPr lang="zh-TW" altLang="en-US" smtClean="0"/>
-              <a:t>2022/10/18</a:t>
+              <a:t>2022/10/19</a:t>
             </a:fld>
             <a:endParaRPr lang="zh-TW" altLang="en-US"/>
           </a:p>
@@ -1884,7 +1930,7 @@
           <a:p>
             <a:fld id="{77A94614-F77C-4C1E-BECB-DA39A1BE2E75}" type="datetimeFigureOut">
               <a:rPr lang="zh-TW" altLang="en-US" smtClean="0"/>
-              <a:t>2022/10/18</a:t>
+              <a:t>2022/10/19</a:t>
             </a:fld>
             <a:endParaRPr lang="zh-TW" altLang="en-US"/>
           </a:p>
@@ -2002,7 +2048,7 @@
           <a:p>
             <a:fld id="{77A94614-F77C-4C1E-BECB-DA39A1BE2E75}" type="datetimeFigureOut">
               <a:rPr lang="zh-TW" altLang="en-US" smtClean="0"/>
-              <a:t>2022/10/18</a:t>
+              <a:t>2022/10/19</a:t>
             </a:fld>
             <a:endParaRPr lang="zh-TW" altLang="en-US"/>
           </a:p>
@@ -2097,7 +2143,7 @@
           <a:p>
             <a:fld id="{77A94614-F77C-4C1E-BECB-DA39A1BE2E75}" type="datetimeFigureOut">
               <a:rPr lang="zh-TW" altLang="en-US" smtClean="0"/>
-              <a:t>2022/10/18</a:t>
+              <a:t>2022/10/19</a:t>
             </a:fld>
             <a:endParaRPr lang="zh-TW" altLang="en-US"/>
           </a:p>
@@ -2384,7 +2430,7 @@
           <a:p>
             <a:fld id="{77A94614-F77C-4C1E-BECB-DA39A1BE2E75}" type="datetimeFigureOut">
               <a:rPr lang="zh-TW" altLang="en-US" smtClean="0"/>
-              <a:t>2022/10/18</a:t>
+              <a:t>2022/10/19</a:t>
             </a:fld>
             <a:endParaRPr lang="zh-TW" altLang="en-US"/>
           </a:p>
@@ -2706,7 +2752,7 @@
           <a:p>
             <a:fld id="{77A94614-F77C-4C1E-BECB-DA39A1BE2E75}" type="datetimeFigureOut">
               <a:rPr lang="zh-TW" altLang="en-US" smtClean="0"/>
-              <a:t>2022/10/18</a:t>
+              <a:t>2022/10/19</a:t>
             </a:fld>
             <a:endParaRPr lang="zh-TW" altLang="en-US"/>
           </a:p>
@@ -2960,7 +3006,7 @@
           <a:p>
             <a:fld id="{77A94614-F77C-4C1E-BECB-DA39A1BE2E75}" type="datetimeFigureOut">
               <a:rPr lang="zh-TW" altLang="en-US" smtClean="0"/>
-              <a:t>2022/10/18</a:t>
+              <a:t>2022/10/19</a:t>
             </a:fld>
             <a:endParaRPr lang="zh-TW" altLang="en-US"/>
           </a:p>
@@ -3526,6 +3572,4164 @@
 </p:sld>
 </file>
 
+<file path=ppt/slides/slide10.xml><?xml version="1.0" encoding="utf-8"?>
+<p:sld xmlns:a="http://schemas.openxmlformats.org/drawingml/2006/main" xmlns:r="http://schemas.openxmlformats.org/officeDocument/2006/relationships" xmlns:p="http://schemas.openxmlformats.org/presentationml/2006/main">
+  <p:cSld>
+    <p:spTree>
+      <p:nvGrpSpPr>
+        <p:cNvPr id="1" name=""/>
+        <p:cNvGrpSpPr/>
+        <p:nvPr/>
+      </p:nvGrpSpPr>
+      <p:grpSpPr>
+        <a:xfrm>
+          <a:off x="0" y="0"/>
+          <a:ext cx="0" cy="0"/>
+          <a:chOff x="0" y="0"/>
+          <a:chExt cx="0" cy="0"/>
+        </a:xfrm>
+      </p:grpSpPr>
+      <p:sp>
+        <p:nvSpPr>
+          <p:cNvPr id="2" name="標題 1">
+            <a:extLst>
+              <a:ext uri="{FF2B5EF4-FFF2-40B4-BE49-F238E27FC236}">
+                <a16:creationId xmlns:a16="http://schemas.microsoft.com/office/drawing/2014/main" id="{D67CC486-65C6-45EC-A620-6FFF267F0FE9}"/>
+              </a:ext>
+            </a:extLst>
+          </p:cNvPr>
+          <p:cNvSpPr>
+            <a:spLocks noGrp="1"/>
+          </p:cNvSpPr>
+          <p:nvPr>
+            <p:ph type="title"/>
+          </p:nvPr>
+        </p:nvSpPr>
+        <p:spPr/>
+        <p:txBody>
+          <a:bodyPr/>
+          <a:lstStyle/>
+          <a:p>
+            <a:r>
+              <a:rPr lang="zh-TW" altLang="en-US"/>
+              <a:t>公域、區域變數</a:t>
+            </a:r>
+          </a:p>
+        </p:txBody>
+      </p:sp>
+      <p:sp>
+        <p:nvSpPr>
+          <p:cNvPr id="3" name="內容版面配置區 2">
+            <a:extLst>
+              <a:ext uri="{FF2B5EF4-FFF2-40B4-BE49-F238E27FC236}">
+                <a16:creationId xmlns:a16="http://schemas.microsoft.com/office/drawing/2014/main" id="{C52078E6-48A3-4A4B-9486-13A53D3E3D77}"/>
+              </a:ext>
+            </a:extLst>
+          </p:cNvPr>
+          <p:cNvSpPr>
+            <a:spLocks noGrp="1"/>
+          </p:cNvSpPr>
+          <p:nvPr>
+            <p:ph idx="1"/>
+          </p:nvPr>
+        </p:nvSpPr>
+        <p:spPr/>
+        <p:txBody>
+          <a:bodyPr>
+            <a:normAutofit/>
+          </a:bodyPr>
+          <a:lstStyle/>
+          <a:p>
+            <a:pPr marL="0" indent="0">
+              <a:buNone/>
+            </a:pPr>
+            <a:r>
+              <a:rPr lang="pt-BR" altLang="zh-TW" sz="2400"/>
+              <a:t>num_pub = 0</a:t>
+            </a:r>
+          </a:p>
+          <a:p>
+            <a:pPr marL="0" indent="0">
+              <a:buNone/>
+            </a:pPr>
+            <a:r>
+              <a:rPr lang="pt-BR" altLang="zh-TW" sz="2400"/>
+              <a:t>def </a:t>
+            </a:r>
+            <a:r>
+              <a:rPr lang="pt-BR" altLang="zh-TW" sz="2400">
+                <a:solidFill>
+                  <a:srgbClr val="FF0000"/>
+                </a:solidFill>
+              </a:rPr>
+              <a:t>foo</a:t>
+            </a:r>
+            <a:r>
+              <a:rPr lang="pt-BR" altLang="zh-TW" sz="2400"/>
+              <a:t>() -&gt; None:</a:t>
+            </a:r>
+          </a:p>
+          <a:p>
+            <a:pPr marL="0" indent="0">
+              <a:buNone/>
+            </a:pPr>
+            <a:r>
+              <a:rPr lang="pt-BR" altLang="zh-TW" sz="2400"/>
+              <a:t>    </a:t>
+            </a:r>
+            <a:r>
+              <a:rPr lang="pt-BR" altLang="zh-TW" sz="2400">
+                <a:solidFill>
+                  <a:srgbClr val="FF0000"/>
+                </a:solidFill>
+              </a:rPr>
+              <a:t>global</a:t>
+            </a:r>
+            <a:r>
+              <a:rPr lang="pt-BR" altLang="zh-TW" sz="2400"/>
+              <a:t> num_pub </a:t>
+            </a:r>
+            <a:r>
+              <a:rPr lang="pt-BR" altLang="zh-TW" sz="2400">
+                <a:solidFill>
+                  <a:schemeClr val="bg1">
+                    <a:lumMod val="65000"/>
+                  </a:schemeClr>
+                </a:solidFill>
+              </a:rPr>
+              <a:t># </a:t>
+            </a:r>
+            <a:r>
+              <a:rPr lang="zh-TW" altLang="en-US" sz="2400">
+                <a:solidFill>
+                  <a:schemeClr val="bg1">
+                    <a:lumMod val="65000"/>
+                  </a:schemeClr>
+                </a:solidFill>
+              </a:rPr>
+              <a:t>使用公域變數 </a:t>
+            </a:r>
+            <a:r>
+              <a:rPr lang="en-US" altLang="zh-TW" sz="2400">
+                <a:solidFill>
+                  <a:schemeClr val="bg1">
+                    <a:lumMod val="65000"/>
+                  </a:schemeClr>
+                </a:solidFill>
+              </a:rPr>
+              <a:t>num_pub</a:t>
+            </a:r>
+            <a:endParaRPr lang="pt-BR" altLang="zh-TW" sz="2400">
+              <a:solidFill>
+                <a:schemeClr val="bg1">
+                  <a:lumMod val="65000"/>
+                </a:schemeClr>
+              </a:solidFill>
+            </a:endParaRPr>
+          </a:p>
+          <a:p>
+            <a:pPr marL="0" indent="0">
+              <a:buNone/>
+            </a:pPr>
+            <a:r>
+              <a:rPr lang="pt-BR" altLang="zh-TW" sz="2400"/>
+              <a:t>    num_pub = 1</a:t>
+            </a:r>
+          </a:p>
+          <a:p>
+            <a:pPr marL="0" indent="0">
+              <a:buNone/>
+            </a:pPr>
+            <a:r>
+              <a:rPr lang="pt-BR" altLang="zh-TW" sz="2400"/>
+              <a:t>    num_pri = 1</a:t>
+            </a:r>
+            <a:r>
+              <a:rPr lang="zh-TW" altLang="en-US" sz="2400"/>
+              <a:t> </a:t>
+            </a:r>
+            <a:r>
+              <a:rPr lang="en-US" altLang="zh-TW" sz="2400">
+                <a:solidFill>
+                  <a:schemeClr val="bg1">
+                    <a:lumMod val="65000"/>
+                  </a:schemeClr>
+                </a:solidFill>
+              </a:rPr>
+              <a:t>#</a:t>
+            </a:r>
+            <a:r>
+              <a:rPr lang="zh-TW" altLang="en-US" sz="2400">
+                <a:solidFill>
+                  <a:schemeClr val="bg1">
+                    <a:lumMod val="65000"/>
+                  </a:schemeClr>
+                </a:solidFill>
+              </a:rPr>
+              <a:t> 區域變數，函數結束即丟失</a:t>
+            </a:r>
+            <a:endParaRPr lang="pt-BR" altLang="zh-TW" sz="2400">
+              <a:solidFill>
+                <a:schemeClr val="bg1">
+                  <a:lumMod val="65000"/>
+                </a:schemeClr>
+              </a:solidFill>
+            </a:endParaRPr>
+          </a:p>
+          <a:p>
+            <a:pPr marL="0" indent="0">
+              <a:buNone/>
+            </a:pPr>
+            <a:r>
+              <a:rPr lang="pt-BR" altLang="zh-TW" sz="2400">
+                <a:solidFill>
+                  <a:srgbClr val="FF0000"/>
+                </a:solidFill>
+              </a:rPr>
+              <a:t>foo</a:t>
+            </a:r>
+            <a:r>
+              <a:rPr lang="pt-BR" altLang="zh-TW" sz="2400"/>
+              <a:t>()</a:t>
+            </a:r>
+          </a:p>
+          <a:p>
+            <a:pPr marL="0" indent="0">
+              <a:buNone/>
+            </a:pPr>
+            <a:r>
+              <a:rPr lang="pt-BR" altLang="zh-TW" sz="2400"/>
+              <a:t>print(num_pub)</a:t>
+            </a:r>
+          </a:p>
+          <a:p>
+            <a:pPr marL="0" indent="0">
+              <a:buNone/>
+            </a:pPr>
+            <a:r>
+              <a:rPr lang="pt-BR" altLang="zh-TW" sz="2400"/>
+              <a:t>print(num_pri)</a:t>
+            </a:r>
+            <a:r>
+              <a:rPr lang="zh-TW" altLang="en-US" sz="2400"/>
+              <a:t> </a:t>
+            </a:r>
+            <a:r>
+              <a:rPr lang="en-US" altLang="zh-TW" sz="2400">
+                <a:solidFill>
+                  <a:schemeClr val="bg1">
+                    <a:lumMod val="65000"/>
+                  </a:schemeClr>
+                </a:solidFill>
+              </a:rPr>
+              <a:t>#</a:t>
+            </a:r>
+            <a:r>
+              <a:rPr lang="zh-TW" altLang="en-US" sz="2400">
+                <a:solidFill>
+                  <a:schemeClr val="bg1">
+                    <a:lumMod val="65000"/>
+                  </a:schemeClr>
+                </a:solidFill>
+              </a:rPr>
+              <a:t> </a:t>
+            </a:r>
+            <a:r>
+              <a:rPr lang="en-US" altLang="zh-TW" sz="2400">
+                <a:solidFill>
+                  <a:schemeClr val="bg1">
+                    <a:lumMod val="65000"/>
+                  </a:schemeClr>
+                </a:solidFill>
+              </a:rPr>
+              <a:t>Error</a:t>
+            </a:r>
+            <a:r>
+              <a:rPr lang="zh-TW" altLang="en-US" sz="2400">
+                <a:solidFill>
+                  <a:schemeClr val="bg1">
+                    <a:lumMod val="65000"/>
+                  </a:schemeClr>
+                </a:solidFill>
+              </a:rPr>
+              <a:t>：</a:t>
+            </a:r>
+            <a:r>
+              <a:rPr lang="en-US" altLang="zh-TW" sz="2400">
+                <a:solidFill>
+                  <a:schemeClr val="bg1">
+                    <a:lumMod val="65000"/>
+                  </a:schemeClr>
+                </a:solidFill>
+              </a:rPr>
+              <a:t>num_pri </a:t>
+            </a:r>
+            <a:r>
+              <a:rPr lang="zh-TW" altLang="en-US" sz="2400">
+                <a:solidFill>
+                  <a:schemeClr val="bg1">
+                    <a:lumMod val="65000"/>
+                  </a:schemeClr>
+                </a:solidFill>
+              </a:rPr>
+              <a:t>未定義</a:t>
+            </a:r>
+          </a:p>
+        </p:txBody>
+      </p:sp>
+    </p:spTree>
+    <p:extLst>
+      <p:ext uri="{BB962C8B-B14F-4D97-AF65-F5344CB8AC3E}">
+        <p14:creationId xmlns:p14="http://schemas.microsoft.com/office/powerpoint/2010/main" val="368414144"/>
+      </p:ext>
+    </p:extLst>
+  </p:cSld>
+  <p:clrMapOvr>
+    <a:masterClrMapping/>
+  </p:clrMapOvr>
+</p:sld>
+</file>
+
+<file path=ppt/slides/slide11.xml><?xml version="1.0" encoding="utf-8"?>
+<p:sld xmlns:a="http://schemas.openxmlformats.org/drawingml/2006/main" xmlns:r="http://schemas.openxmlformats.org/officeDocument/2006/relationships" xmlns:p="http://schemas.openxmlformats.org/presentationml/2006/main">
+  <p:cSld>
+    <p:spTree>
+      <p:nvGrpSpPr>
+        <p:cNvPr id="1" name=""/>
+        <p:cNvGrpSpPr/>
+        <p:nvPr/>
+      </p:nvGrpSpPr>
+      <p:grpSpPr>
+        <a:xfrm>
+          <a:off x="0" y="0"/>
+          <a:ext cx="0" cy="0"/>
+          <a:chOff x="0" y="0"/>
+          <a:chExt cx="0" cy="0"/>
+        </a:xfrm>
+      </p:grpSpPr>
+      <p:sp>
+        <p:nvSpPr>
+          <p:cNvPr id="2" name="標題 1">
+            <a:extLst>
+              <a:ext uri="{FF2B5EF4-FFF2-40B4-BE49-F238E27FC236}">
+                <a16:creationId xmlns:a16="http://schemas.microsoft.com/office/drawing/2014/main" id="{AD492FC0-FF92-49A1-9936-C1D77EB46A07}"/>
+              </a:ext>
+            </a:extLst>
+          </p:cNvPr>
+          <p:cNvSpPr>
+            <a:spLocks noGrp="1"/>
+          </p:cNvSpPr>
+          <p:nvPr>
+            <p:ph type="title"/>
+          </p:nvPr>
+        </p:nvSpPr>
+        <p:spPr/>
+        <p:txBody>
+          <a:bodyPr>
+            <a:normAutofit/>
+          </a:bodyPr>
+          <a:lstStyle/>
+          <a:p>
+            <a:r>
+              <a:rPr lang="zh-TW" altLang="en-US" sz="6600"/>
+              <a:t>傳址、傳值？</a:t>
+            </a:r>
+          </a:p>
+        </p:txBody>
+      </p:sp>
+      <p:sp>
+        <p:nvSpPr>
+          <p:cNvPr id="3" name="文字版面配置區 2">
+            <a:extLst>
+              <a:ext uri="{FF2B5EF4-FFF2-40B4-BE49-F238E27FC236}">
+                <a16:creationId xmlns:a16="http://schemas.microsoft.com/office/drawing/2014/main" id="{187F7A86-DF79-4CBF-88BB-268CF37567DD}"/>
+              </a:ext>
+            </a:extLst>
+          </p:cNvPr>
+          <p:cNvSpPr>
+            <a:spLocks noGrp="1"/>
+          </p:cNvSpPr>
+          <p:nvPr>
+            <p:ph type="body" idx="1"/>
+          </p:nvPr>
+        </p:nvSpPr>
+        <p:spPr/>
+        <p:txBody>
+          <a:bodyPr/>
+          <a:lstStyle/>
+          <a:p>
+            <a:endParaRPr lang="zh-TW" altLang="en-US"/>
+          </a:p>
+        </p:txBody>
+      </p:sp>
+    </p:spTree>
+    <p:extLst>
+      <p:ext uri="{BB962C8B-B14F-4D97-AF65-F5344CB8AC3E}">
+        <p14:creationId xmlns:p14="http://schemas.microsoft.com/office/powerpoint/2010/main" val="1904822012"/>
+      </p:ext>
+    </p:extLst>
+  </p:cSld>
+  <p:clrMapOvr>
+    <a:masterClrMapping/>
+  </p:clrMapOvr>
+</p:sld>
+</file>
+
+<file path=ppt/slides/slide12.xml><?xml version="1.0" encoding="utf-8"?>
+<p:sld xmlns:a="http://schemas.openxmlformats.org/drawingml/2006/main" xmlns:r="http://schemas.openxmlformats.org/officeDocument/2006/relationships" xmlns:p="http://schemas.openxmlformats.org/presentationml/2006/main">
+  <p:cSld>
+    <p:spTree>
+      <p:nvGrpSpPr>
+        <p:cNvPr id="1" name=""/>
+        <p:cNvGrpSpPr/>
+        <p:nvPr/>
+      </p:nvGrpSpPr>
+      <p:grpSpPr>
+        <a:xfrm>
+          <a:off x="0" y="0"/>
+          <a:ext cx="0" cy="0"/>
+          <a:chOff x="0" y="0"/>
+          <a:chExt cx="0" cy="0"/>
+        </a:xfrm>
+      </p:grpSpPr>
+      <p:sp>
+        <p:nvSpPr>
+          <p:cNvPr id="2" name="標題 1">
+            <a:extLst>
+              <a:ext uri="{FF2B5EF4-FFF2-40B4-BE49-F238E27FC236}">
+                <a16:creationId xmlns:a16="http://schemas.microsoft.com/office/drawing/2014/main" id="{4DE126A1-4FCC-4A66-B1B1-7E514135A61A}"/>
+              </a:ext>
+            </a:extLst>
+          </p:cNvPr>
+          <p:cNvSpPr>
+            <a:spLocks noGrp="1"/>
+          </p:cNvSpPr>
+          <p:nvPr>
+            <p:ph type="title"/>
+          </p:nvPr>
+        </p:nvSpPr>
+        <p:spPr/>
+        <p:txBody>
+          <a:bodyPr/>
+          <a:lstStyle/>
+          <a:p>
+            <a:r>
+              <a:rPr lang="zh-TW" altLang="en-US"/>
+              <a:t>記憶體位置 </a:t>
+            </a:r>
+            <a:r>
+              <a:rPr lang="en-US" altLang="zh-TW"/>
+              <a:t>id</a:t>
+            </a:r>
+            <a:endParaRPr lang="zh-TW" altLang="en-US"/>
+          </a:p>
+        </p:txBody>
+      </p:sp>
+      <p:sp>
+        <p:nvSpPr>
+          <p:cNvPr id="3" name="內容版面配置區 2">
+            <a:extLst>
+              <a:ext uri="{FF2B5EF4-FFF2-40B4-BE49-F238E27FC236}">
+                <a16:creationId xmlns:a16="http://schemas.microsoft.com/office/drawing/2014/main" id="{228B42DE-3402-4C6D-A9CF-E93A3F30EDC6}"/>
+              </a:ext>
+            </a:extLst>
+          </p:cNvPr>
+          <p:cNvSpPr>
+            <a:spLocks noGrp="1"/>
+          </p:cNvSpPr>
+          <p:nvPr>
+            <p:ph idx="1"/>
+          </p:nvPr>
+        </p:nvSpPr>
+        <p:spPr/>
+        <p:txBody>
+          <a:bodyPr>
+            <a:normAutofit/>
+          </a:bodyPr>
+          <a:lstStyle/>
+          <a:p>
+            <a:pPr marL="0" indent="0">
+              <a:buNone/>
+            </a:pPr>
+            <a:endParaRPr lang="en-US" altLang="zh-TW" sz="2800"/>
+          </a:p>
+          <a:p>
+            <a:pPr marL="0" indent="0">
+              <a:buNone/>
+            </a:pPr>
+            <a:r>
+              <a:rPr lang="en-US" altLang="zh-TW" sz="2800"/>
+              <a:t>a = 100</a:t>
+            </a:r>
+          </a:p>
+          <a:p>
+            <a:pPr marL="0" indent="0">
+              <a:buNone/>
+            </a:pPr>
+            <a:r>
+              <a:rPr lang="en-US" altLang="zh-TW" sz="2800"/>
+              <a:t>b = 100</a:t>
+            </a:r>
+          </a:p>
+          <a:p>
+            <a:pPr marL="0" indent="0">
+              <a:buNone/>
+            </a:pPr>
+            <a:r>
+              <a:rPr lang="en-US" altLang="zh-TW" sz="2800"/>
+              <a:t>print(id(a))</a:t>
+            </a:r>
+          </a:p>
+          <a:p>
+            <a:pPr marL="0" indent="0">
+              <a:buNone/>
+            </a:pPr>
+            <a:r>
+              <a:rPr lang="en-US" altLang="zh-TW" sz="2800"/>
+              <a:t>print(id(b))</a:t>
+            </a:r>
+          </a:p>
+          <a:p>
+            <a:pPr marL="0" indent="0">
+              <a:buNone/>
+            </a:pPr>
+            <a:r>
+              <a:rPr lang="en-US" altLang="zh-TW" sz="2800"/>
+              <a:t>print(id(100))</a:t>
+            </a:r>
+            <a:endParaRPr lang="zh-TW" altLang="en-US" sz="2800"/>
+          </a:p>
+        </p:txBody>
+      </p:sp>
+      <p:graphicFrame>
+        <p:nvGraphicFramePr>
+          <p:cNvPr id="4" name="表格 3">
+            <a:extLst>
+              <a:ext uri="{FF2B5EF4-FFF2-40B4-BE49-F238E27FC236}">
+                <a16:creationId xmlns:a16="http://schemas.microsoft.com/office/drawing/2014/main" id="{55B534F8-7A58-47A8-A8E4-FCCE7D5EA230}"/>
+              </a:ext>
+            </a:extLst>
+          </p:cNvPr>
+          <p:cNvGraphicFramePr>
+            <a:graphicFrameLocks noGrp="1"/>
+          </p:cNvGraphicFramePr>
+          <p:nvPr>
+            <p:extLst>
+              <p:ext uri="{D42A27DB-BD31-4B8C-83A1-F6EECF244321}">
+                <p14:modId xmlns:p14="http://schemas.microsoft.com/office/powerpoint/2010/main" val="902996799"/>
+              </p:ext>
+            </p:extLst>
+          </p:nvPr>
+        </p:nvGraphicFramePr>
+        <p:xfrm>
+          <a:off x="5559552" y="2496752"/>
+          <a:ext cx="4064000" cy="1036320"/>
+        </p:xfrm>
+        <a:graphic>
+          <a:graphicData uri="http://schemas.openxmlformats.org/drawingml/2006/table">
+            <a:tbl>
+              <a:tblPr firstRow="1" bandRow="1">
+                <a:tableStyleId>{5C22544A-7EE6-4342-B048-85BDC9FD1C3A}</a:tableStyleId>
+              </a:tblPr>
+              <a:tblGrid>
+                <a:gridCol w="2032000">
+                  <a:extLst>
+                    <a:ext uri="{9D8B030D-6E8A-4147-A177-3AD203B41FA5}">
+                      <a16:colId xmlns:a16="http://schemas.microsoft.com/office/drawing/2014/main" val="2107419908"/>
+                    </a:ext>
+                  </a:extLst>
+                </a:gridCol>
+                <a:gridCol w="2032000">
+                  <a:extLst>
+                    <a:ext uri="{9D8B030D-6E8A-4147-A177-3AD203B41FA5}">
+                      <a16:colId xmlns:a16="http://schemas.microsoft.com/office/drawing/2014/main" val="3482747075"/>
+                    </a:ext>
+                  </a:extLst>
+                </a:gridCol>
+              </a:tblGrid>
+              <a:tr h="370840">
+                <a:tc>
+                  <a:txBody>
+                    <a:bodyPr/>
+                    <a:lstStyle/>
+                    <a:p>
+                      <a:pPr algn="ctr"/>
+                      <a:r>
+                        <a:rPr lang="en-US" altLang="zh-TW" sz="2800"/>
+                        <a:t>a</a:t>
+                      </a:r>
+                      <a:endParaRPr lang="zh-TW" altLang="en-US" sz="2800"/>
+                    </a:p>
+                  </a:txBody>
+                  <a:tcPr anchor="ctr"/>
+                </a:tc>
+                <a:tc>
+                  <a:txBody>
+                    <a:bodyPr/>
+                    <a:lstStyle/>
+                    <a:p>
+                      <a:pPr algn="ctr"/>
+                      <a:r>
+                        <a:rPr lang="en-US" altLang="zh-TW" sz="2800"/>
+                        <a:t>b</a:t>
+                      </a:r>
+                      <a:endParaRPr lang="zh-TW" altLang="en-US" sz="2800"/>
+                    </a:p>
+                  </a:txBody>
+                  <a:tcPr anchor="ctr"/>
+                </a:tc>
+                <a:extLst>
+                  <a:ext uri="{0D108BD9-81ED-4DB2-BD59-A6C34878D82A}">
+                    <a16:rowId xmlns:a16="http://schemas.microsoft.com/office/drawing/2014/main" val="2642977442"/>
+                  </a:ext>
+                </a:extLst>
+              </a:tr>
+              <a:tr h="370840">
+                <a:tc>
+                  <a:txBody>
+                    <a:bodyPr/>
+                    <a:lstStyle/>
+                    <a:p>
+                      <a:pPr algn="ctr"/>
+                      <a:r>
+                        <a:rPr kumimoji="0" lang="en-US" altLang="zh-TW" sz="2800" b="0" i="0" u="none" strike="noStrike" kern="1200" cap="none" spc="0" normalizeH="0" baseline="0" noProof="0">
+                          <a:ln>
+                            <a:noFill/>
+                          </a:ln>
+                          <a:solidFill>
+                            <a:srgbClr val="000000"/>
+                          </a:solidFill>
+                          <a:effectLst/>
+                          <a:uLnTx/>
+                          <a:uFillTx/>
+                          <a:latin typeface="+mn-lt"/>
+                          <a:ea typeface="+mn-ea"/>
+                          <a:cs typeface="+mn-cs"/>
+                        </a:rPr>
+                        <a:t>9792128</a:t>
+                      </a:r>
+                      <a:endParaRPr lang="zh-TW" altLang="en-US" sz="2800"/>
+                    </a:p>
+                  </a:txBody>
+                  <a:tcPr anchor="ctr"/>
+                </a:tc>
+                <a:tc>
+                  <a:txBody>
+                    <a:bodyPr/>
+                    <a:lstStyle/>
+                    <a:p>
+                      <a:pPr algn="ctr"/>
+                      <a:r>
+                        <a:rPr lang="en-US" altLang="zh-TW" sz="2800"/>
+                        <a:t>9792128</a:t>
+                      </a:r>
+                      <a:endParaRPr lang="zh-TW" altLang="en-US" sz="2800"/>
+                    </a:p>
+                  </a:txBody>
+                  <a:tcPr anchor="ctr"/>
+                </a:tc>
+                <a:extLst>
+                  <a:ext uri="{0D108BD9-81ED-4DB2-BD59-A6C34878D82A}">
+                    <a16:rowId xmlns:a16="http://schemas.microsoft.com/office/drawing/2014/main" val="1188619496"/>
+                  </a:ext>
+                </a:extLst>
+              </a:tr>
+            </a:tbl>
+          </a:graphicData>
+        </a:graphic>
+      </p:graphicFrame>
+      <p:graphicFrame>
+        <p:nvGraphicFramePr>
+          <p:cNvPr id="5" name="表格 4">
+            <a:extLst>
+              <a:ext uri="{FF2B5EF4-FFF2-40B4-BE49-F238E27FC236}">
+                <a16:creationId xmlns:a16="http://schemas.microsoft.com/office/drawing/2014/main" id="{BE7793F8-5A54-46D4-8017-3F6721F08675}"/>
+              </a:ext>
+            </a:extLst>
+          </p:cNvPr>
+          <p:cNvGraphicFramePr>
+            <a:graphicFrameLocks noGrp="1"/>
+          </p:cNvGraphicFramePr>
+          <p:nvPr>
+            <p:extLst>
+              <p:ext uri="{D42A27DB-BD31-4B8C-83A1-F6EECF244321}">
+                <p14:modId xmlns:p14="http://schemas.microsoft.com/office/powerpoint/2010/main" val="1471400107"/>
+              </p:ext>
+            </p:extLst>
+          </p:nvPr>
+        </p:nvGraphicFramePr>
+        <p:xfrm>
+          <a:off x="5559552" y="4201024"/>
+          <a:ext cx="4064000" cy="1036320"/>
+        </p:xfrm>
+        <a:graphic>
+          <a:graphicData uri="http://schemas.openxmlformats.org/drawingml/2006/table">
+            <a:tbl>
+              <a:tblPr firstRow="1" bandRow="1">
+                <a:tableStyleId>{5C22544A-7EE6-4342-B048-85BDC9FD1C3A}</a:tableStyleId>
+              </a:tblPr>
+              <a:tblGrid>
+                <a:gridCol w="2032000">
+                  <a:extLst>
+                    <a:ext uri="{9D8B030D-6E8A-4147-A177-3AD203B41FA5}">
+                      <a16:colId xmlns:a16="http://schemas.microsoft.com/office/drawing/2014/main" val="2107419908"/>
+                    </a:ext>
+                  </a:extLst>
+                </a:gridCol>
+                <a:gridCol w="2032000">
+                  <a:extLst>
+                    <a:ext uri="{9D8B030D-6E8A-4147-A177-3AD203B41FA5}">
+                      <a16:colId xmlns:a16="http://schemas.microsoft.com/office/drawing/2014/main" val="3482747075"/>
+                    </a:ext>
+                  </a:extLst>
+                </a:gridCol>
+              </a:tblGrid>
+              <a:tr h="370840">
+                <a:tc>
+                  <a:txBody>
+                    <a:bodyPr/>
+                    <a:lstStyle/>
+                    <a:p>
+                      <a:pPr algn="ctr"/>
+                      <a:r>
+                        <a:rPr lang="en-US" altLang="zh-TW" sz="2800"/>
+                        <a:t>9792128</a:t>
+                      </a:r>
+                      <a:endParaRPr lang="zh-TW" altLang="en-US" sz="2800"/>
+                    </a:p>
+                  </a:txBody>
+                  <a:tcPr anchor="ctr"/>
+                </a:tc>
+                <a:tc>
+                  <a:txBody>
+                    <a:bodyPr/>
+                    <a:lstStyle/>
+                    <a:p>
+                      <a:pPr algn="ctr"/>
+                      <a:r>
+                        <a:rPr lang="en-US" altLang="zh-TW" sz="2800"/>
+                        <a:t>9792129</a:t>
+                      </a:r>
+                      <a:endParaRPr lang="zh-TW" altLang="en-US" sz="2800"/>
+                    </a:p>
+                  </a:txBody>
+                  <a:tcPr anchor="ctr"/>
+                </a:tc>
+                <a:extLst>
+                  <a:ext uri="{0D108BD9-81ED-4DB2-BD59-A6C34878D82A}">
+                    <a16:rowId xmlns:a16="http://schemas.microsoft.com/office/drawing/2014/main" val="2642977442"/>
+                  </a:ext>
+                </a:extLst>
+              </a:tr>
+              <a:tr h="370840">
+                <a:tc>
+                  <a:txBody>
+                    <a:bodyPr/>
+                    <a:lstStyle/>
+                    <a:p>
+                      <a:pPr algn="ctr"/>
+                      <a:r>
+                        <a:rPr lang="en-US" altLang="zh-TW" sz="2800"/>
+                        <a:t>100</a:t>
+                      </a:r>
+                      <a:endParaRPr lang="zh-TW" altLang="en-US" sz="2800"/>
+                    </a:p>
+                  </a:txBody>
+                  <a:tcPr anchor="ctr"/>
+                </a:tc>
+                <a:tc>
+                  <a:txBody>
+                    <a:bodyPr/>
+                    <a:lstStyle/>
+                    <a:p>
+                      <a:pPr algn="ctr"/>
+                      <a:r>
+                        <a:rPr lang="en-US" altLang="zh-TW" sz="2800"/>
+                        <a:t>101</a:t>
+                      </a:r>
+                      <a:endParaRPr lang="zh-TW" altLang="en-US" sz="2800"/>
+                    </a:p>
+                  </a:txBody>
+                  <a:tcPr anchor="ctr"/>
+                </a:tc>
+                <a:extLst>
+                  <a:ext uri="{0D108BD9-81ED-4DB2-BD59-A6C34878D82A}">
+                    <a16:rowId xmlns:a16="http://schemas.microsoft.com/office/drawing/2014/main" val="1188619496"/>
+                  </a:ext>
+                </a:extLst>
+              </a:tr>
+            </a:tbl>
+          </a:graphicData>
+        </a:graphic>
+      </p:graphicFrame>
+      <p:sp>
+        <p:nvSpPr>
+          <p:cNvPr id="6" name="箭號: 向下 5">
+            <a:extLst>
+              <a:ext uri="{FF2B5EF4-FFF2-40B4-BE49-F238E27FC236}">
+                <a16:creationId xmlns:a16="http://schemas.microsoft.com/office/drawing/2014/main" id="{800BD1B9-BB08-4479-90CD-FCB778BE9D66}"/>
+              </a:ext>
+            </a:extLst>
+          </p:cNvPr>
+          <p:cNvSpPr/>
+          <p:nvPr/>
+        </p:nvSpPr>
+        <p:spPr>
+          <a:xfrm>
+            <a:off x="6501008" y="3533072"/>
+            <a:ext cx="231732" cy="667952"/>
+          </a:xfrm>
+          <a:prstGeom prst="downArrow">
+            <a:avLst/>
+          </a:prstGeom>
+        </p:spPr>
+        <p:style>
+          <a:lnRef idx="2">
+            <a:schemeClr val="accent1">
+              <a:shade val="50000"/>
+            </a:schemeClr>
+          </a:lnRef>
+          <a:fillRef idx="1">
+            <a:schemeClr val="accent1"/>
+          </a:fillRef>
+          <a:effectRef idx="0">
+            <a:schemeClr val="accent1"/>
+          </a:effectRef>
+          <a:fontRef idx="minor">
+            <a:schemeClr val="lt1"/>
+          </a:fontRef>
+        </p:style>
+        <p:txBody>
+          <a:bodyPr rtlCol="0" anchor="ctr"/>
+          <a:lstStyle/>
+          <a:p>
+            <a:pPr algn="ctr"/>
+            <a:endParaRPr lang="zh-TW" altLang="en-US"/>
+          </a:p>
+        </p:txBody>
+      </p:sp>
+      <p:sp>
+        <p:nvSpPr>
+          <p:cNvPr id="7" name="箭號: 向下 6">
+            <a:extLst>
+              <a:ext uri="{FF2B5EF4-FFF2-40B4-BE49-F238E27FC236}">
+                <a16:creationId xmlns:a16="http://schemas.microsoft.com/office/drawing/2014/main" id="{3751A3C5-3E9B-404A-A792-D1A14386E475}"/>
+              </a:ext>
+            </a:extLst>
+          </p:cNvPr>
+          <p:cNvSpPr/>
+          <p:nvPr/>
+        </p:nvSpPr>
+        <p:spPr>
+          <a:xfrm rot="3435450">
+            <a:off x="7408899" y="3368347"/>
+            <a:ext cx="231732" cy="1021399"/>
+          </a:xfrm>
+          <a:prstGeom prst="downArrow">
+            <a:avLst/>
+          </a:prstGeom>
+        </p:spPr>
+        <p:style>
+          <a:lnRef idx="2">
+            <a:schemeClr val="accent1">
+              <a:shade val="50000"/>
+            </a:schemeClr>
+          </a:lnRef>
+          <a:fillRef idx="1">
+            <a:schemeClr val="accent1"/>
+          </a:fillRef>
+          <a:effectRef idx="0">
+            <a:schemeClr val="accent1"/>
+          </a:effectRef>
+          <a:fontRef idx="minor">
+            <a:schemeClr val="lt1"/>
+          </a:fontRef>
+        </p:style>
+        <p:txBody>
+          <a:bodyPr rtlCol="0" anchor="ctr"/>
+          <a:lstStyle/>
+          <a:p>
+            <a:pPr algn="ctr"/>
+            <a:endParaRPr lang="zh-TW" altLang="en-US"/>
+          </a:p>
+        </p:txBody>
+      </p:sp>
+    </p:spTree>
+    <p:extLst>
+      <p:ext uri="{BB962C8B-B14F-4D97-AF65-F5344CB8AC3E}">
+        <p14:creationId xmlns:p14="http://schemas.microsoft.com/office/powerpoint/2010/main" val="418834150"/>
+      </p:ext>
+    </p:extLst>
+  </p:cSld>
+  <p:clrMapOvr>
+    <a:masterClrMapping/>
+  </p:clrMapOvr>
+</p:sld>
+</file>
+
+<file path=ppt/slides/slide13.xml><?xml version="1.0" encoding="utf-8"?>
+<p:sld xmlns:a="http://schemas.openxmlformats.org/drawingml/2006/main" xmlns:r="http://schemas.openxmlformats.org/officeDocument/2006/relationships" xmlns:p="http://schemas.openxmlformats.org/presentationml/2006/main">
+  <p:cSld>
+    <p:spTree>
+      <p:nvGrpSpPr>
+        <p:cNvPr id="1" name=""/>
+        <p:cNvGrpSpPr/>
+        <p:nvPr/>
+      </p:nvGrpSpPr>
+      <p:grpSpPr>
+        <a:xfrm>
+          <a:off x="0" y="0"/>
+          <a:ext cx="0" cy="0"/>
+          <a:chOff x="0" y="0"/>
+          <a:chExt cx="0" cy="0"/>
+        </a:xfrm>
+      </p:grpSpPr>
+      <p:sp>
+        <p:nvSpPr>
+          <p:cNvPr id="2" name="標題 1">
+            <a:extLst>
+              <a:ext uri="{FF2B5EF4-FFF2-40B4-BE49-F238E27FC236}">
+                <a16:creationId xmlns:a16="http://schemas.microsoft.com/office/drawing/2014/main" id="{4DE126A1-4FCC-4A66-B1B1-7E514135A61A}"/>
+              </a:ext>
+            </a:extLst>
+          </p:cNvPr>
+          <p:cNvSpPr>
+            <a:spLocks noGrp="1"/>
+          </p:cNvSpPr>
+          <p:nvPr>
+            <p:ph type="title"/>
+          </p:nvPr>
+        </p:nvSpPr>
+        <p:spPr/>
+        <p:txBody>
+          <a:bodyPr/>
+          <a:lstStyle/>
+          <a:p>
+            <a:r>
+              <a:rPr lang="zh-TW" altLang="en-US"/>
+              <a:t>記憶體位置 </a:t>
+            </a:r>
+            <a:r>
+              <a:rPr lang="en-US" altLang="zh-TW"/>
+              <a:t>id</a:t>
+            </a:r>
+            <a:endParaRPr lang="zh-TW" altLang="en-US"/>
+          </a:p>
+        </p:txBody>
+      </p:sp>
+      <p:sp>
+        <p:nvSpPr>
+          <p:cNvPr id="3" name="內容版面配置區 2">
+            <a:extLst>
+              <a:ext uri="{FF2B5EF4-FFF2-40B4-BE49-F238E27FC236}">
+                <a16:creationId xmlns:a16="http://schemas.microsoft.com/office/drawing/2014/main" id="{228B42DE-3402-4C6D-A9CF-E93A3F30EDC6}"/>
+              </a:ext>
+            </a:extLst>
+          </p:cNvPr>
+          <p:cNvSpPr>
+            <a:spLocks noGrp="1"/>
+          </p:cNvSpPr>
+          <p:nvPr>
+            <p:ph idx="1"/>
+          </p:nvPr>
+        </p:nvSpPr>
+        <p:spPr/>
+        <p:txBody>
+          <a:bodyPr>
+            <a:normAutofit/>
+          </a:bodyPr>
+          <a:lstStyle/>
+          <a:p>
+            <a:pPr marL="0" indent="0">
+              <a:buNone/>
+            </a:pPr>
+            <a:endParaRPr lang="en-US" altLang="zh-TW" sz="2800"/>
+          </a:p>
+          <a:p>
+            <a:pPr marL="0" indent="0">
+              <a:buNone/>
+            </a:pPr>
+            <a:r>
+              <a:rPr lang="en-US" altLang="zh-TW" sz="2800"/>
+              <a:t>a = 100.0</a:t>
+            </a:r>
+          </a:p>
+          <a:p>
+            <a:pPr marL="0" indent="0">
+              <a:buNone/>
+            </a:pPr>
+            <a:r>
+              <a:rPr lang="en-US" altLang="zh-TW" sz="2800"/>
+              <a:t>b = 100.0</a:t>
+            </a:r>
+          </a:p>
+          <a:p>
+            <a:pPr marL="0" indent="0">
+              <a:buNone/>
+            </a:pPr>
+            <a:r>
+              <a:rPr lang="en-US" altLang="zh-TW" sz="2800"/>
+              <a:t>print(id(a))</a:t>
+            </a:r>
+          </a:p>
+          <a:p>
+            <a:pPr marL="0" indent="0">
+              <a:buNone/>
+            </a:pPr>
+            <a:r>
+              <a:rPr lang="en-US" altLang="zh-TW" sz="2800"/>
+              <a:t>print(id(b))</a:t>
+            </a:r>
+          </a:p>
+          <a:p>
+            <a:pPr marL="0" indent="0">
+              <a:buNone/>
+            </a:pPr>
+            <a:r>
+              <a:rPr lang="en-US" altLang="zh-TW" sz="2800"/>
+              <a:t>print(id(100.0))</a:t>
+            </a:r>
+            <a:endParaRPr lang="zh-TW" altLang="en-US" sz="2800"/>
+          </a:p>
+        </p:txBody>
+      </p:sp>
+      <p:graphicFrame>
+        <p:nvGraphicFramePr>
+          <p:cNvPr id="4" name="表格 3">
+            <a:extLst>
+              <a:ext uri="{FF2B5EF4-FFF2-40B4-BE49-F238E27FC236}">
+                <a16:creationId xmlns:a16="http://schemas.microsoft.com/office/drawing/2014/main" id="{55B534F8-7A58-47A8-A8E4-FCCE7D5EA230}"/>
+              </a:ext>
+            </a:extLst>
+          </p:cNvPr>
+          <p:cNvGraphicFramePr>
+            <a:graphicFrameLocks noGrp="1"/>
+          </p:cNvGraphicFramePr>
+          <p:nvPr>
+            <p:extLst>
+              <p:ext uri="{D42A27DB-BD31-4B8C-83A1-F6EECF244321}">
+                <p14:modId xmlns:p14="http://schemas.microsoft.com/office/powerpoint/2010/main" val="2487518019"/>
+              </p:ext>
+            </p:extLst>
+          </p:nvPr>
+        </p:nvGraphicFramePr>
+        <p:xfrm>
+          <a:off x="5559552" y="2496752"/>
+          <a:ext cx="4064000" cy="1036320"/>
+        </p:xfrm>
+        <a:graphic>
+          <a:graphicData uri="http://schemas.openxmlformats.org/drawingml/2006/table">
+            <a:tbl>
+              <a:tblPr firstRow="1" bandRow="1">
+                <a:tableStyleId>{5C22544A-7EE6-4342-B048-85BDC9FD1C3A}</a:tableStyleId>
+              </a:tblPr>
+              <a:tblGrid>
+                <a:gridCol w="2032000">
+                  <a:extLst>
+                    <a:ext uri="{9D8B030D-6E8A-4147-A177-3AD203B41FA5}">
+                      <a16:colId xmlns:a16="http://schemas.microsoft.com/office/drawing/2014/main" val="2107419908"/>
+                    </a:ext>
+                  </a:extLst>
+                </a:gridCol>
+                <a:gridCol w="2032000">
+                  <a:extLst>
+                    <a:ext uri="{9D8B030D-6E8A-4147-A177-3AD203B41FA5}">
+                      <a16:colId xmlns:a16="http://schemas.microsoft.com/office/drawing/2014/main" val="3482747075"/>
+                    </a:ext>
+                  </a:extLst>
+                </a:gridCol>
+              </a:tblGrid>
+              <a:tr h="370840">
+                <a:tc>
+                  <a:txBody>
+                    <a:bodyPr/>
+                    <a:lstStyle/>
+                    <a:p>
+                      <a:pPr algn="ctr"/>
+                      <a:r>
+                        <a:rPr lang="en-US" altLang="zh-TW" sz="2800"/>
+                        <a:t>a</a:t>
+                      </a:r>
+                      <a:endParaRPr lang="zh-TW" altLang="en-US" sz="2800"/>
+                    </a:p>
+                  </a:txBody>
+                  <a:tcPr anchor="ctr"/>
+                </a:tc>
+                <a:tc>
+                  <a:txBody>
+                    <a:bodyPr/>
+                    <a:lstStyle/>
+                    <a:p>
+                      <a:pPr algn="ctr"/>
+                      <a:r>
+                        <a:rPr lang="en-US" altLang="zh-TW" sz="2800"/>
+                        <a:t>b</a:t>
+                      </a:r>
+                      <a:endParaRPr lang="zh-TW" altLang="en-US" sz="2800"/>
+                    </a:p>
+                  </a:txBody>
+                  <a:tcPr anchor="ctr"/>
+                </a:tc>
+                <a:extLst>
+                  <a:ext uri="{0D108BD9-81ED-4DB2-BD59-A6C34878D82A}">
+                    <a16:rowId xmlns:a16="http://schemas.microsoft.com/office/drawing/2014/main" val="2642977442"/>
+                  </a:ext>
+                </a:extLst>
+              </a:tr>
+              <a:tr h="370840">
+                <a:tc>
+                  <a:txBody>
+                    <a:bodyPr/>
+                    <a:lstStyle/>
+                    <a:p>
+                      <a:pPr algn="ctr"/>
+                      <a:r>
+                        <a:rPr lang="en-US" altLang="zh-TW" sz="2800" b="0" i="0" kern="1200">
+                          <a:solidFill>
+                            <a:schemeClr val="dk1"/>
+                          </a:solidFill>
+                          <a:effectLst/>
+                          <a:latin typeface="+mn-lt"/>
+                          <a:ea typeface="+mn-ea"/>
+                          <a:cs typeface="+mn-cs"/>
+                        </a:rPr>
+                        <a:t>1397…7584</a:t>
+                      </a:r>
+                      <a:endParaRPr lang="zh-TW" altLang="en-US" sz="3600"/>
+                    </a:p>
+                  </a:txBody>
+                  <a:tcPr anchor="ctr"/>
+                </a:tc>
+                <a:tc>
+                  <a:txBody>
+                    <a:bodyPr/>
+                    <a:lstStyle/>
+                    <a:p>
+                      <a:pPr algn="ctr"/>
+                      <a:r>
+                        <a:rPr lang="en-US" altLang="zh-TW" sz="2800"/>
+                        <a:t>1397…4256</a:t>
+                      </a:r>
+                      <a:endParaRPr lang="zh-TW" altLang="en-US" sz="2800"/>
+                    </a:p>
+                  </a:txBody>
+                  <a:tcPr anchor="ctr"/>
+                </a:tc>
+                <a:extLst>
+                  <a:ext uri="{0D108BD9-81ED-4DB2-BD59-A6C34878D82A}">
+                    <a16:rowId xmlns:a16="http://schemas.microsoft.com/office/drawing/2014/main" val="1188619496"/>
+                  </a:ext>
+                </a:extLst>
+              </a:tr>
+            </a:tbl>
+          </a:graphicData>
+        </a:graphic>
+      </p:graphicFrame>
+      <p:graphicFrame>
+        <p:nvGraphicFramePr>
+          <p:cNvPr id="5" name="表格 4">
+            <a:extLst>
+              <a:ext uri="{FF2B5EF4-FFF2-40B4-BE49-F238E27FC236}">
+                <a16:creationId xmlns:a16="http://schemas.microsoft.com/office/drawing/2014/main" id="{BE7793F8-5A54-46D4-8017-3F6721F08675}"/>
+              </a:ext>
+            </a:extLst>
+          </p:cNvPr>
+          <p:cNvGraphicFramePr>
+            <a:graphicFrameLocks noGrp="1"/>
+          </p:cNvGraphicFramePr>
+          <p:nvPr>
+            <p:extLst>
+              <p:ext uri="{D42A27DB-BD31-4B8C-83A1-F6EECF244321}">
+                <p14:modId xmlns:p14="http://schemas.microsoft.com/office/powerpoint/2010/main" val="1968587686"/>
+              </p:ext>
+            </p:extLst>
+          </p:nvPr>
+        </p:nvGraphicFramePr>
+        <p:xfrm>
+          <a:off x="5559552" y="4201024"/>
+          <a:ext cx="4064000" cy="1036320"/>
+        </p:xfrm>
+        <a:graphic>
+          <a:graphicData uri="http://schemas.openxmlformats.org/drawingml/2006/table">
+            <a:tbl>
+              <a:tblPr firstRow="1" bandRow="1">
+                <a:tableStyleId>{5C22544A-7EE6-4342-B048-85BDC9FD1C3A}</a:tableStyleId>
+              </a:tblPr>
+              <a:tblGrid>
+                <a:gridCol w="2032000">
+                  <a:extLst>
+                    <a:ext uri="{9D8B030D-6E8A-4147-A177-3AD203B41FA5}">
+                      <a16:colId xmlns:a16="http://schemas.microsoft.com/office/drawing/2014/main" val="2107419908"/>
+                    </a:ext>
+                  </a:extLst>
+                </a:gridCol>
+                <a:gridCol w="2032000">
+                  <a:extLst>
+                    <a:ext uri="{9D8B030D-6E8A-4147-A177-3AD203B41FA5}">
+                      <a16:colId xmlns:a16="http://schemas.microsoft.com/office/drawing/2014/main" val="3482747075"/>
+                    </a:ext>
+                  </a:extLst>
+                </a:gridCol>
+              </a:tblGrid>
+              <a:tr h="370840">
+                <a:tc>
+                  <a:txBody>
+                    <a:bodyPr/>
+                    <a:lstStyle/>
+                    <a:p>
+                      <a:pPr algn="ctr"/>
+                      <a:r>
+                        <a:rPr lang="en-US" altLang="zh-TW" sz="2800" b="1"/>
+                        <a:t>1397…7584</a:t>
+                      </a:r>
+                    </a:p>
+                  </a:txBody>
+                  <a:tcPr anchor="ctr"/>
+                </a:tc>
+                <a:tc>
+                  <a:txBody>
+                    <a:bodyPr/>
+                    <a:lstStyle/>
+                    <a:p>
+                      <a:pPr algn="ctr"/>
+                      <a:r>
+                        <a:rPr lang="en-US" altLang="zh-TW" sz="2800"/>
+                        <a:t>1397…4256</a:t>
+                      </a:r>
+                    </a:p>
+                  </a:txBody>
+                  <a:tcPr anchor="ctr"/>
+                </a:tc>
+                <a:extLst>
+                  <a:ext uri="{0D108BD9-81ED-4DB2-BD59-A6C34878D82A}">
+                    <a16:rowId xmlns:a16="http://schemas.microsoft.com/office/drawing/2014/main" val="2642977442"/>
+                  </a:ext>
+                </a:extLst>
+              </a:tr>
+              <a:tr h="370840">
+                <a:tc>
+                  <a:txBody>
+                    <a:bodyPr/>
+                    <a:lstStyle/>
+                    <a:p>
+                      <a:pPr algn="ctr"/>
+                      <a:r>
+                        <a:rPr lang="en-US" altLang="zh-TW" sz="2800"/>
+                        <a:t>100.0</a:t>
+                      </a:r>
+                      <a:endParaRPr lang="zh-TW" altLang="en-US" sz="2800"/>
+                    </a:p>
+                  </a:txBody>
+                  <a:tcPr anchor="ctr"/>
+                </a:tc>
+                <a:tc>
+                  <a:txBody>
+                    <a:bodyPr/>
+                    <a:lstStyle/>
+                    <a:p>
+                      <a:pPr algn="ctr"/>
+                      <a:r>
+                        <a:rPr lang="en-US" altLang="zh-TW" sz="2800"/>
+                        <a:t>100.0</a:t>
+                      </a:r>
+                      <a:endParaRPr lang="zh-TW" altLang="en-US" sz="2800"/>
+                    </a:p>
+                  </a:txBody>
+                  <a:tcPr anchor="ctr"/>
+                </a:tc>
+                <a:extLst>
+                  <a:ext uri="{0D108BD9-81ED-4DB2-BD59-A6C34878D82A}">
+                    <a16:rowId xmlns:a16="http://schemas.microsoft.com/office/drawing/2014/main" val="1188619496"/>
+                  </a:ext>
+                </a:extLst>
+              </a:tr>
+            </a:tbl>
+          </a:graphicData>
+        </a:graphic>
+      </p:graphicFrame>
+      <p:sp>
+        <p:nvSpPr>
+          <p:cNvPr id="6" name="箭號: 向下 5">
+            <a:extLst>
+              <a:ext uri="{FF2B5EF4-FFF2-40B4-BE49-F238E27FC236}">
+                <a16:creationId xmlns:a16="http://schemas.microsoft.com/office/drawing/2014/main" id="{800BD1B9-BB08-4479-90CD-FCB778BE9D66}"/>
+              </a:ext>
+            </a:extLst>
+          </p:cNvPr>
+          <p:cNvSpPr/>
+          <p:nvPr/>
+        </p:nvSpPr>
+        <p:spPr>
+          <a:xfrm>
+            <a:off x="6475956" y="3533072"/>
+            <a:ext cx="231732" cy="667952"/>
+          </a:xfrm>
+          <a:prstGeom prst="downArrow">
+            <a:avLst/>
+          </a:prstGeom>
+        </p:spPr>
+        <p:style>
+          <a:lnRef idx="2">
+            <a:schemeClr val="accent1">
+              <a:shade val="50000"/>
+            </a:schemeClr>
+          </a:lnRef>
+          <a:fillRef idx="1">
+            <a:schemeClr val="accent1"/>
+          </a:fillRef>
+          <a:effectRef idx="0">
+            <a:schemeClr val="accent1"/>
+          </a:effectRef>
+          <a:fontRef idx="minor">
+            <a:schemeClr val="lt1"/>
+          </a:fontRef>
+        </p:style>
+        <p:txBody>
+          <a:bodyPr rtlCol="0" anchor="ctr"/>
+          <a:lstStyle/>
+          <a:p>
+            <a:pPr algn="ctr"/>
+            <a:endParaRPr lang="zh-TW" altLang="en-US"/>
+          </a:p>
+        </p:txBody>
+      </p:sp>
+      <p:sp>
+        <p:nvSpPr>
+          <p:cNvPr id="8" name="箭號: 向下 7">
+            <a:extLst>
+              <a:ext uri="{FF2B5EF4-FFF2-40B4-BE49-F238E27FC236}">
+                <a16:creationId xmlns:a16="http://schemas.microsoft.com/office/drawing/2014/main" id="{9562C86E-701A-4E61-857F-72F592172338}"/>
+              </a:ext>
+            </a:extLst>
+          </p:cNvPr>
+          <p:cNvSpPr/>
+          <p:nvPr/>
+        </p:nvSpPr>
+        <p:spPr>
+          <a:xfrm>
+            <a:off x="8480121" y="3533072"/>
+            <a:ext cx="231732" cy="667952"/>
+          </a:xfrm>
+          <a:prstGeom prst="downArrow">
+            <a:avLst/>
+          </a:prstGeom>
+        </p:spPr>
+        <p:style>
+          <a:lnRef idx="2">
+            <a:schemeClr val="accent1">
+              <a:shade val="50000"/>
+            </a:schemeClr>
+          </a:lnRef>
+          <a:fillRef idx="1">
+            <a:schemeClr val="accent1"/>
+          </a:fillRef>
+          <a:effectRef idx="0">
+            <a:schemeClr val="accent1"/>
+          </a:effectRef>
+          <a:fontRef idx="minor">
+            <a:schemeClr val="lt1"/>
+          </a:fontRef>
+        </p:style>
+        <p:txBody>
+          <a:bodyPr rtlCol="0" anchor="ctr"/>
+          <a:lstStyle/>
+          <a:p>
+            <a:pPr algn="ctr"/>
+            <a:endParaRPr lang="zh-TW" altLang="en-US"/>
+          </a:p>
+        </p:txBody>
+      </p:sp>
+    </p:spTree>
+    <p:extLst>
+      <p:ext uri="{BB962C8B-B14F-4D97-AF65-F5344CB8AC3E}">
+        <p14:creationId xmlns:p14="http://schemas.microsoft.com/office/powerpoint/2010/main" val="2184399805"/>
+      </p:ext>
+    </p:extLst>
+  </p:cSld>
+  <p:clrMapOvr>
+    <a:masterClrMapping/>
+  </p:clrMapOvr>
+</p:sld>
+</file>
+
+<file path=ppt/slides/slide14.xml><?xml version="1.0" encoding="utf-8"?>
+<p:sld xmlns:a="http://schemas.openxmlformats.org/drawingml/2006/main" xmlns:r="http://schemas.openxmlformats.org/officeDocument/2006/relationships" xmlns:p="http://schemas.openxmlformats.org/presentationml/2006/main">
+  <p:cSld>
+    <p:spTree>
+      <p:nvGrpSpPr>
+        <p:cNvPr id="1" name=""/>
+        <p:cNvGrpSpPr/>
+        <p:nvPr/>
+      </p:nvGrpSpPr>
+      <p:grpSpPr>
+        <a:xfrm>
+          <a:off x="0" y="0"/>
+          <a:ext cx="0" cy="0"/>
+          <a:chOff x="0" y="0"/>
+          <a:chExt cx="0" cy="0"/>
+        </a:xfrm>
+      </p:grpSpPr>
+      <p:sp>
+        <p:nvSpPr>
+          <p:cNvPr id="2" name="標題 1">
+            <a:extLst>
+              <a:ext uri="{FF2B5EF4-FFF2-40B4-BE49-F238E27FC236}">
+                <a16:creationId xmlns:a16="http://schemas.microsoft.com/office/drawing/2014/main" id="{9C02622A-FBCF-4607-A99C-EEFA84A5940D}"/>
+              </a:ext>
+            </a:extLst>
+          </p:cNvPr>
+          <p:cNvSpPr>
+            <a:spLocks noGrp="1"/>
+          </p:cNvSpPr>
+          <p:nvPr>
+            <p:ph type="title"/>
+          </p:nvPr>
+        </p:nvSpPr>
+        <p:spPr/>
+        <p:txBody>
+          <a:bodyPr/>
+          <a:lstStyle/>
+          <a:p>
+            <a:r>
+              <a:rPr lang="en-US" altLang="zh-TW"/>
+              <a:t>Python </a:t>
+            </a:r>
+            <a:r>
+              <a:rPr lang="zh-TW" altLang="en-US"/>
+              <a:t>物件</a:t>
+            </a:r>
+          </a:p>
+        </p:txBody>
+      </p:sp>
+      <p:graphicFrame>
+        <p:nvGraphicFramePr>
+          <p:cNvPr id="4" name="內容版面配置區 3">
+            <a:extLst>
+              <a:ext uri="{FF2B5EF4-FFF2-40B4-BE49-F238E27FC236}">
+                <a16:creationId xmlns:a16="http://schemas.microsoft.com/office/drawing/2014/main" id="{50AEC9E1-1F2F-4695-AEA4-F629C642167E}"/>
+              </a:ext>
+            </a:extLst>
+          </p:cNvPr>
+          <p:cNvGraphicFramePr>
+            <a:graphicFrameLocks noGrp="1"/>
+          </p:cNvGraphicFramePr>
+          <p:nvPr>
+            <p:ph idx="1"/>
+            <p:extLst>
+              <p:ext uri="{D42A27DB-BD31-4B8C-83A1-F6EECF244321}">
+                <p14:modId xmlns:p14="http://schemas.microsoft.com/office/powerpoint/2010/main" val="633755275"/>
+              </p:ext>
+            </p:extLst>
+          </p:nvPr>
+        </p:nvGraphicFramePr>
+        <p:xfrm>
+          <a:off x="1261872" y="2280551"/>
+          <a:ext cx="8212135" cy="3627120"/>
+        </p:xfrm>
+        <a:graphic>
+          <a:graphicData uri="http://schemas.openxmlformats.org/drawingml/2006/table">
+            <a:tbl>
+              <a:tblPr firstRow="1" bandRow="1">
+                <a:tableStyleId>{5C22544A-7EE6-4342-B048-85BDC9FD1C3A}</a:tableStyleId>
+              </a:tblPr>
+              <a:tblGrid>
+                <a:gridCol w="1980671">
+                  <a:extLst>
+                    <a:ext uri="{9D8B030D-6E8A-4147-A177-3AD203B41FA5}">
+                      <a16:colId xmlns:a16="http://schemas.microsoft.com/office/drawing/2014/main" val="881928438"/>
+                    </a:ext>
+                  </a:extLst>
+                </a:gridCol>
+                <a:gridCol w="1557866">
+                  <a:extLst>
+                    <a:ext uri="{9D8B030D-6E8A-4147-A177-3AD203B41FA5}">
+                      <a16:colId xmlns:a16="http://schemas.microsoft.com/office/drawing/2014/main" val="4005785759"/>
+                    </a:ext>
+                  </a:extLst>
+                </a:gridCol>
+                <a:gridCol w="1557866">
+                  <a:extLst>
+                    <a:ext uri="{9D8B030D-6E8A-4147-A177-3AD203B41FA5}">
+                      <a16:colId xmlns:a16="http://schemas.microsoft.com/office/drawing/2014/main" val="2078695155"/>
+                    </a:ext>
+                  </a:extLst>
+                </a:gridCol>
+                <a:gridCol w="1557866">
+                  <a:extLst>
+                    <a:ext uri="{9D8B030D-6E8A-4147-A177-3AD203B41FA5}">
+                      <a16:colId xmlns:a16="http://schemas.microsoft.com/office/drawing/2014/main" val="70972085"/>
+                    </a:ext>
+                  </a:extLst>
+                </a:gridCol>
+                <a:gridCol w="1557866">
+                  <a:extLst>
+                    <a:ext uri="{9D8B030D-6E8A-4147-A177-3AD203B41FA5}">
+                      <a16:colId xmlns:a16="http://schemas.microsoft.com/office/drawing/2014/main" val="2101474053"/>
+                    </a:ext>
+                  </a:extLst>
+                </a:gridCol>
+              </a:tblGrid>
+              <a:tr h="370840">
+                <a:tc>
+                  <a:txBody>
+                    <a:bodyPr/>
+                    <a:lstStyle/>
+                    <a:p>
+                      <a:pPr algn="ctr"/>
+                      <a:r>
+                        <a:rPr lang="zh-TW" altLang="en-US" sz="2800"/>
+                        <a:t>類型名稱</a:t>
+                      </a:r>
+                    </a:p>
+                  </a:txBody>
+                  <a:tcPr anchor="ctr"/>
+                </a:tc>
+                <a:tc>
+                  <a:txBody>
+                    <a:bodyPr/>
+                    <a:lstStyle/>
+                    <a:p>
+                      <a:pPr algn="ctr"/>
+                      <a:r>
+                        <a:rPr lang="zh-TW" altLang="en-US" sz="2800"/>
+                        <a:t>意義</a:t>
+                      </a:r>
+                    </a:p>
+                  </a:txBody>
+                  <a:tcPr anchor="ctr"/>
+                </a:tc>
+                <a:tc>
+                  <a:txBody>
+                    <a:bodyPr/>
+                    <a:lstStyle/>
+                    <a:p>
+                      <a:pPr algn="ctr"/>
+                      <a:r>
+                        <a:rPr lang="zh-TW" altLang="en-US" sz="2800"/>
+                        <a:t>變動</a:t>
+                      </a:r>
+                    </a:p>
+                  </a:txBody>
+                  <a:tcPr anchor="ctr"/>
+                </a:tc>
+                <a:tc>
+                  <a:txBody>
+                    <a:bodyPr/>
+                    <a:lstStyle/>
+                    <a:p>
+                      <a:pPr algn="ctr"/>
+                      <a:r>
+                        <a:rPr lang="zh-TW" altLang="en-US" sz="2800"/>
+                        <a:t>順序</a:t>
+                      </a:r>
+                    </a:p>
+                  </a:txBody>
+                  <a:tcPr anchor="ctr"/>
+                </a:tc>
+                <a:tc>
+                  <a:txBody>
+                    <a:bodyPr/>
+                    <a:lstStyle/>
+                    <a:p>
+                      <a:pPr algn="ctr"/>
+                      <a:r>
+                        <a:rPr lang="zh-TW" altLang="en-US" sz="2800"/>
+                        <a:t>唯一</a:t>
+                      </a:r>
+                    </a:p>
+                  </a:txBody>
+                  <a:tcPr anchor="ctr"/>
+                </a:tc>
+                <a:extLst>
+                  <a:ext uri="{0D108BD9-81ED-4DB2-BD59-A6C34878D82A}">
+                    <a16:rowId xmlns:a16="http://schemas.microsoft.com/office/drawing/2014/main" val="2849969137"/>
+                  </a:ext>
+                </a:extLst>
+              </a:tr>
+              <a:tr h="370840">
+                <a:tc>
+                  <a:txBody>
+                    <a:bodyPr/>
+                    <a:lstStyle/>
+                    <a:p>
+                      <a:r>
+                        <a:rPr lang="zh-TW" altLang="en-US" sz="2800"/>
+                        <a:t>數字型態</a:t>
+                      </a:r>
+                    </a:p>
+                  </a:txBody>
+                  <a:tcPr anchor="ctr"/>
+                </a:tc>
+                <a:tc>
+                  <a:txBody>
+                    <a:bodyPr/>
+                    <a:lstStyle/>
+                    <a:p>
+                      <a:pPr algn="ctr"/>
+                      <a:endParaRPr lang="zh-TW" altLang="en-US" sz="2800"/>
+                    </a:p>
+                  </a:txBody>
+                  <a:tcPr anchor="ctr"/>
+                </a:tc>
+                <a:tc>
+                  <a:txBody>
+                    <a:bodyPr/>
+                    <a:lstStyle/>
+                    <a:p>
+                      <a:pPr algn="ctr"/>
+                      <a:r>
+                        <a:rPr lang="en-US" altLang="zh-TW" sz="2800"/>
+                        <a:t>X</a:t>
+                      </a:r>
+                      <a:endParaRPr lang="zh-TW" altLang="en-US" sz="2800"/>
+                    </a:p>
+                  </a:txBody>
+                  <a:tcPr anchor="ctr"/>
+                </a:tc>
+                <a:tc>
+                  <a:txBody>
+                    <a:bodyPr/>
+                    <a:lstStyle/>
+                    <a:p>
+                      <a:pPr algn="ctr"/>
+                      <a:endParaRPr lang="zh-TW" altLang="en-US" sz="2800"/>
+                    </a:p>
+                  </a:txBody>
+                  <a:tcPr anchor="ctr"/>
+                </a:tc>
+                <a:tc>
+                  <a:txBody>
+                    <a:bodyPr/>
+                    <a:lstStyle/>
+                    <a:p>
+                      <a:pPr algn="ctr"/>
+                      <a:endParaRPr lang="zh-TW" altLang="en-US" sz="2800"/>
+                    </a:p>
+                  </a:txBody>
+                  <a:tcPr anchor="ctr"/>
+                </a:tc>
+                <a:extLst>
+                  <a:ext uri="{0D108BD9-81ED-4DB2-BD59-A6C34878D82A}">
+                    <a16:rowId xmlns:a16="http://schemas.microsoft.com/office/drawing/2014/main" val="4104587496"/>
+                  </a:ext>
+                </a:extLst>
+              </a:tr>
+              <a:tr h="370840">
+                <a:tc>
+                  <a:txBody>
+                    <a:bodyPr/>
+                    <a:lstStyle/>
+                    <a:p>
+                      <a:r>
+                        <a:rPr lang="en-US" altLang="zh-TW" sz="2800"/>
+                        <a:t>str</a:t>
+                      </a:r>
+                      <a:endParaRPr lang="zh-TW" altLang="en-US" sz="2800"/>
+                    </a:p>
+                  </a:txBody>
+                  <a:tcPr anchor="ctr"/>
+                </a:tc>
+                <a:tc>
+                  <a:txBody>
+                    <a:bodyPr/>
+                    <a:lstStyle/>
+                    <a:p>
+                      <a:pPr algn="ctr"/>
+                      <a:r>
+                        <a:rPr lang="zh-TW" altLang="en-US" sz="2800"/>
+                        <a:t>字串</a:t>
+                      </a:r>
+                    </a:p>
+                  </a:txBody>
+                  <a:tcPr anchor="ctr"/>
+                </a:tc>
+                <a:tc>
+                  <a:txBody>
+                    <a:bodyPr/>
+                    <a:lstStyle/>
+                    <a:p>
+                      <a:pPr algn="ctr"/>
+                      <a:r>
+                        <a:rPr lang="en-US" altLang="zh-TW" sz="2800"/>
+                        <a:t>X</a:t>
+                      </a:r>
+                      <a:endParaRPr lang="zh-TW" altLang="en-US" sz="2800"/>
+                    </a:p>
+                  </a:txBody>
+                  <a:tcPr anchor="ctr"/>
+                </a:tc>
+                <a:tc>
+                  <a:txBody>
+                    <a:bodyPr/>
+                    <a:lstStyle/>
+                    <a:p>
+                      <a:pPr algn="ctr"/>
+                      <a:r>
+                        <a:rPr lang="en-US" altLang="zh-TW" sz="2800"/>
+                        <a:t>O</a:t>
+                      </a:r>
+                      <a:endParaRPr lang="zh-TW" altLang="en-US" sz="2800"/>
+                    </a:p>
+                  </a:txBody>
+                  <a:tcPr anchor="ctr"/>
+                </a:tc>
+                <a:tc>
+                  <a:txBody>
+                    <a:bodyPr/>
+                    <a:lstStyle/>
+                    <a:p>
+                      <a:pPr algn="ctr"/>
+                      <a:r>
+                        <a:rPr lang="en-US" altLang="zh-TW" sz="2800"/>
+                        <a:t>X</a:t>
+                      </a:r>
+                      <a:endParaRPr lang="zh-TW" altLang="en-US" sz="2800"/>
+                    </a:p>
+                  </a:txBody>
+                  <a:tcPr anchor="ctr"/>
+                </a:tc>
+                <a:extLst>
+                  <a:ext uri="{0D108BD9-81ED-4DB2-BD59-A6C34878D82A}">
+                    <a16:rowId xmlns:a16="http://schemas.microsoft.com/office/drawing/2014/main" val="861416617"/>
+                  </a:ext>
+                </a:extLst>
+              </a:tr>
+              <a:tr h="370840">
+                <a:tc>
+                  <a:txBody>
+                    <a:bodyPr/>
+                    <a:lstStyle/>
+                    <a:p>
+                      <a:r>
+                        <a:rPr lang="en-US" altLang="zh-TW" sz="2800"/>
+                        <a:t>list</a:t>
+                      </a:r>
+                      <a:endParaRPr lang="zh-TW" altLang="en-US" sz="2800"/>
+                    </a:p>
+                  </a:txBody>
+                  <a:tcPr anchor="ctr"/>
+                </a:tc>
+                <a:tc>
+                  <a:txBody>
+                    <a:bodyPr/>
+                    <a:lstStyle/>
+                    <a:p>
+                      <a:pPr algn="ctr"/>
+                      <a:r>
+                        <a:rPr lang="zh-TW" altLang="en-US" sz="2800"/>
+                        <a:t>串列</a:t>
+                      </a:r>
+                    </a:p>
+                  </a:txBody>
+                  <a:tcPr anchor="ctr"/>
+                </a:tc>
+                <a:tc>
+                  <a:txBody>
+                    <a:bodyPr/>
+                    <a:lstStyle/>
+                    <a:p>
+                      <a:pPr algn="ctr"/>
+                      <a:r>
+                        <a:rPr lang="en-US" altLang="zh-TW" sz="2800"/>
+                        <a:t>O</a:t>
+                      </a:r>
+                      <a:endParaRPr lang="zh-TW" altLang="en-US" sz="2800"/>
+                    </a:p>
+                  </a:txBody>
+                  <a:tcPr anchor="ctr"/>
+                </a:tc>
+                <a:tc>
+                  <a:txBody>
+                    <a:bodyPr/>
+                    <a:lstStyle/>
+                    <a:p>
+                      <a:pPr algn="ctr"/>
+                      <a:r>
+                        <a:rPr lang="en-US" altLang="zh-TW" sz="2800"/>
+                        <a:t>O</a:t>
+                      </a:r>
+                      <a:endParaRPr lang="zh-TW" altLang="en-US" sz="2800"/>
+                    </a:p>
+                  </a:txBody>
+                  <a:tcPr anchor="ctr"/>
+                </a:tc>
+                <a:tc>
+                  <a:txBody>
+                    <a:bodyPr/>
+                    <a:lstStyle/>
+                    <a:p>
+                      <a:pPr algn="ctr"/>
+                      <a:r>
+                        <a:rPr lang="en-US" altLang="zh-TW" sz="2800"/>
+                        <a:t>X</a:t>
+                      </a:r>
+                      <a:endParaRPr lang="zh-TW" altLang="en-US" sz="2800"/>
+                    </a:p>
+                  </a:txBody>
+                  <a:tcPr anchor="ctr"/>
+                </a:tc>
+                <a:extLst>
+                  <a:ext uri="{0D108BD9-81ED-4DB2-BD59-A6C34878D82A}">
+                    <a16:rowId xmlns:a16="http://schemas.microsoft.com/office/drawing/2014/main" val="1903072542"/>
+                  </a:ext>
+                </a:extLst>
+              </a:tr>
+              <a:tr h="370840">
+                <a:tc>
+                  <a:txBody>
+                    <a:bodyPr/>
+                    <a:lstStyle/>
+                    <a:p>
+                      <a:r>
+                        <a:rPr lang="en-US" altLang="zh-TW" sz="2800"/>
+                        <a:t>tuple</a:t>
+                      </a:r>
+                      <a:endParaRPr lang="zh-TW" altLang="en-US" sz="2800"/>
+                    </a:p>
+                  </a:txBody>
+                  <a:tcPr anchor="ctr"/>
+                </a:tc>
+                <a:tc>
+                  <a:txBody>
+                    <a:bodyPr/>
+                    <a:lstStyle/>
+                    <a:p>
+                      <a:pPr algn="ctr"/>
+                      <a:r>
+                        <a:rPr lang="zh-TW" altLang="en-US" sz="2800"/>
+                        <a:t>元組</a:t>
+                      </a:r>
+                    </a:p>
+                  </a:txBody>
+                  <a:tcPr anchor="ctr"/>
+                </a:tc>
+                <a:tc>
+                  <a:txBody>
+                    <a:bodyPr/>
+                    <a:lstStyle/>
+                    <a:p>
+                      <a:pPr algn="ctr"/>
+                      <a:r>
+                        <a:rPr lang="en-US" altLang="zh-TW" sz="2800"/>
+                        <a:t>X</a:t>
+                      </a:r>
+                      <a:endParaRPr lang="zh-TW" altLang="en-US" sz="2800"/>
+                    </a:p>
+                  </a:txBody>
+                  <a:tcPr anchor="ctr"/>
+                </a:tc>
+                <a:tc>
+                  <a:txBody>
+                    <a:bodyPr/>
+                    <a:lstStyle/>
+                    <a:p>
+                      <a:pPr algn="ctr"/>
+                      <a:r>
+                        <a:rPr lang="en-US" altLang="zh-TW" sz="2800"/>
+                        <a:t>O</a:t>
+                      </a:r>
+                      <a:endParaRPr lang="zh-TW" altLang="en-US" sz="2800"/>
+                    </a:p>
+                  </a:txBody>
+                  <a:tcPr anchor="ctr"/>
+                </a:tc>
+                <a:tc>
+                  <a:txBody>
+                    <a:bodyPr/>
+                    <a:lstStyle/>
+                    <a:p>
+                      <a:pPr algn="ctr"/>
+                      <a:r>
+                        <a:rPr lang="en-US" altLang="zh-TW" sz="2800"/>
+                        <a:t>X</a:t>
+                      </a:r>
+                      <a:endParaRPr lang="zh-TW" altLang="en-US" sz="2800"/>
+                    </a:p>
+                  </a:txBody>
+                  <a:tcPr anchor="ctr"/>
+                </a:tc>
+                <a:extLst>
+                  <a:ext uri="{0D108BD9-81ED-4DB2-BD59-A6C34878D82A}">
+                    <a16:rowId xmlns:a16="http://schemas.microsoft.com/office/drawing/2014/main" val="2951912159"/>
+                  </a:ext>
+                </a:extLst>
+              </a:tr>
+              <a:tr h="370840">
+                <a:tc>
+                  <a:txBody>
+                    <a:bodyPr/>
+                    <a:lstStyle/>
+                    <a:p>
+                      <a:r>
+                        <a:rPr lang="en-US" altLang="zh-TW" sz="2800"/>
+                        <a:t>set</a:t>
+                      </a:r>
+                      <a:endParaRPr lang="zh-TW" altLang="en-US" sz="2800"/>
+                    </a:p>
+                  </a:txBody>
+                  <a:tcPr anchor="ctr"/>
+                </a:tc>
+                <a:tc>
+                  <a:txBody>
+                    <a:bodyPr/>
+                    <a:lstStyle/>
+                    <a:p>
+                      <a:pPr algn="ctr"/>
+                      <a:r>
+                        <a:rPr lang="zh-TW" altLang="en-US" sz="2800"/>
+                        <a:t>集合</a:t>
+                      </a:r>
+                    </a:p>
+                  </a:txBody>
+                  <a:tcPr anchor="ctr"/>
+                </a:tc>
+                <a:tc>
+                  <a:txBody>
+                    <a:bodyPr/>
+                    <a:lstStyle/>
+                    <a:p>
+                      <a:pPr algn="ctr"/>
+                      <a:r>
+                        <a:rPr lang="en-US" altLang="zh-TW" sz="2800"/>
+                        <a:t>O</a:t>
+                      </a:r>
+                      <a:endParaRPr lang="zh-TW" altLang="en-US" sz="2800"/>
+                    </a:p>
+                  </a:txBody>
+                  <a:tcPr anchor="ctr"/>
+                </a:tc>
+                <a:tc>
+                  <a:txBody>
+                    <a:bodyPr/>
+                    <a:lstStyle/>
+                    <a:p>
+                      <a:pPr algn="ctr"/>
+                      <a:r>
+                        <a:rPr lang="en-US" altLang="zh-TW" sz="2800"/>
+                        <a:t>X</a:t>
+                      </a:r>
+                      <a:endParaRPr lang="zh-TW" altLang="en-US" sz="2800"/>
+                    </a:p>
+                  </a:txBody>
+                  <a:tcPr anchor="ctr"/>
+                </a:tc>
+                <a:tc>
+                  <a:txBody>
+                    <a:bodyPr/>
+                    <a:lstStyle/>
+                    <a:p>
+                      <a:pPr algn="ctr"/>
+                      <a:r>
+                        <a:rPr lang="en-US" altLang="zh-TW" sz="2800"/>
+                        <a:t>O</a:t>
+                      </a:r>
+                      <a:endParaRPr lang="zh-TW" altLang="en-US" sz="2800"/>
+                    </a:p>
+                  </a:txBody>
+                  <a:tcPr anchor="ctr"/>
+                </a:tc>
+                <a:extLst>
+                  <a:ext uri="{0D108BD9-81ED-4DB2-BD59-A6C34878D82A}">
+                    <a16:rowId xmlns:a16="http://schemas.microsoft.com/office/drawing/2014/main" val="823947420"/>
+                  </a:ext>
+                </a:extLst>
+              </a:tr>
+              <a:tr h="370840">
+                <a:tc>
+                  <a:txBody>
+                    <a:bodyPr/>
+                    <a:lstStyle/>
+                    <a:p>
+                      <a:r>
+                        <a:rPr lang="en-US" altLang="zh-TW" sz="2800"/>
+                        <a:t>dict</a:t>
+                      </a:r>
+                      <a:endParaRPr lang="zh-TW" altLang="en-US" sz="2800"/>
+                    </a:p>
+                  </a:txBody>
+                  <a:tcPr anchor="ctr"/>
+                </a:tc>
+                <a:tc>
+                  <a:txBody>
+                    <a:bodyPr/>
+                    <a:lstStyle/>
+                    <a:p>
+                      <a:pPr algn="ctr"/>
+                      <a:r>
+                        <a:rPr lang="zh-TW" altLang="en-US" sz="2800"/>
+                        <a:t>字典</a:t>
+                      </a:r>
+                    </a:p>
+                  </a:txBody>
+                  <a:tcPr anchor="ctr"/>
+                </a:tc>
+                <a:tc>
+                  <a:txBody>
+                    <a:bodyPr/>
+                    <a:lstStyle/>
+                    <a:p>
+                      <a:pPr algn="ctr"/>
+                      <a:r>
+                        <a:rPr lang="en-US" altLang="zh-TW" sz="2800"/>
+                        <a:t>O</a:t>
+                      </a:r>
+                      <a:endParaRPr lang="zh-TW" altLang="en-US" sz="2800"/>
+                    </a:p>
+                  </a:txBody>
+                  <a:tcPr anchor="ctr"/>
+                </a:tc>
+                <a:tc>
+                  <a:txBody>
+                    <a:bodyPr/>
+                    <a:lstStyle/>
+                    <a:p>
+                      <a:pPr algn="ctr"/>
+                      <a:r>
+                        <a:rPr lang="en-US" altLang="zh-TW" sz="2800"/>
+                        <a:t>X</a:t>
+                      </a:r>
+                      <a:endParaRPr lang="zh-TW" altLang="en-US" sz="2800"/>
+                    </a:p>
+                  </a:txBody>
+                  <a:tcPr anchor="ctr"/>
+                </a:tc>
+                <a:tc>
+                  <a:txBody>
+                    <a:bodyPr/>
+                    <a:lstStyle/>
+                    <a:p>
+                      <a:pPr algn="ctr"/>
+                      <a:r>
+                        <a:rPr lang="en-US" altLang="zh-TW" sz="2800"/>
+                        <a:t>O(key)</a:t>
+                      </a:r>
+                      <a:endParaRPr lang="zh-TW" altLang="en-US" sz="2800"/>
+                    </a:p>
+                  </a:txBody>
+                  <a:tcPr anchor="ctr"/>
+                </a:tc>
+                <a:extLst>
+                  <a:ext uri="{0D108BD9-81ED-4DB2-BD59-A6C34878D82A}">
+                    <a16:rowId xmlns:a16="http://schemas.microsoft.com/office/drawing/2014/main" val="4235796644"/>
+                  </a:ext>
+                </a:extLst>
+              </a:tr>
+            </a:tbl>
+          </a:graphicData>
+        </a:graphic>
+      </p:graphicFrame>
+    </p:spTree>
+    <p:extLst>
+      <p:ext uri="{BB962C8B-B14F-4D97-AF65-F5344CB8AC3E}">
+        <p14:creationId xmlns:p14="http://schemas.microsoft.com/office/powerpoint/2010/main" val="458518838"/>
+      </p:ext>
+    </p:extLst>
+  </p:cSld>
+  <p:clrMapOvr>
+    <a:masterClrMapping/>
+  </p:clrMapOvr>
+</p:sld>
+</file>
+
+<file path=ppt/slides/slide15.xml><?xml version="1.0" encoding="utf-8"?>
+<p:sld xmlns:a="http://schemas.openxmlformats.org/drawingml/2006/main" xmlns:r="http://schemas.openxmlformats.org/officeDocument/2006/relationships" xmlns:p="http://schemas.openxmlformats.org/presentationml/2006/main">
+  <p:cSld>
+    <p:spTree>
+      <p:nvGrpSpPr>
+        <p:cNvPr id="1" name=""/>
+        <p:cNvGrpSpPr/>
+        <p:nvPr/>
+      </p:nvGrpSpPr>
+      <p:grpSpPr>
+        <a:xfrm>
+          <a:off x="0" y="0"/>
+          <a:ext cx="0" cy="0"/>
+          <a:chOff x="0" y="0"/>
+          <a:chExt cx="0" cy="0"/>
+        </a:xfrm>
+      </p:grpSpPr>
+      <p:sp>
+        <p:nvSpPr>
+          <p:cNvPr id="2" name="標題 1">
+            <a:extLst>
+              <a:ext uri="{FF2B5EF4-FFF2-40B4-BE49-F238E27FC236}">
+                <a16:creationId xmlns:a16="http://schemas.microsoft.com/office/drawing/2014/main" id="{19ADA1AA-0BFF-49E0-93CC-6F556BB06194}"/>
+              </a:ext>
+            </a:extLst>
+          </p:cNvPr>
+          <p:cNvSpPr>
+            <a:spLocks noGrp="1"/>
+          </p:cNvSpPr>
+          <p:nvPr>
+            <p:ph type="title"/>
+          </p:nvPr>
+        </p:nvSpPr>
+        <p:spPr/>
+        <p:txBody>
+          <a:bodyPr/>
+          <a:lstStyle/>
+          <a:p>
+            <a:r>
+              <a:rPr lang="en-US" altLang="zh-TW" b="1"/>
+              <a:t>immutable </a:t>
+            </a:r>
+            <a:r>
+              <a:rPr lang="zh-TW" altLang="en-US" b="1"/>
+              <a:t>與 </a:t>
+            </a:r>
+            <a:r>
+              <a:rPr lang="en-US" altLang="zh-TW" b="1"/>
+              <a:t>mutable</a:t>
+            </a:r>
+            <a:endParaRPr lang="zh-TW" altLang="en-US"/>
+          </a:p>
+        </p:txBody>
+      </p:sp>
+      <p:sp>
+        <p:nvSpPr>
+          <p:cNvPr id="3" name="內容版面配置區 2">
+            <a:extLst>
+              <a:ext uri="{FF2B5EF4-FFF2-40B4-BE49-F238E27FC236}">
+                <a16:creationId xmlns:a16="http://schemas.microsoft.com/office/drawing/2014/main" id="{DAB2B79E-9452-434C-9B8B-F1094EC0B6AD}"/>
+              </a:ext>
+            </a:extLst>
+          </p:cNvPr>
+          <p:cNvSpPr>
+            <a:spLocks noGrp="1"/>
+          </p:cNvSpPr>
+          <p:nvPr>
+            <p:ph idx="1"/>
+          </p:nvPr>
+        </p:nvSpPr>
+        <p:spPr/>
+        <p:txBody>
+          <a:bodyPr>
+            <a:normAutofit/>
+          </a:bodyPr>
+          <a:lstStyle/>
+          <a:p>
+            <a:pPr marL="0" indent="0">
+              <a:buNone/>
+            </a:pPr>
+            <a:endParaRPr lang="en-US" altLang="zh-TW" sz="2800"/>
+          </a:p>
+          <a:p>
+            <a:pPr marL="0" indent="0">
+              <a:buNone/>
+            </a:pPr>
+            <a:r>
+              <a:rPr lang="zh-TW" altLang="en-US" sz="2800"/>
+              <a:t>對 </a:t>
+            </a:r>
+            <a:r>
+              <a:rPr lang="en-US" altLang="zh-TW" sz="2800"/>
+              <a:t>immutable </a:t>
+            </a:r>
+            <a:r>
+              <a:rPr lang="zh-TW" altLang="en-US" sz="2800"/>
+              <a:t>物件運算：</a:t>
+            </a:r>
+            <a:endParaRPr lang="en-US" altLang="zh-TW" sz="2800"/>
+          </a:p>
+          <a:p>
+            <a:pPr marL="0" indent="0">
+              <a:buNone/>
+            </a:pPr>
+            <a:r>
+              <a:rPr lang="en-US" altLang="zh-TW" sz="2800"/>
+              <a:t>	</a:t>
+            </a:r>
+            <a:r>
+              <a:rPr lang="zh-TW" altLang="en-US" sz="2800"/>
+              <a:t>指派新位置</a:t>
+            </a:r>
+            <a:endParaRPr lang="en-US" altLang="zh-TW" sz="2800"/>
+          </a:p>
+          <a:p>
+            <a:pPr marL="0" indent="0">
+              <a:buNone/>
+            </a:pPr>
+            <a:endParaRPr lang="en-US" altLang="zh-TW" sz="2800"/>
+          </a:p>
+          <a:p>
+            <a:pPr marL="0" indent="0">
+              <a:buNone/>
+            </a:pPr>
+            <a:r>
+              <a:rPr lang="zh-TW" altLang="en-US" sz="2800"/>
+              <a:t>對 </a:t>
+            </a:r>
+            <a:r>
+              <a:rPr lang="en-US" altLang="zh-TW" sz="2800"/>
+              <a:t>mutable </a:t>
+            </a:r>
+            <a:r>
+              <a:rPr lang="zh-TW" altLang="en-US" sz="2800"/>
+              <a:t>物件運算：</a:t>
+            </a:r>
+            <a:endParaRPr lang="en-US" altLang="zh-TW" sz="2800"/>
+          </a:p>
+          <a:p>
+            <a:pPr marL="0" indent="0">
+              <a:buNone/>
+            </a:pPr>
+            <a:r>
+              <a:rPr lang="en-US" altLang="zh-TW" sz="2800"/>
+              <a:t>	</a:t>
+            </a:r>
+            <a:r>
+              <a:rPr lang="zh-TW" altLang="en-US" sz="2800"/>
+              <a:t>在原有位置上變更</a:t>
+            </a:r>
+            <a:endParaRPr lang="en-US" altLang="zh-TW" sz="2800"/>
+          </a:p>
+        </p:txBody>
+      </p:sp>
+    </p:spTree>
+    <p:extLst>
+      <p:ext uri="{BB962C8B-B14F-4D97-AF65-F5344CB8AC3E}">
+        <p14:creationId xmlns:p14="http://schemas.microsoft.com/office/powerpoint/2010/main" val="3762000469"/>
+      </p:ext>
+    </p:extLst>
+  </p:cSld>
+  <p:clrMapOvr>
+    <a:masterClrMapping/>
+  </p:clrMapOvr>
+</p:sld>
+</file>
+
+<file path=ppt/slides/slide16.xml><?xml version="1.0" encoding="utf-8"?>
+<p:sld xmlns:a="http://schemas.openxmlformats.org/drawingml/2006/main" xmlns:r="http://schemas.openxmlformats.org/officeDocument/2006/relationships" xmlns:p="http://schemas.openxmlformats.org/presentationml/2006/main">
+  <p:cSld>
+    <p:spTree>
+      <p:nvGrpSpPr>
+        <p:cNvPr id="1" name=""/>
+        <p:cNvGrpSpPr/>
+        <p:nvPr/>
+      </p:nvGrpSpPr>
+      <p:grpSpPr>
+        <a:xfrm>
+          <a:off x="0" y="0"/>
+          <a:ext cx="0" cy="0"/>
+          <a:chOff x="0" y="0"/>
+          <a:chExt cx="0" cy="0"/>
+        </a:xfrm>
+      </p:grpSpPr>
+      <p:sp>
+        <p:nvSpPr>
+          <p:cNvPr id="2" name="標題 1">
+            <a:extLst>
+              <a:ext uri="{FF2B5EF4-FFF2-40B4-BE49-F238E27FC236}">
+                <a16:creationId xmlns:a16="http://schemas.microsoft.com/office/drawing/2014/main" id="{19ADA1AA-0BFF-49E0-93CC-6F556BB06194}"/>
+              </a:ext>
+            </a:extLst>
+          </p:cNvPr>
+          <p:cNvSpPr>
+            <a:spLocks noGrp="1"/>
+          </p:cNvSpPr>
+          <p:nvPr>
+            <p:ph type="title"/>
+          </p:nvPr>
+        </p:nvSpPr>
+        <p:spPr/>
+        <p:txBody>
+          <a:bodyPr/>
+          <a:lstStyle/>
+          <a:p>
+            <a:r>
+              <a:rPr lang="zh-TW" altLang="en-US"/>
+              <a:t>函數傳址不傳值</a:t>
+            </a:r>
+          </a:p>
+        </p:txBody>
+      </p:sp>
+      <p:sp>
+        <p:nvSpPr>
+          <p:cNvPr id="3" name="內容版面配置區 2">
+            <a:extLst>
+              <a:ext uri="{FF2B5EF4-FFF2-40B4-BE49-F238E27FC236}">
+                <a16:creationId xmlns:a16="http://schemas.microsoft.com/office/drawing/2014/main" id="{DAB2B79E-9452-434C-9B8B-F1094EC0B6AD}"/>
+              </a:ext>
+            </a:extLst>
+          </p:cNvPr>
+          <p:cNvSpPr>
+            <a:spLocks noGrp="1"/>
+          </p:cNvSpPr>
+          <p:nvPr>
+            <p:ph idx="1"/>
+          </p:nvPr>
+        </p:nvSpPr>
+        <p:spPr/>
+        <p:txBody>
+          <a:bodyPr>
+            <a:normAutofit/>
+          </a:bodyPr>
+          <a:lstStyle/>
+          <a:p>
+            <a:pPr marL="0" indent="0">
+              <a:buNone/>
+            </a:pPr>
+            <a:endParaRPr lang="en-US" altLang="zh-TW" sz="2800"/>
+          </a:p>
+          <a:p>
+            <a:pPr marL="0" indent="0">
+              <a:buNone/>
+            </a:pPr>
+            <a:r>
+              <a:rPr lang="zh-TW" altLang="en-US" sz="2800"/>
+              <a:t>對 </a:t>
+            </a:r>
+            <a:r>
+              <a:rPr lang="en-US" altLang="zh-TW" sz="2800"/>
+              <a:t>immutable </a:t>
+            </a:r>
+            <a:r>
+              <a:rPr lang="zh-TW" altLang="en-US" sz="2800"/>
+              <a:t>物件運算：</a:t>
+            </a:r>
+            <a:endParaRPr lang="en-US" altLang="zh-TW" sz="2800"/>
+          </a:p>
+          <a:p>
+            <a:pPr marL="0" indent="0">
+              <a:buNone/>
+            </a:pPr>
+            <a:r>
+              <a:rPr lang="en-US" altLang="zh-TW" sz="2800"/>
+              <a:t>	</a:t>
+            </a:r>
+            <a:r>
+              <a:rPr lang="zh-TW" altLang="en-US" sz="2800"/>
+              <a:t>指派新位置 → </a:t>
+            </a:r>
+            <a:r>
+              <a:rPr lang="zh-TW" altLang="en-US" sz="2800">
+                <a:solidFill>
+                  <a:srgbClr val="FF0000"/>
+                </a:solidFill>
+              </a:rPr>
+              <a:t>不影響原物件</a:t>
+            </a:r>
+            <a:endParaRPr lang="en-US" altLang="zh-TW" sz="2800">
+              <a:solidFill>
+                <a:srgbClr val="FF0000"/>
+              </a:solidFill>
+            </a:endParaRPr>
+          </a:p>
+          <a:p>
+            <a:pPr marL="0" indent="0">
+              <a:buNone/>
+            </a:pPr>
+            <a:endParaRPr lang="en-US" altLang="zh-TW" sz="2800"/>
+          </a:p>
+          <a:p>
+            <a:pPr marL="0" indent="0">
+              <a:buNone/>
+            </a:pPr>
+            <a:r>
+              <a:rPr lang="zh-TW" altLang="en-US" sz="2800"/>
+              <a:t>對 </a:t>
+            </a:r>
+            <a:r>
+              <a:rPr lang="en-US" altLang="zh-TW" sz="2800"/>
+              <a:t>mutable </a:t>
+            </a:r>
+            <a:r>
+              <a:rPr lang="zh-TW" altLang="en-US" sz="2800"/>
+              <a:t>物件運算：</a:t>
+            </a:r>
+            <a:endParaRPr lang="en-US" altLang="zh-TW" sz="2800"/>
+          </a:p>
+          <a:p>
+            <a:pPr marL="0" indent="0">
+              <a:buNone/>
+            </a:pPr>
+            <a:r>
+              <a:rPr lang="en-US" altLang="zh-TW" sz="2800"/>
+              <a:t>	</a:t>
+            </a:r>
+            <a:r>
+              <a:rPr lang="zh-TW" altLang="en-US" sz="2800"/>
+              <a:t>在原有位置上變更 → </a:t>
+            </a:r>
+            <a:r>
+              <a:rPr lang="zh-TW" altLang="en-US" sz="2800">
+                <a:solidFill>
+                  <a:srgbClr val="FF0000"/>
+                </a:solidFill>
+              </a:rPr>
+              <a:t>會更動原物件</a:t>
+            </a:r>
+            <a:endParaRPr lang="en-US" altLang="zh-TW" sz="2800">
+              <a:solidFill>
+                <a:srgbClr val="FF0000"/>
+              </a:solidFill>
+            </a:endParaRPr>
+          </a:p>
+        </p:txBody>
+      </p:sp>
+    </p:spTree>
+    <p:extLst>
+      <p:ext uri="{BB962C8B-B14F-4D97-AF65-F5344CB8AC3E}">
+        <p14:creationId xmlns:p14="http://schemas.microsoft.com/office/powerpoint/2010/main" val="2656450676"/>
+      </p:ext>
+    </p:extLst>
+  </p:cSld>
+  <p:clrMapOvr>
+    <a:masterClrMapping/>
+  </p:clrMapOvr>
+</p:sld>
+</file>
+
+<file path=ppt/slides/slide17.xml><?xml version="1.0" encoding="utf-8"?>
+<p:sld xmlns:a="http://schemas.openxmlformats.org/drawingml/2006/main" xmlns:r="http://schemas.openxmlformats.org/officeDocument/2006/relationships" xmlns:p="http://schemas.openxmlformats.org/presentationml/2006/main">
+  <p:cSld>
+    <p:spTree>
+      <p:nvGrpSpPr>
+        <p:cNvPr id="1" name=""/>
+        <p:cNvGrpSpPr/>
+        <p:nvPr/>
+      </p:nvGrpSpPr>
+      <p:grpSpPr>
+        <a:xfrm>
+          <a:off x="0" y="0"/>
+          <a:ext cx="0" cy="0"/>
+          <a:chOff x="0" y="0"/>
+          <a:chExt cx="0" cy="0"/>
+        </a:xfrm>
+      </p:grpSpPr>
+      <p:sp>
+        <p:nvSpPr>
+          <p:cNvPr id="2" name="標題 1">
+            <a:extLst>
+              <a:ext uri="{FF2B5EF4-FFF2-40B4-BE49-F238E27FC236}">
+                <a16:creationId xmlns:a16="http://schemas.microsoft.com/office/drawing/2014/main" id="{8E2A5E75-4DC0-46A2-A9B6-B23781BEC620}"/>
+              </a:ext>
+            </a:extLst>
+          </p:cNvPr>
+          <p:cNvSpPr>
+            <a:spLocks noGrp="1"/>
+          </p:cNvSpPr>
+          <p:nvPr>
+            <p:ph type="title"/>
+          </p:nvPr>
+        </p:nvSpPr>
+        <p:spPr/>
+        <p:txBody>
+          <a:bodyPr>
+            <a:normAutofit/>
+          </a:bodyPr>
+          <a:lstStyle/>
+          <a:p>
+            <a:r>
+              <a:rPr lang="zh-TW" altLang="en-US"/>
+              <a:t>淺拷貝與深拷貝 </a:t>
+            </a:r>
+            <a:r>
+              <a:rPr lang="en-US" altLang="zh-TW" sz="3200"/>
+              <a:t>shallow copy / deep copy</a:t>
+            </a:r>
+            <a:endParaRPr lang="zh-TW" altLang="en-US"/>
+          </a:p>
+        </p:txBody>
+      </p:sp>
+      <p:sp>
+        <p:nvSpPr>
+          <p:cNvPr id="3" name="內容版面配置區 2">
+            <a:extLst>
+              <a:ext uri="{FF2B5EF4-FFF2-40B4-BE49-F238E27FC236}">
+                <a16:creationId xmlns:a16="http://schemas.microsoft.com/office/drawing/2014/main" id="{401FFCCF-09D6-4C24-A97F-905C49F82990}"/>
+              </a:ext>
+            </a:extLst>
+          </p:cNvPr>
+          <p:cNvSpPr>
+            <a:spLocks noGrp="1"/>
+          </p:cNvSpPr>
+          <p:nvPr>
+            <p:ph idx="1"/>
+          </p:nvPr>
+        </p:nvSpPr>
+        <p:spPr>
+          <a:xfrm>
+            <a:off x="1261872" y="1828800"/>
+            <a:ext cx="9178572" cy="4351337"/>
+          </a:xfrm>
+        </p:spPr>
+        <p:txBody>
+          <a:bodyPr>
+            <a:normAutofit/>
+          </a:bodyPr>
+          <a:lstStyle/>
+          <a:p>
+            <a:pPr marL="0" indent="0">
+              <a:buNone/>
+            </a:pPr>
+            <a:endParaRPr lang="en-US" altLang="zh-TW" sz="2800"/>
+          </a:p>
+          <a:p>
+            <a:pPr marL="0" indent="0">
+              <a:buNone/>
+            </a:pPr>
+            <a:r>
+              <a:rPr lang="zh-TW" altLang="en-US" sz="2800"/>
+              <a:t>淺拷貝 </a:t>
+            </a:r>
+            <a:r>
+              <a:rPr lang="en-US" altLang="zh-TW" sz="2800"/>
+              <a:t>shallow copy</a:t>
+            </a:r>
+            <a:r>
+              <a:rPr lang="zh-TW" altLang="en-US" sz="2800"/>
+              <a:t>：</a:t>
+            </a:r>
+            <a:endParaRPr lang="en-US" altLang="zh-TW" sz="2800"/>
+          </a:p>
+          <a:p>
+            <a:pPr marL="0" indent="0">
+              <a:buNone/>
+            </a:pPr>
+            <a:r>
+              <a:rPr lang="en-US" altLang="zh-TW" sz="2800"/>
+              <a:t>	</a:t>
+            </a:r>
+            <a:r>
+              <a:rPr lang="zh-TW" altLang="en-US" sz="2800"/>
+              <a:t>將容器中所有</a:t>
+            </a:r>
+            <a:r>
+              <a:rPr lang="zh-TW" altLang="en-US" sz="2800" u="sng"/>
+              <a:t>元素</a:t>
+            </a:r>
+            <a:r>
+              <a:rPr lang="zh-TW" altLang="en-US" sz="2800"/>
+              <a:t>的位址複製到新位址</a:t>
+            </a:r>
+            <a:endParaRPr lang="en-US" altLang="zh-TW" sz="2800"/>
+          </a:p>
+          <a:p>
+            <a:pPr marL="0" indent="0">
+              <a:buNone/>
+            </a:pPr>
+            <a:endParaRPr lang="en-US" altLang="zh-TW" sz="2800"/>
+          </a:p>
+          <a:p>
+            <a:pPr marL="0" indent="0">
+              <a:buNone/>
+            </a:pPr>
+            <a:r>
+              <a:rPr lang="zh-TW" altLang="en-US" sz="2800"/>
+              <a:t>深拷貝 </a:t>
+            </a:r>
+            <a:r>
+              <a:rPr lang="en-US" altLang="zh-TW" sz="2800"/>
+              <a:t>deep copy</a:t>
+            </a:r>
+            <a:r>
+              <a:rPr lang="zh-TW" altLang="en-US" sz="2800"/>
+              <a:t>：</a:t>
+            </a:r>
+            <a:endParaRPr lang="en-US" altLang="zh-TW" sz="2800"/>
+          </a:p>
+          <a:p>
+            <a:pPr marL="0" indent="0">
+              <a:buNone/>
+            </a:pPr>
+            <a:r>
+              <a:rPr lang="en-US" altLang="zh-TW" sz="2800"/>
+              <a:t>	</a:t>
+            </a:r>
+            <a:r>
+              <a:rPr lang="zh-TW" altLang="en-US" sz="2800"/>
+              <a:t>將容器中所有</a:t>
+            </a:r>
+            <a:r>
+              <a:rPr lang="zh-TW" altLang="en-US" sz="2800" u="sng"/>
+              <a:t>元素</a:t>
+            </a:r>
+            <a:r>
+              <a:rPr lang="zh-TW" altLang="en-US" sz="2800"/>
+              <a:t>與</a:t>
+            </a:r>
+            <a:r>
+              <a:rPr lang="zh-TW" altLang="en-US" sz="2800" u="sng"/>
+              <a:t>元素中的元素</a:t>
+            </a:r>
+            <a:r>
+              <a:rPr lang="zh-TW" altLang="en-US" sz="2800"/>
+              <a:t>複製到新位址</a:t>
+            </a:r>
+            <a:endParaRPr lang="zh-TW" altLang="en-US" sz="2800" u="sng"/>
+          </a:p>
+        </p:txBody>
+      </p:sp>
+    </p:spTree>
+    <p:extLst>
+      <p:ext uri="{BB962C8B-B14F-4D97-AF65-F5344CB8AC3E}">
+        <p14:creationId xmlns:p14="http://schemas.microsoft.com/office/powerpoint/2010/main" val="426085872"/>
+      </p:ext>
+    </p:extLst>
+  </p:cSld>
+  <p:clrMapOvr>
+    <a:masterClrMapping/>
+  </p:clrMapOvr>
+</p:sld>
+</file>
+
+<file path=ppt/slides/slide18.xml><?xml version="1.0" encoding="utf-8"?>
+<p:sld xmlns:a="http://schemas.openxmlformats.org/drawingml/2006/main" xmlns:r="http://schemas.openxmlformats.org/officeDocument/2006/relationships" xmlns:p="http://schemas.openxmlformats.org/presentationml/2006/main">
+  <p:cSld>
+    <p:spTree>
+      <p:nvGrpSpPr>
+        <p:cNvPr id="1" name=""/>
+        <p:cNvGrpSpPr/>
+        <p:nvPr/>
+      </p:nvGrpSpPr>
+      <p:grpSpPr>
+        <a:xfrm>
+          <a:off x="0" y="0"/>
+          <a:ext cx="0" cy="0"/>
+          <a:chOff x="0" y="0"/>
+          <a:chExt cx="0" cy="0"/>
+        </a:xfrm>
+      </p:grpSpPr>
+      <p:sp>
+        <p:nvSpPr>
+          <p:cNvPr id="2" name="標題 1">
+            <a:extLst>
+              <a:ext uri="{FF2B5EF4-FFF2-40B4-BE49-F238E27FC236}">
+                <a16:creationId xmlns:a16="http://schemas.microsoft.com/office/drawing/2014/main" id="{D170B1AE-B119-47B7-A1F9-818FE42DB75A}"/>
+              </a:ext>
+            </a:extLst>
+          </p:cNvPr>
+          <p:cNvSpPr>
+            <a:spLocks noGrp="1"/>
+          </p:cNvSpPr>
+          <p:nvPr>
+            <p:ph type="title"/>
+          </p:nvPr>
+        </p:nvSpPr>
+        <p:spPr/>
+        <p:txBody>
+          <a:bodyPr/>
+          <a:lstStyle/>
+          <a:p>
+            <a:r>
+              <a:rPr lang="zh-TW" altLang="en-US"/>
+              <a:t>淺拷貝</a:t>
+            </a:r>
+          </a:p>
+        </p:txBody>
+      </p:sp>
+      <p:sp>
+        <p:nvSpPr>
+          <p:cNvPr id="3" name="內容版面配置區 2">
+            <a:extLst>
+              <a:ext uri="{FF2B5EF4-FFF2-40B4-BE49-F238E27FC236}">
+                <a16:creationId xmlns:a16="http://schemas.microsoft.com/office/drawing/2014/main" id="{D9646E35-219F-4BDA-9348-62866F8234E0}"/>
+              </a:ext>
+            </a:extLst>
+          </p:cNvPr>
+          <p:cNvSpPr>
+            <a:spLocks noGrp="1"/>
+          </p:cNvSpPr>
+          <p:nvPr>
+            <p:ph idx="1"/>
+          </p:nvPr>
+        </p:nvSpPr>
+        <p:spPr/>
+        <p:txBody>
+          <a:bodyPr/>
+          <a:lstStyle/>
+          <a:p>
+            <a:endParaRPr lang="zh-TW" altLang="en-US"/>
+          </a:p>
+        </p:txBody>
+      </p:sp>
+    </p:spTree>
+    <p:extLst>
+      <p:ext uri="{BB962C8B-B14F-4D97-AF65-F5344CB8AC3E}">
+        <p14:creationId xmlns:p14="http://schemas.microsoft.com/office/powerpoint/2010/main" val="116632808"/>
+      </p:ext>
+    </p:extLst>
+  </p:cSld>
+  <p:clrMapOvr>
+    <a:masterClrMapping/>
+  </p:clrMapOvr>
+</p:sld>
+</file>
+
+<file path=ppt/slides/slide2.xml><?xml version="1.0" encoding="utf-8"?>
+<p:sld xmlns:a="http://schemas.openxmlformats.org/drawingml/2006/main" xmlns:r="http://schemas.openxmlformats.org/officeDocument/2006/relationships" xmlns:p="http://schemas.openxmlformats.org/presentationml/2006/main">
+  <p:cSld>
+    <p:spTree>
+      <p:nvGrpSpPr>
+        <p:cNvPr id="1" name=""/>
+        <p:cNvGrpSpPr/>
+        <p:nvPr/>
+      </p:nvGrpSpPr>
+      <p:grpSpPr>
+        <a:xfrm>
+          <a:off x="0" y="0"/>
+          <a:ext cx="0" cy="0"/>
+          <a:chOff x="0" y="0"/>
+          <a:chExt cx="0" cy="0"/>
+        </a:xfrm>
+      </p:grpSpPr>
+      <p:sp>
+        <p:nvSpPr>
+          <p:cNvPr id="2" name="標題 1">
+            <a:extLst>
+              <a:ext uri="{FF2B5EF4-FFF2-40B4-BE49-F238E27FC236}">
+                <a16:creationId xmlns:a16="http://schemas.microsoft.com/office/drawing/2014/main" id="{2FDA7855-B7AD-4836-90E3-B464F25DF8AD}"/>
+              </a:ext>
+            </a:extLst>
+          </p:cNvPr>
+          <p:cNvSpPr>
+            <a:spLocks noGrp="1"/>
+          </p:cNvSpPr>
+          <p:nvPr>
+            <p:ph type="title"/>
+          </p:nvPr>
+        </p:nvSpPr>
+        <p:spPr/>
+        <p:txBody>
+          <a:bodyPr>
+            <a:normAutofit/>
+          </a:bodyPr>
+          <a:lstStyle/>
+          <a:p>
+            <a:r>
+              <a:rPr lang="zh-TW" altLang="en-US" sz="6600"/>
+              <a:t>函數</a:t>
+            </a:r>
+          </a:p>
+        </p:txBody>
+      </p:sp>
+      <p:sp>
+        <p:nvSpPr>
+          <p:cNvPr id="3" name="文字版面配置區 2">
+            <a:extLst>
+              <a:ext uri="{FF2B5EF4-FFF2-40B4-BE49-F238E27FC236}">
+                <a16:creationId xmlns:a16="http://schemas.microsoft.com/office/drawing/2014/main" id="{42673F33-7E67-4D85-A4DC-22106729159C}"/>
+              </a:ext>
+            </a:extLst>
+          </p:cNvPr>
+          <p:cNvSpPr>
+            <a:spLocks noGrp="1"/>
+          </p:cNvSpPr>
+          <p:nvPr>
+            <p:ph type="body" idx="1"/>
+          </p:nvPr>
+        </p:nvSpPr>
+        <p:spPr/>
+        <p:txBody>
+          <a:bodyPr/>
+          <a:lstStyle/>
+          <a:p>
+            <a:endParaRPr lang="zh-TW" altLang="en-US"/>
+          </a:p>
+        </p:txBody>
+      </p:sp>
+    </p:spTree>
+    <p:extLst>
+      <p:ext uri="{BB962C8B-B14F-4D97-AF65-F5344CB8AC3E}">
+        <p14:creationId xmlns:p14="http://schemas.microsoft.com/office/powerpoint/2010/main" val="895407232"/>
+      </p:ext>
+    </p:extLst>
+  </p:cSld>
+  <p:clrMapOvr>
+    <a:masterClrMapping/>
+  </p:clrMapOvr>
+</p:sld>
+</file>
+
+<file path=ppt/slides/slide3.xml><?xml version="1.0" encoding="utf-8"?>
+<p:sld xmlns:a="http://schemas.openxmlformats.org/drawingml/2006/main" xmlns:r="http://schemas.openxmlformats.org/officeDocument/2006/relationships" xmlns:p="http://schemas.openxmlformats.org/presentationml/2006/main">
+  <p:cSld>
+    <p:spTree>
+      <p:nvGrpSpPr>
+        <p:cNvPr id="1" name=""/>
+        <p:cNvGrpSpPr/>
+        <p:nvPr/>
+      </p:nvGrpSpPr>
+      <p:grpSpPr>
+        <a:xfrm>
+          <a:off x="0" y="0"/>
+          <a:ext cx="0" cy="0"/>
+          <a:chOff x="0" y="0"/>
+          <a:chExt cx="0" cy="0"/>
+        </a:xfrm>
+      </p:grpSpPr>
+      <p:sp>
+        <p:nvSpPr>
+          <p:cNvPr id="2" name="標題 1">
+            <a:extLst>
+              <a:ext uri="{FF2B5EF4-FFF2-40B4-BE49-F238E27FC236}">
+                <a16:creationId xmlns:a16="http://schemas.microsoft.com/office/drawing/2014/main" id="{BA2AFF19-CDD5-4868-A507-4C1A38F1DE52}"/>
+              </a:ext>
+            </a:extLst>
+          </p:cNvPr>
+          <p:cNvSpPr>
+            <a:spLocks noGrp="1"/>
+          </p:cNvSpPr>
+          <p:nvPr>
+            <p:ph type="title"/>
+          </p:nvPr>
+        </p:nvSpPr>
+        <p:spPr/>
+        <p:txBody>
+          <a:bodyPr/>
+          <a:lstStyle/>
+          <a:p>
+            <a:r>
+              <a:rPr lang="zh-TW" altLang="en-US"/>
+              <a:t>數學上的函數</a:t>
+            </a:r>
+          </a:p>
+        </p:txBody>
+      </p:sp>
+      <p:sp>
+        <p:nvSpPr>
+          <p:cNvPr id="3" name="內容版面配置區 2">
+            <a:extLst>
+              <a:ext uri="{FF2B5EF4-FFF2-40B4-BE49-F238E27FC236}">
+                <a16:creationId xmlns:a16="http://schemas.microsoft.com/office/drawing/2014/main" id="{0BDA728A-415A-4D02-9A41-9A223B203A5A}"/>
+              </a:ext>
+            </a:extLst>
+          </p:cNvPr>
+          <p:cNvSpPr>
+            <a:spLocks noGrp="1"/>
+          </p:cNvSpPr>
+          <p:nvPr>
+            <p:ph idx="1"/>
+          </p:nvPr>
+        </p:nvSpPr>
+        <p:spPr/>
+        <p:txBody>
+          <a:bodyPr>
+            <a:normAutofit/>
+          </a:bodyPr>
+          <a:lstStyle/>
+          <a:p>
+            <a:pPr>
+              <a:spcAft>
+                <a:spcPts val="0"/>
+              </a:spcAft>
+            </a:pPr>
+            <a:endParaRPr lang="en-US" altLang="zh-TW" sz="2800"/>
+          </a:p>
+          <a:p>
+            <a:pPr>
+              <a:spcAft>
+                <a:spcPts val="0"/>
+              </a:spcAft>
+            </a:pPr>
+            <a:r>
+              <a:rPr lang="en-US" altLang="zh-TW" sz="2800"/>
+              <a:t>f(x) = </a:t>
+            </a:r>
+            <a:r>
+              <a:rPr lang="en-US" altLang="zh-TW" sz="2800" kern="100">
+                <a:latin typeface="Calibri" panose="020F0502020204030204" pitchFamily="34" charset="0"/>
+                <a:ea typeface="新細明體" panose="02020500000000000000" pitchFamily="18" charset="-120"/>
+                <a:cs typeface="Times New Roman" panose="02020603050405020304" pitchFamily="18" charset="0"/>
+              </a:rPr>
+              <a:t>x</a:t>
+            </a:r>
+            <a:r>
+              <a:rPr lang="en-US" altLang="zh-TW" sz="2800" kern="100" baseline="30000">
+                <a:latin typeface="Calibri" panose="020F0502020204030204" pitchFamily="34" charset="0"/>
+                <a:ea typeface="新細明體" panose="02020500000000000000" pitchFamily="18" charset="-120"/>
+                <a:cs typeface="Times New Roman" panose="02020603050405020304" pitchFamily="18" charset="0"/>
+              </a:rPr>
+              <a:t>2</a:t>
+            </a:r>
+            <a:r>
+              <a:rPr lang="en-US" altLang="zh-TW" sz="2800" kern="100">
+                <a:latin typeface="Calibri" panose="020F0502020204030204" pitchFamily="34" charset="0"/>
+                <a:ea typeface="新細明體" panose="02020500000000000000" pitchFamily="18" charset="-120"/>
+                <a:cs typeface="Times New Roman" panose="02020603050405020304" pitchFamily="18" charset="0"/>
+              </a:rPr>
+              <a:t> + x - 6</a:t>
+            </a:r>
+            <a:endParaRPr lang="zh-TW" altLang="zh-TW" sz="2800" kern="100">
+              <a:latin typeface="Calibri" panose="020F0502020204030204" pitchFamily="34" charset="0"/>
+              <a:ea typeface="新細明體" panose="02020500000000000000" pitchFamily="18" charset="-120"/>
+              <a:cs typeface="Times New Roman" panose="02020603050405020304" pitchFamily="18" charset="0"/>
+            </a:endParaRPr>
+          </a:p>
+          <a:p>
+            <a:r>
+              <a:rPr lang="en-US" altLang="zh-TW" sz="2800"/>
+              <a:t>f(x, y) = x + 3y + 2</a:t>
+            </a:r>
+          </a:p>
+          <a:p>
+            <a:r>
+              <a:rPr lang="en-US" altLang="zh-TW" sz="2800"/>
+              <a:t>f(g(x))</a:t>
+            </a:r>
+          </a:p>
+          <a:p>
+            <a:pPr>
+              <a:spcAft>
+                <a:spcPts val="0"/>
+              </a:spcAft>
+            </a:pPr>
+            <a:r>
+              <a:rPr lang="en-US" altLang="zh-TW" sz="2800" kern="100">
+                <a:latin typeface="Calibri" panose="020F0502020204030204" pitchFamily="34" charset="0"/>
+                <a:ea typeface="新細明體" panose="02020500000000000000" pitchFamily="18" charset="-120"/>
+                <a:cs typeface="Times New Roman" panose="02020603050405020304" pitchFamily="18" charset="0"/>
+              </a:rPr>
+              <a:t>a</a:t>
+            </a:r>
+            <a:r>
+              <a:rPr lang="en-US" altLang="zh-TW" sz="2800" kern="100" baseline="-25000">
+                <a:latin typeface="Calibri" panose="020F0502020204030204" pitchFamily="34" charset="0"/>
+                <a:ea typeface="新細明體" panose="02020500000000000000" pitchFamily="18" charset="-120"/>
+                <a:cs typeface="Times New Roman" panose="02020603050405020304" pitchFamily="18" charset="0"/>
+              </a:rPr>
+              <a:t>n+2</a:t>
+            </a:r>
+            <a:r>
+              <a:rPr lang="en-US" altLang="zh-TW" sz="2800" kern="100">
+                <a:latin typeface="Calibri" panose="020F0502020204030204" pitchFamily="34" charset="0"/>
+                <a:ea typeface="新細明體" panose="02020500000000000000" pitchFamily="18" charset="-120"/>
+                <a:cs typeface="Times New Roman" panose="02020603050405020304" pitchFamily="18" charset="0"/>
+              </a:rPr>
+              <a:t> = a</a:t>
+            </a:r>
+            <a:r>
+              <a:rPr lang="en-US" altLang="zh-TW" sz="2800" kern="100" baseline="-25000">
+                <a:latin typeface="Calibri" panose="020F0502020204030204" pitchFamily="34" charset="0"/>
+                <a:ea typeface="新細明體" panose="02020500000000000000" pitchFamily="18" charset="-120"/>
+                <a:cs typeface="Times New Roman" panose="02020603050405020304" pitchFamily="18" charset="0"/>
+              </a:rPr>
+              <a:t>n+1</a:t>
+            </a:r>
+            <a:r>
+              <a:rPr lang="en-US" altLang="zh-TW" sz="2800" kern="100">
+                <a:latin typeface="Calibri" panose="020F0502020204030204" pitchFamily="34" charset="0"/>
+                <a:ea typeface="新細明體" panose="02020500000000000000" pitchFamily="18" charset="-120"/>
+                <a:cs typeface="Times New Roman" panose="02020603050405020304" pitchFamily="18" charset="0"/>
+              </a:rPr>
+              <a:t> + a</a:t>
+            </a:r>
+            <a:r>
+              <a:rPr lang="en-US" altLang="zh-TW" sz="2800" kern="100" baseline="-25000">
+                <a:latin typeface="Calibri" panose="020F0502020204030204" pitchFamily="34" charset="0"/>
+                <a:ea typeface="新細明體" panose="02020500000000000000" pitchFamily="18" charset="-120"/>
+                <a:cs typeface="Times New Roman" panose="02020603050405020304" pitchFamily="18" charset="0"/>
+              </a:rPr>
+              <a:t>n</a:t>
+            </a:r>
+            <a:endParaRPr lang="zh-TW" altLang="zh-TW" sz="2800" kern="100">
+              <a:latin typeface="Calibri" panose="020F0502020204030204" pitchFamily="34" charset="0"/>
+              <a:ea typeface="新細明體" panose="02020500000000000000" pitchFamily="18" charset="-120"/>
+              <a:cs typeface="Times New Roman" panose="02020603050405020304" pitchFamily="18" charset="0"/>
+            </a:endParaRPr>
+          </a:p>
+        </p:txBody>
+      </p:sp>
+    </p:spTree>
+    <p:extLst>
+      <p:ext uri="{BB962C8B-B14F-4D97-AF65-F5344CB8AC3E}">
+        <p14:creationId xmlns:p14="http://schemas.microsoft.com/office/powerpoint/2010/main" val="3937882072"/>
+      </p:ext>
+    </p:extLst>
+  </p:cSld>
+  <p:clrMapOvr>
+    <a:masterClrMapping/>
+  </p:clrMapOvr>
+</p:sld>
+</file>
+
+<file path=ppt/slides/slide4.xml><?xml version="1.0" encoding="utf-8"?>
+<p:sld xmlns:a="http://schemas.openxmlformats.org/drawingml/2006/main" xmlns:r="http://schemas.openxmlformats.org/officeDocument/2006/relationships" xmlns:p="http://schemas.openxmlformats.org/presentationml/2006/main">
+  <p:cSld>
+    <p:spTree>
+      <p:nvGrpSpPr>
+        <p:cNvPr id="1" name=""/>
+        <p:cNvGrpSpPr/>
+        <p:nvPr/>
+      </p:nvGrpSpPr>
+      <p:grpSpPr>
+        <a:xfrm>
+          <a:off x="0" y="0"/>
+          <a:ext cx="0" cy="0"/>
+          <a:chOff x="0" y="0"/>
+          <a:chExt cx="0" cy="0"/>
+        </a:xfrm>
+      </p:grpSpPr>
+      <p:sp>
+        <p:nvSpPr>
+          <p:cNvPr id="2" name="標題 1">
+            <a:extLst>
+              <a:ext uri="{FF2B5EF4-FFF2-40B4-BE49-F238E27FC236}">
+                <a16:creationId xmlns:a16="http://schemas.microsoft.com/office/drawing/2014/main" id="{5BDA27DE-59E7-4AAF-B798-BAE1BB2B015B}"/>
+              </a:ext>
+            </a:extLst>
+          </p:cNvPr>
+          <p:cNvSpPr>
+            <a:spLocks noGrp="1"/>
+          </p:cNvSpPr>
+          <p:nvPr>
+            <p:ph type="title"/>
+          </p:nvPr>
+        </p:nvSpPr>
+        <p:spPr/>
+        <p:txBody>
+          <a:bodyPr/>
+          <a:lstStyle/>
+          <a:p>
+            <a:r>
+              <a:rPr lang="en-US" altLang="zh-TW"/>
+              <a:t>Python </a:t>
+            </a:r>
+            <a:r>
+              <a:rPr lang="zh-TW" altLang="en-US"/>
+              <a:t>中的函數</a:t>
+            </a:r>
+          </a:p>
+        </p:txBody>
+      </p:sp>
+      <p:sp>
+        <p:nvSpPr>
+          <p:cNvPr id="3" name="內容版面配置區 2">
+            <a:extLst>
+              <a:ext uri="{FF2B5EF4-FFF2-40B4-BE49-F238E27FC236}">
+                <a16:creationId xmlns:a16="http://schemas.microsoft.com/office/drawing/2014/main" id="{25C80FE0-8EB5-405F-A980-B64A951C6636}"/>
+              </a:ext>
+            </a:extLst>
+          </p:cNvPr>
+          <p:cNvSpPr>
+            <a:spLocks noGrp="1"/>
+          </p:cNvSpPr>
+          <p:nvPr>
+            <p:ph idx="1"/>
+          </p:nvPr>
+        </p:nvSpPr>
+        <p:spPr/>
+        <p:txBody>
+          <a:bodyPr>
+            <a:normAutofit/>
+          </a:bodyPr>
+          <a:lstStyle/>
+          <a:p>
+            <a:pPr marL="0" indent="0">
+              <a:buNone/>
+            </a:pPr>
+            <a:endParaRPr lang="en-US" altLang="zh-TW" sz="2800"/>
+          </a:p>
+          <a:p>
+            <a:pPr marL="0" indent="0">
+              <a:buNone/>
+            </a:pPr>
+            <a:r>
+              <a:rPr lang="en-US" altLang="zh-TW" sz="2800"/>
+              <a:t>def </a:t>
+            </a:r>
+            <a:r>
+              <a:rPr lang="zh-TW" altLang="en-US" sz="2800">
+                <a:solidFill>
+                  <a:srgbClr val="FF0000"/>
+                </a:solidFill>
+              </a:rPr>
+              <a:t>函數名稱</a:t>
+            </a:r>
+            <a:r>
+              <a:rPr lang="en-US" altLang="zh-TW" sz="2800"/>
+              <a:t>(</a:t>
+            </a:r>
+            <a:r>
+              <a:rPr lang="zh-TW" altLang="en-US" sz="2800">
+                <a:solidFill>
+                  <a:srgbClr val="FF0000"/>
+                </a:solidFill>
+              </a:rPr>
+              <a:t>參數 </a:t>
+            </a:r>
+            <a:r>
+              <a:rPr lang="en-US" altLang="zh-TW" sz="2800">
+                <a:solidFill>
+                  <a:schemeClr val="bg1">
+                    <a:lumMod val="65000"/>
+                  </a:schemeClr>
+                </a:solidFill>
+              </a:rPr>
+              <a:t>: </a:t>
+            </a:r>
+            <a:r>
+              <a:rPr lang="zh-TW" altLang="en-US" sz="2800">
+                <a:solidFill>
+                  <a:schemeClr val="bg1">
+                    <a:lumMod val="65000"/>
+                  </a:schemeClr>
+                </a:solidFill>
+              </a:rPr>
+              <a:t>型別</a:t>
+            </a:r>
+            <a:r>
+              <a:rPr lang="en-US" altLang="zh-TW" sz="2800"/>
+              <a:t>)</a:t>
+            </a:r>
+            <a:r>
+              <a:rPr lang="zh-TW" altLang="en-US" sz="2800"/>
+              <a:t> </a:t>
+            </a:r>
+            <a:r>
+              <a:rPr lang="en-US" altLang="zh-TW" sz="2800">
+                <a:solidFill>
+                  <a:schemeClr val="bg1">
+                    <a:lumMod val="65000"/>
+                  </a:schemeClr>
+                </a:solidFill>
+              </a:rPr>
+              <a:t>-&gt; </a:t>
+            </a:r>
+            <a:r>
+              <a:rPr lang="zh-TW" altLang="en-US" sz="2800">
+                <a:solidFill>
+                  <a:schemeClr val="bg1">
+                    <a:lumMod val="65000"/>
+                  </a:schemeClr>
+                </a:solidFill>
+              </a:rPr>
+              <a:t>回傳型別</a:t>
+            </a:r>
+            <a:r>
+              <a:rPr lang="en-US" altLang="zh-TW" sz="2800"/>
+              <a:t>:</a:t>
+            </a:r>
+          </a:p>
+          <a:p>
+            <a:pPr marL="0" indent="0">
+              <a:buNone/>
+            </a:pPr>
+            <a:r>
+              <a:rPr lang="en-US" altLang="zh-TW" sz="2800"/>
+              <a:t>	</a:t>
+            </a:r>
+            <a:r>
+              <a:rPr lang="zh-TW" altLang="en-US" sz="2800">
+                <a:solidFill>
+                  <a:srgbClr val="FF0000"/>
+                </a:solidFill>
+              </a:rPr>
+              <a:t>程式敘述</a:t>
+            </a:r>
+            <a:endParaRPr lang="en-US" altLang="zh-TW" sz="2800">
+              <a:solidFill>
+                <a:srgbClr val="FF0000"/>
+              </a:solidFill>
+            </a:endParaRPr>
+          </a:p>
+          <a:p>
+            <a:pPr marL="0" indent="0">
+              <a:buNone/>
+            </a:pPr>
+            <a:r>
+              <a:rPr lang="en-US" altLang="zh-TW" sz="2800">
+                <a:solidFill>
+                  <a:srgbClr val="FF0000"/>
+                </a:solidFill>
+              </a:rPr>
+              <a:t>	</a:t>
+            </a:r>
+            <a:r>
+              <a:rPr lang="en-US" altLang="zh-TW" sz="2800"/>
+              <a:t>return </a:t>
+            </a:r>
+            <a:r>
+              <a:rPr lang="zh-TW" altLang="en-US" sz="2800">
+                <a:solidFill>
+                  <a:srgbClr val="FF0000"/>
+                </a:solidFill>
+              </a:rPr>
+              <a:t>回傳值</a:t>
+            </a:r>
+            <a:endParaRPr lang="en-US" altLang="zh-TW" sz="2800">
+              <a:solidFill>
+                <a:srgbClr val="FF0000"/>
+              </a:solidFill>
+            </a:endParaRPr>
+          </a:p>
+        </p:txBody>
+      </p:sp>
+    </p:spTree>
+    <p:extLst>
+      <p:ext uri="{BB962C8B-B14F-4D97-AF65-F5344CB8AC3E}">
+        <p14:creationId xmlns:p14="http://schemas.microsoft.com/office/powerpoint/2010/main" val="1014612677"/>
+      </p:ext>
+    </p:extLst>
+  </p:cSld>
+  <p:clrMapOvr>
+    <a:masterClrMapping/>
+  </p:clrMapOvr>
+</p:sld>
+</file>
+
+<file path=ppt/slides/slide5.xml><?xml version="1.0" encoding="utf-8"?>
+<p:sld xmlns:a="http://schemas.openxmlformats.org/drawingml/2006/main" xmlns:r="http://schemas.openxmlformats.org/officeDocument/2006/relationships" xmlns:p="http://schemas.openxmlformats.org/presentationml/2006/main">
+  <p:cSld>
+    <p:spTree>
+      <p:nvGrpSpPr>
+        <p:cNvPr id="1" name=""/>
+        <p:cNvGrpSpPr/>
+        <p:nvPr/>
+      </p:nvGrpSpPr>
+      <p:grpSpPr>
+        <a:xfrm>
+          <a:off x="0" y="0"/>
+          <a:ext cx="0" cy="0"/>
+          <a:chOff x="0" y="0"/>
+          <a:chExt cx="0" cy="0"/>
+        </a:xfrm>
+      </p:grpSpPr>
+      <p:sp>
+        <p:nvSpPr>
+          <p:cNvPr id="2" name="標題 1">
+            <a:extLst>
+              <a:ext uri="{FF2B5EF4-FFF2-40B4-BE49-F238E27FC236}">
+                <a16:creationId xmlns:a16="http://schemas.microsoft.com/office/drawing/2014/main" id="{ECC2C6B6-5739-4D7C-AB31-43E045C22500}"/>
+              </a:ext>
+            </a:extLst>
+          </p:cNvPr>
+          <p:cNvSpPr>
+            <a:spLocks noGrp="1"/>
+          </p:cNvSpPr>
+          <p:nvPr>
+            <p:ph type="title"/>
+          </p:nvPr>
+        </p:nvSpPr>
+        <p:spPr/>
+        <p:txBody>
+          <a:bodyPr/>
+          <a:lstStyle/>
+          <a:p>
+            <a:r>
+              <a:rPr lang="zh-TW" altLang="en-US"/>
+              <a:t>函數使用</a:t>
+            </a:r>
+          </a:p>
+        </p:txBody>
+      </p:sp>
+      <p:sp>
+        <p:nvSpPr>
+          <p:cNvPr id="3" name="內容版面配置區 2">
+            <a:extLst>
+              <a:ext uri="{FF2B5EF4-FFF2-40B4-BE49-F238E27FC236}">
+                <a16:creationId xmlns:a16="http://schemas.microsoft.com/office/drawing/2014/main" id="{886ADCD3-122C-4C1F-B31B-E87B6C82EB2C}"/>
+              </a:ext>
+            </a:extLst>
+          </p:cNvPr>
+          <p:cNvSpPr>
+            <a:spLocks noGrp="1"/>
+          </p:cNvSpPr>
+          <p:nvPr>
+            <p:ph idx="1"/>
+          </p:nvPr>
+        </p:nvSpPr>
+        <p:spPr/>
+        <p:txBody>
+          <a:bodyPr>
+            <a:normAutofit/>
+          </a:bodyPr>
+          <a:lstStyle/>
+          <a:p>
+            <a:pPr marL="0" indent="0">
+              <a:buNone/>
+            </a:pPr>
+            <a:endParaRPr lang="en-US" altLang="zh-TW" sz="2800"/>
+          </a:p>
+          <a:p>
+            <a:pPr marL="0" indent="0">
+              <a:buNone/>
+            </a:pPr>
+            <a:r>
+              <a:rPr lang="en-US" altLang="zh-TW" sz="2800"/>
+              <a:t>def </a:t>
+            </a:r>
+            <a:r>
+              <a:rPr lang="en-US" altLang="zh-TW" sz="2800">
+                <a:solidFill>
+                  <a:srgbClr val="FF0000"/>
+                </a:solidFill>
+              </a:rPr>
+              <a:t>chino_chan</a:t>
+            </a:r>
+            <a:r>
+              <a:rPr lang="en-US" altLang="zh-TW" sz="2800"/>
+              <a:t>() </a:t>
+            </a:r>
+            <a:r>
+              <a:rPr lang="en-US" altLang="zh-TW" sz="2800">
+                <a:solidFill>
+                  <a:schemeClr val="bg1">
+                    <a:lumMod val="65000"/>
+                  </a:schemeClr>
+                </a:solidFill>
+              </a:rPr>
+              <a:t>-&gt; None</a:t>
+            </a:r>
+            <a:r>
+              <a:rPr lang="en-US" altLang="zh-TW" sz="2800"/>
+              <a:t>:</a:t>
+            </a:r>
+          </a:p>
+          <a:p>
+            <a:pPr marL="0" indent="0">
+              <a:buNone/>
+            </a:pPr>
+            <a:r>
+              <a:rPr lang="en-US" altLang="zh-TW" sz="2800"/>
+              <a:t>	print("go chuumon wa usagi desu ka?")</a:t>
+            </a:r>
+          </a:p>
+          <a:p>
+            <a:pPr marL="0" indent="0">
+              <a:buNone/>
+            </a:pPr>
+            <a:endParaRPr lang="en-US" altLang="zh-TW" sz="2800"/>
+          </a:p>
+          <a:p>
+            <a:pPr marL="0" indent="0">
+              <a:buNone/>
+            </a:pPr>
+            <a:r>
+              <a:rPr lang="en-US" altLang="zh-TW" sz="2800">
+                <a:solidFill>
+                  <a:srgbClr val="FF0000"/>
+                </a:solidFill>
+              </a:rPr>
+              <a:t>chino_chan</a:t>
+            </a:r>
+            <a:r>
+              <a:rPr lang="en-US" altLang="zh-TW" sz="2800"/>
+              <a:t>()</a:t>
+            </a:r>
+            <a:endParaRPr lang="zh-TW" altLang="en-US" sz="2800"/>
+          </a:p>
+        </p:txBody>
+      </p:sp>
+    </p:spTree>
+    <p:extLst>
+      <p:ext uri="{BB962C8B-B14F-4D97-AF65-F5344CB8AC3E}">
+        <p14:creationId xmlns:p14="http://schemas.microsoft.com/office/powerpoint/2010/main" val="3429322535"/>
+      </p:ext>
+    </p:extLst>
+  </p:cSld>
+  <p:clrMapOvr>
+    <a:masterClrMapping/>
+  </p:clrMapOvr>
+</p:sld>
+</file>
+
+<file path=ppt/slides/slide6.xml><?xml version="1.0" encoding="utf-8"?>
+<p:sld xmlns:a="http://schemas.openxmlformats.org/drawingml/2006/main" xmlns:r="http://schemas.openxmlformats.org/officeDocument/2006/relationships" xmlns:p="http://schemas.openxmlformats.org/presentationml/2006/main">
+  <p:cSld>
+    <p:spTree>
+      <p:nvGrpSpPr>
+        <p:cNvPr id="1" name=""/>
+        <p:cNvGrpSpPr/>
+        <p:nvPr/>
+      </p:nvGrpSpPr>
+      <p:grpSpPr>
+        <a:xfrm>
+          <a:off x="0" y="0"/>
+          <a:ext cx="0" cy="0"/>
+          <a:chOff x="0" y="0"/>
+          <a:chExt cx="0" cy="0"/>
+        </a:xfrm>
+      </p:grpSpPr>
+      <p:sp>
+        <p:nvSpPr>
+          <p:cNvPr id="2" name="標題 1">
+            <a:extLst>
+              <a:ext uri="{FF2B5EF4-FFF2-40B4-BE49-F238E27FC236}">
+                <a16:creationId xmlns:a16="http://schemas.microsoft.com/office/drawing/2014/main" id="{ECC2C6B6-5739-4D7C-AB31-43E045C22500}"/>
+              </a:ext>
+            </a:extLst>
+          </p:cNvPr>
+          <p:cNvSpPr>
+            <a:spLocks noGrp="1"/>
+          </p:cNvSpPr>
+          <p:nvPr>
+            <p:ph type="title"/>
+          </p:nvPr>
+        </p:nvSpPr>
+        <p:spPr/>
+        <p:txBody>
+          <a:bodyPr/>
+          <a:lstStyle/>
+          <a:p>
+            <a:r>
+              <a:rPr lang="zh-TW" altLang="en-US"/>
+              <a:t>函數使用</a:t>
+            </a:r>
+          </a:p>
+        </p:txBody>
+      </p:sp>
+      <p:sp>
+        <p:nvSpPr>
+          <p:cNvPr id="3" name="內容版面配置區 2">
+            <a:extLst>
+              <a:ext uri="{FF2B5EF4-FFF2-40B4-BE49-F238E27FC236}">
+                <a16:creationId xmlns:a16="http://schemas.microsoft.com/office/drawing/2014/main" id="{886ADCD3-122C-4C1F-B31B-E87B6C82EB2C}"/>
+              </a:ext>
+            </a:extLst>
+          </p:cNvPr>
+          <p:cNvSpPr>
+            <a:spLocks noGrp="1"/>
+          </p:cNvSpPr>
+          <p:nvPr>
+            <p:ph idx="1"/>
+          </p:nvPr>
+        </p:nvSpPr>
+        <p:spPr/>
+        <p:txBody>
+          <a:bodyPr>
+            <a:normAutofit/>
+          </a:bodyPr>
+          <a:lstStyle/>
+          <a:p>
+            <a:pPr marL="0" indent="0">
+              <a:buNone/>
+            </a:pPr>
+            <a:endParaRPr lang="en-US" altLang="zh-TW" sz="2800"/>
+          </a:p>
+          <a:p>
+            <a:pPr marL="0" indent="0">
+              <a:buNone/>
+            </a:pPr>
+            <a:r>
+              <a:rPr lang="en-US" altLang="zh-TW" sz="2800"/>
+              <a:t>def </a:t>
+            </a:r>
+            <a:r>
+              <a:rPr lang="en-US" altLang="zh-TW" sz="2800">
+                <a:solidFill>
+                  <a:srgbClr val="FF0000"/>
+                </a:solidFill>
+              </a:rPr>
+              <a:t>chino_chan</a:t>
+            </a:r>
+            <a:r>
+              <a:rPr lang="en-US" altLang="zh-TW" sz="2800"/>
+              <a:t>(</a:t>
+            </a:r>
+            <a:r>
+              <a:rPr lang="en-US" altLang="zh-TW" sz="2800">
+                <a:solidFill>
+                  <a:srgbClr val="FF0000"/>
+                </a:solidFill>
+              </a:rPr>
+              <a:t>name</a:t>
+            </a:r>
+            <a:r>
+              <a:rPr lang="en-US" altLang="zh-TW" sz="2800">
+                <a:solidFill>
+                  <a:schemeClr val="bg1">
+                    <a:lumMod val="65000"/>
+                  </a:schemeClr>
+                </a:solidFill>
+              </a:rPr>
+              <a:t>: str</a:t>
+            </a:r>
+            <a:r>
+              <a:rPr lang="en-US" altLang="zh-TW" sz="2800"/>
+              <a:t>) </a:t>
+            </a:r>
+            <a:r>
+              <a:rPr lang="en-US" altLang="zh-TW" sz="2800">
+                <a:solidFill>
+                  <a:schemeClr val="bg1">
+                    <a:lumMod val="65000"/>
+                  </a:schemeClr>
+                </a:solidFill>
+              </a:rPr>
+              <a:t>-&gt; None</a:t>
+            </a:r>
+            <a:r>
+              <a:rPr lang="en-US" altLang="zh-TW" sz="2800"/>
+              <a:t>:</a:t>
+            </a:r>
+          </a:p>
+          <a:p>
+            <a:pPr marL="0" indent="0">
+              <a:buNone/>
+            </a:pPr>
+            <a:r>
+              <a:rPr lang="en-US" altLang="zh-TW" sz="2800"/>
+              <a:t>    if len(str) == 0:</a:t>
+            </a:r>
+            <a:r>
+              <a:rPr lang="zh-TW" altLang="en-US" sz="2800"/>
+              <a:t> </a:t>
+            </a:r>
+            <a:r>
+              <a:rPr lang="en-US" altLang="zh-TW" sz="2800">
+                <a:solidFill>
+                  <a:srgbClr val="FF0000"/>
+                </a:solidFill>
+              </a:rPr>
+              <a:t>return</a:t>
+            </a:r>
+          </a:p>
+          <a:p>
+            <a:pPr marL="0" indent="0">
+              <a:buNone/>
+            </a:pPr>
+            <a:r>
+              <a:rPr lang="en-US" altLang="zh-TW" sz="2800"/>
+              <a:t>    print(f"{name}, ohayo gozaimasu")</a:t>
+            </a:r>
+          </a:p>
+          <a:p>
+            <a:pPr marL="0" indent="0">
+              <a:buNone/>
+            </a:pPr>
+            <a:br>
+              <a:rPr lang="en-US" altLang="zh-TW" sz="2800"/>
+            </a:br>
+            <a:r>
+              <a:rPr lang="en-US" altLang="zh-TW" sz="2800">
+                <a:solidFill>
+                  <a:srgbClr val="FF0000"/>
+                </a:solidFill>
+              </a:rPr>
+              <a:t>chino_chan</a:t>
+            </a:r>
+            <a:r>
+              <a:rPr lang="en-US" altLang="zh-TW" sz="2800"/>
+              <a:t>(</a:t>
+            </a:r>
+            <a:r>
+              <a:rPr lang="en-US" altLang="zh-TW" sz="2800">
+                <a:solidFill>
+                  <a:srgbClr val="FF0000"/>
+                </a:solidFill>
+              </a:rPr>
+              <a:t>"cocoa san"</a:t>
+            </a:r>
+            <a:r>
+              <a:rPr lang="en-US" altLang="zh-TW" sz="2800"/>
+              <a:t>)</a:t>
+            </a:r>
+          </a:p>
+        </p:txBody>
+      </p:sp>
+    </p:spTree>
+    <p:extLst>
+      <p:ext uri="{BB962C8B-B14F-4D97-AF65-F5344CB8AC3E}">
+        <p14:creationId xmlns:p14="http://schemas.microsoft.com/office/powerpoint/2010/main" val="781504779"/>
+      </p:ext>
+    </p:extLst>
+  </p:cSld>
+  <p:clrMapOvr>
+    <a:masterClrMapping/>
+  </p:clrMapOvr>
+</p:sld>
+</file>
+
+<file path=ppt/slides/slide7.xml><?xml version="1.0" encoding="utf-8"?>
+<p:sld xmlns:a="http://schemas.openxmlformats.org/drawingml/2006/main" xmlns:r="http://schemas.openxmlformats.org/officeDocument/2006/relationships" xmlns:p="http://schemas.openxmlformats.org/presentationml/2006/main">
+  <p:cSld>
+    <p:spTree>
+      <p:nvGrpSpPr>
+        <p:cNvPr id="1" name=""/>
+        <p:cNvGrpSpPr/>
+        <p:nvPr/>
+      </p:nvGrpSpPr>
+      <p:grpSpPr>
+        <a:xfrm>
+          <a:off x="0" y="0"/>
+          <a:ext cx="0" cy="0"/>
+          <a:chOff x="0" y="0"/>
+          <a:chExt cx="0" cy="0"/>
+        </a:xfrm>
+      </p:grpSpPr>
+      <p:sp>
+        <p:nvSpPr>
+          <p:cNvPr id="2" name="標題 1">
+            <a:extLst>
+              <a:ext uri="{FF2B5EF4-FFF2-40B4-BE49-F238E27FC236}">
+                <a16:creationId xmlns:a16="http://schemas.microsoft.com/office/drawing/2014/main" id="{ECC2C6B6-5739-4D7C-AB31-43E045C22500}"/>
+              </a:ext>
+            </a:extLst>
+          </p:cNvPr>
+          <p:cNvSpPr>
+            <a:spLocks noGrp="1"/>
+          </p:cNvSpPr>
+          <p:nvPr>
+            <p:ph type="title"/>
+          </p:nvPr>
+        </p:nvSpPr>
+        <p:spPr/>
+        <p:txBody>
+          <a:bodyPr/>
+          <a:lstStyle/>
+          <a:p>
+            <a:r>
+              <a:rPr lang="zh-TW" altLang="en-US"/>
+              <a:t>函數使用</a:t>
+            </a:r>
+          </a:p>
+        </p:txBody>
+      </p:sp>
+      <p:sp>
+        <p:nvSpPr>
+          <p:cNvPr id="3" name="內容版面配置區 2">
+            <a:extLst>
+              <a:ext uri="{FF2B5EF4-FFF2-40B4-BE49-F238E27FC236}">
+                <a16:creationId xmlns:a16="http://schemas.microsoft.com/office/drawing/2014/main" id="{886ADCD3-122C-4C1F-B31B-E87B6C82EB2C}"/>
+              </a:ext>
+            </a:extLst>
+          </p:cNvPr>
+          <p:cNvSpPr>
+            <a:spLocks noGrp="1"/>
+          </p:cNvSpPr>
+          <p:nvPr>
+            <p:ph idx="1"/>
+          </p:nvPr>
+        </p:nvSpPr>
+        <p:spPr/>
+        <p:txBody>
+          <a:bodyPr>
+            <a:normAutofit/>
+          </a:bodyPr>
+          <a:lstStyle/>
+          <a:p>
+            <a:pPr marL="0" indent="0">
+              <a:buNone/>
+            </a:pPr>
+            <a:endParaRPr lang="en-US" altLang="zh-TW" sz="2800"/>
+          </a:p>
+          <a:p>
+            <a:pPr marL="0" indent="0">
+              <a:buNone/>
+            </a:pPr>
+            <a:r>
+              <a:rPr lang="en-US" altLang="zh-TW" sz="2800"/>
+              <a:t>def </a:t>
+            </a:r>
+            <a:r>
+              <a:rPr lang="en-US" altLang="zh-TW" sz="2800">
+                <a:solidFill>
+                  <a:srgbClr val="FF0000"/>
+                </a:solidFill>
+              </a:rPr>
+              <a:t>is_odd</a:t>
+            </a:r>
+            <a:r>
+              <a:rPr lang="en-US" altLang="zh-TW" sz="2800"/>
+              <a:t>(</a:t>
+            </a:r>
+            <a:r>
+              <a:rPr lang="en-US" altLang="zh-TW" sz="2800">
+                <a:solidFill>
+                  <a:srgbClr val="FF0000"/>
+                </a:solidFill>
+              </a:rPr>
+              <a:t>num</a:t>
+            </a:r>
+            <a:r>
+              <a:rPr lang="en-US" altLang="zh-TW" sz="2800">
+                <a:solidFill>
+                  <a:schemeClr val="bg1">
+                    <a:lumMod val="65000"/>
+                  </a:schemeClr>
+                </a:solidFill>
+              </a:rPr>
+              <a:t>: int</a:t>
+            </a:r>
+            <a:r>
+              <a:rPr lang="en-US" altLang="zh-TW" sz="2800"/>
+              <a:t>) </a:t>
+            </a:r>
+            <a:r>
+              <a:rPr lang="en-US" altLang="zh-TW" sz="2800">
+                <a:solidFill>
+                  <a:schemeClr val="bg1">
+                    <a:lumMod val="65000"/>
+                  </a:schemeClr>
+                </a:solidFill>
+              </a:rPr>
+              <a:t>-&gt; bool</a:t>
+            </a:r>
+            <a:r>
+              <a:rPr lang="en-US" altLang="zh-TW" sz="2800"/>
+              <a:t>:</a:t>
+            </a:r>
+          </a:p>
+          <a:p>
+            <a:pPr marL="0" indent="0">
+              <a:buNone/>
+            </a:pPr>
+            <a:r>
+              <a:rPr lang="en-US" altLang="zh-TW" sz="2800"/>
+              <a:t>    if num % 2 == 1:</a:t>
+            </a:r>
+            <a:r>
+              <a:rPr lang="zh-TW" altLang="en-US" sz="2800"/>
+              <a:t> </a:t>
+            </a:r>
+            <a:r>
+              <a:rPr lang="en-US" altLang="zh-TW" sz="2800">
+                <a:solidFill>
+                  <a:srgbClr val="FF0000"/>
+                </a:solidFill>
+              </a:rPr>
+              <a:t>return True</a:t>
+            </a:r>
+          </a:p>
+          <a:p>
+            <a:pPr marL="0" indent="0">
+              <a:buNone/>
+            </a:pPr>
+            <a:r>
+              <a:rPr lang="en-US" altLang="zh-TW" sz="2800"/>
+              <a:t>    </a:t>
+            </a:r>
+            <a:r>
+              <a:rPr lang="en-US" altLang="zh-TW" sz="2800">
+                <a:solidFill>
+                  <a:srgbClr val="FF0000"/>
+                </a:solidFill>
+              </a:rPr>
+              <a:t>return False</a:t>
+            </a:r>
+          </a:p>
+          <a:p>
+            <a:pPr marL="0" indent="0">
+              <a:buNone/>
+            </a:pPr>
+            <a:endParaRPr lang="en-US" altLang="zh-TW" sz="2800"/>
+          </a:p>
+          <a:p>
+            <a:pPr marL="0" indent="0">
+              <a:buNone/>
+            </a:pPr>
+            <a:r>
+              <a:rPr lang="en-US" altLang="zh-TW" sz="2800"/>
+              <a:t>print(</a:t>
+            </a:r>
+            <a:r>
+              <a:rPr lang="en-US" altLang="zh-TW" sz="2800">
+                <a:solidFill>
+                  <a:srgbClr val="FF0000"/>
+                </a:solidFill>
+              </a:rPr>
+              <a:t>is_odd</a:t>
+            </a:r>
+            <a:r>
+              <a:rPr lang="en-US" altLang="zh-TW" sz="2800"/>
+              <a:t>(</a:t>
+            </a:r>
+            <a:r>
+              <a:rPr lang="en-US" altLang="zh-TW" sz="2800">
+                <a:solidFill>
+                  <a:srgbClr val="FF0000"/>
+                </a:solidFill>
+              </a:rPr>
+              <a:t>3</a:t>
+            </a:r>
+            <a:r>
+              <a:rPr lang="en-US" altLang="zh-TW" sz="2800"/>
+              <a:t>))</a:t>
+            </a:r>
+          </a:p>
+          <a:p>
+            <a:pPr marL="0" indent="0">
+              <a:buNone/>
+            </a:pPr>
+            <a:r>
+              <a:rPr lang="en-US" altLang="zh-TW" sz="2800"/>
+              <a:t>print(</a:t>
+            </a:r>
+            <a:r>
+              <a:rPr lang="en-US" altLang="zh-TW" sz="2800">
+                <a:solidFill>
+                  <a:srgbClr val="FF0000"/>
+                </a:solidFill>
+              </a:rPr>
+              <a:t>is_odd</a:t>
+            </a:r>
+            <a:r>
+              <a:rPr lang="en-US" altLang="zh-TW" sz="2800"/>
+              <a:t>(</a:t>
+            </a:r>
+            <a:r>
+              <a:rPr lang="en-US" altLang="zh-TW" sz="2800">
+                <a:solidFill>
+                  <a:srgbClr val="FF0000"/>
+                </a:solidFill>
+              </a:rPr>
+              <a:t>10</a:t>
+            </a:r>
+            <a:r>
+              <a:rPr lang="en-US" altLang="zh-TW" sz="2800"/>
+              <a:t>))</a:t>
+            </a:r>
+          </a:p>
+        </p:txBody>
+      </p:sp>
+    </p:spTree>
+    <p:extLst>
+      <p:ext uri="{BB962C8B-B14F-4D97-AF65-F5344CB8AC3E}">
+        <p14:creationId xmlns:p14="http://schemas.microsoft.com/office/powerpoint/2010/main" val="1305392040"/>
+      </p:ext>
+    </p:extLst>
+  </p:cSld>
+  <p:clrMapOvr>
+    <a:masterClrMapping/>
+  </p:clrMapOvr>
+</p:sld>
+</file>
+
+<file path=ppt/slides/slide8.xml><?xml version="1.0" encoding="utf-8"?>
+<p:sld xmlns:a="http://schemas.openxmlformats.org/drawingml/2006/main" xmlns:r="http://schemas.openxmlformats.org/officeDocument/2006/relationships" xmlns:p="http://schemas.openxmlformats.org/presentationml/2006/main">
+  <p:cSld>
+    <p:spTree>
+      <p:nvGrpSpPr>
+        <p:cNvPr id="1" name=""/>
+        <p:cNvGrpSpPr/>
+        <p:nvPr/>
+      </p:nvGrpSpPr>
+      <p:grpSpPr>
+        <a:xfrm>
+          <a:off x="0" y="0"/>
+          <a:ext cx="0" cy="0"/>
+          <a:chOff x="0" y="0"/>
+          <a:chExt cx="0" cy="0"/>
+        </a:xfrm>
+      </p:grpSpPr>
+      <p:sp>
+        <p:nvSpPr>
+          <p:cNvPr id="2" name="標題 1">
+            <a:extLst>
+              <a:ext uri="{FF2B5EF4-FFF2-40B4-BE49-F238E27FC236}">
+                <a16:creationId xmlns:a16="http://schemas.microsoft.com/office/drawing/2014/main" id="{ECC2C6B6-5739-4D7C-AB31-43E045C22500}"/>
+              </a:ext>
+            </a:extLst>
+          </p:cNvPr>
+          <p:cNvSpPr>
+            <a:spLocks noGrp="1"/>
+          </p:cNvSpPr>
+          <p:nvPr>
+            <p:ph type="title"/>
+          </p:nvPr>
+        </p:nvSpPr>
+        <p:spPr/>
+        <p:txBody>
+          <a:bodyPr/>
+          <a:lstStyle/>
+          <a:p>
+            <a:r>
+              <a:rPr lang="zh-TW" altLang="en-US"/>
+              <a:t>函數使用</a:t>
+            </a:r>
+          </a:p>
+        </p:txBody>
+      </p:sp>
+      <p:sp>
+        <p:nvSpPr>
+          <p:cNvPr id="3" name="內容版面配置區 2">
+            <a:extLst>
+              <a:ext uri="{FF2B5EF4-FFF2-40B4-BE49-F238E27FC236}">
+                <a16:creationId xmlns:a16="http://schemas.microsoft.com/office/drawing/2014/main" id="{886ADCD3-122C-4C1F-B31B-E87B6C82EB2C}"/>
+              </a:ext>
+            </a:extLst>
+          </p:cNvPr>
+          <p:cNvSpPr>
+            <a:spLocks noGrp="1"/>
+          </p:cNvSpPr>
+          <p:nvPr>
+            <p:ph idx="1"/>
+          </p:nvPr>
+        </p:nvSpPr>
+        <p:spPr>
+          <a:xfrm>
+            <a:off x="1261871" y="1828800"/>
+            <a:ext cx="9792347" cy="4351337"/>
+          </a:xfrm>
+        </p:spPr>
+        <p:txBody>
+          <a:bodyPr>
+            <a:normAutofit/>
+          </a:bodyPr>
+          <a:lstStyle/>
+          <a:p>
+            <a:pPr marL="0" indent="0">
+              <a:buNone/>
+            </a:pPr>
+            <a:endParaRPr lang="en-US" altLang="zh-TW" sz="2400"/>
+          </a:p>
+          <a:p>
+            <a:pPr marL="0" indent="0">
+              <a:buNone/>
+            </a:pPr>
+            <a:r>
+              <a:rPr lang="en-US" altLang="zh-TW" sz="2400"/>
+              <a:t>def </a:t>
+            </a:r>
+            <a:r>
+              <a:rPr lang="en-US" altLang="zh-TW" sz="2400">
+                <a:solidFill>
+                  <a:srgbClr val="FF0000"/>
+                </a:solidFill>
+              </a:rPr>
+              <a:t>student</a:t>
+            </a:r>
+            <a:r>
+              <a:rPr lang="en-US" altLang="zh-TW" sz="2400"/>
+              <a:t>(</a:t>
+            </a:r>
+            <a:r>
+              <a:rPr lang="en-US" altLang="zh-TW" sz="2400">
+                <a:solidFill>
+                  <a:srgbClr val="FF0000"/>
+                </a:solidFill>
+              </a:rPr>
+              <a:t>name</a:t>
+            </a:r>
+            <a:r>
+              <a:rPr lang="en-US" altLang="zh-TW" sz="2400"/>
+              <a:t>: str, </a:t>
+            </a:r>
+            <a:r>
+              <a:rPr lang="en-US" altLang="zh-TW" sz="2400">
+                <a:solidFill>
+                  <a:srgbClr val="FF0000"/>
+                </a:solidFill>
+              </a:rPr>
+              <a:t>id_num</a:t>
+            </a:r>
+            <a:r>
+              <a:rPr lang="en-US" altLang="zh-TW" sz="2400"/>
+              <a:t>: int, </a:t>
+            </a:r>
+            <a:r>
+              <a:rPr lang="en-US" altLang="zh-TW" sz="2400">
+                <a:solidFill>
+                  <a:srgbClr val="FF0000"/>
+                </a:solidFill>
+              </a:rPr>
+              <a:t>email</a:t>
+            </a:r>
+            <a:r>
+              <a:rPr lang="en-US" altLang="zh-TW" sz="2400"/>
+              <a:t>: str) -&gt; dict:</a:t>
+            </a:r>
+          </a:p>
+          <a:p>
+            <a:pPr marL="0" indent="0">
+              <a:buNone/>
+            </a:pPr>
+            <a:r>
+              <a:rPr lang="en-US" altLang="zh-TW" sz="2400"/>
+              <a:t>    </a:t>
+            </a:r>
+            <a:r>
+              <a:rPr lang="en-US" altLang="zh-TW" sz="2400">
+                <a:solidFill>
+                  <a:srgbClr val="FF0000"/>
+                </a:solidFill>
+              </a:rPr>
+              <a:t>return</a:t>
+            </a:r>
+            <a:r>
+              <a:rPr lang="en-US" altLang="zh-TW" sz="2400"/>
+              <a:t> {"name": name, "id": id_num, "email": email}</a:t>
+            </a:r>
+          </a:p>
+          <a:p>
+            <a:pPr marL="0" indent="0">
+              <a:buNone/>
+            </a:pPr>
+            <a:endParaRPr lang="en-US" altLang="zh-TW" sz="2400"/>
+          </a:p>
+          <a:p>
+            <a:pPr marL="0" indent="0">
+              <a:buNone/>
+            </a:pPr>
+            <a:r>
+              <a:rPr lang="en-US" altLang="zh-TW" sz="2400"/>
+              <a:t>print(student("</a:t>
+            </a:r>
+            <a:r>
+              <a:rPr lang="zh-TW" altLang="en-US" sz="2400"/>
+              <a:t>百寬</a:t>
+            </a:r>
+            <a:r>
+              <a:rPr lang="en-US" altLang="zh-TW" sz="2400"/>
+              <a:t>", 109502487, "quan@gmail.com"))</a:t>
+            </a:r>
+          </a:p>
+          <a:p>
+            <a:pPr marL="0" indent="0">
+              <a:buNone/>
+            </a:pPr>
+            <a:r>
+              <a:rPr lang="en-US" altLang="zh-TW" sz="2400"/>
+              <a:t>print(student(</a:t>
+            </a:r>
+          </a:p>
+          <a:p>
+            <a:pPr marL="0" indent="0">
+              <a:buNone/>
+            </a:pPr>
+            <a:r>
+              <a:rPr lang="en-US" altLang="zh-TW" sz="2400"/>
+              <a:t>	"</a:t>
+            </a:r>
+            <a:r>
+              <a:rPr lang="zh-TW" altLang="en-US" sz="2400"/>
+              <a:t>百寬</a:t>
+            </a:r>
+            <a:r>
+              <a:rPr lang="en-US" altLang="zh-TW" sz="2400"/>
+              <a:t>", </a:t>
+            </a:r>
+            <a:r>
+              <a:rPr lang="en-US" altLang="zh-TW" sz="2400">
+                <a:solidFill>
+                  <a:srgbClr val="FF0000"/>
+                </a:solidFill>
+              </a:rPr>
+              <a:t>email= </a:t>
+            </a:r>
+            <a:r>
+              <a:rPr lang="en-US" altLang="zh-TW" sz="2400"/>
+              <a:t>"quan@gmail.com", </a:t>
+            </a:r>
+            <a:r>
+              <a:rPr lang="en-US" altLang="zh-TW" sz="2400">
+                <a:solidFill>
+                  <a:srgbClr val="FF0000"/>
+                </a:solidFill>
+              </a:rPr>
+              <a:t>id_num= </a:t>
+            </a:r>
+            <a:r>
+              <a:rPr lang="en-US" altLang="zh-TW" sz="2400"/>
+              <a:t>109502487))</a:t>
+            </a:r>
+          </a:p>
+        </p:txBody>
+      </p:sp>
+    </p:spTree>
+    <p:extLst>
+      <p:ext uri="{BB962C8B-B14F-4D97-AF65-F5344CB8AC3E}">
+        <p14:creationId xmlns:p14="http://schemas.microsoft.com/office/powerpoint/2010/main" val="98789795"/>
+      </p:ext>
+    </p:extLst>
+  </p:cSld>
+  <p:clrMapOvr>
+    <a:masterClrMapping/>
+  </p:clrMapOvr>
+</p:sld>
+</file>
+
+<file path=ppt/slides/slide9.xml><?xml version="1.0" encoding="utf-8"?>
+<p:sld xmlns:a="http://schemas.openxmlformats.org/drawingml/2006/main" xmlns:r="http://schemas.openxmlformats.org/officeDocument/2006/relationships" xmlns:p="http://schemas.openxmlformats.org/presentationml/2006/main">
+  <p:cSld>
+    <p:spTree>
+      <p:nvGrpSpPr>
+        <p:cNvPr id="1" name=""/>
+        <p:cNvGrpSpPr/>
+        <p:nvPr/>
+      </p:nvGrpSpPr>
+      <p:grpSpPr>
+        <a:xfrm>
+          <a:off x="0" y="0"/>
+          <a:ext cx="0" cy="0"/>
+          <a:chOff x="0" y="0"/>
+          <a:chExt cx="0" cy="0"/>
+        </a:xfrm>
+      </p:grpSpPr>
+      <p:sp>
+        <p:nvSpPr>
+          <p:cNvPr id="2" name="標題 1">
+            <a:extLst>
+              <a:ext uri="{FF2B5EF4-FFF2-40B4-BE49-F238E27FC236}">
+                <a16:creationId xmlns:a16="http://schemas.microsoft.com/office/drawing/2014/main" id="{80351266-9A65-48E1-8D96-03067AD2678F}"/>
+              </a:ext>
+            </a:extLst>
+          </p:cNvPr>
+          <p:cNvSpPr>
+            <a:spLocks noGrp="1"/>
+          </p:cNvSpPr>
+          <p:nvPr>
+            <p:ph type="title"/>
+          </p:nvPr>
+        </p:nvSpPr>
+        <p:spPr/>
+        <p:txBody>
+          <a:bodyPr/>
+          <a:lstStyle/>
+          <a:p>
+            <a:r>
+              <a:rPr lang="zh-TW" altLang="en-US"/>
+              <a:t>什麼情況下會使用函數</a:t>
+            </a:r>
+          </a:p>
+        </p:txBody>
+      </p:sp>
+      <p:sp>
+        <p:nvSpPr>
+          <p:cNvPr id="3" name="內容版面配置區 2">
+            <a:extLst>
+              <a:ext uri="{FF2B5EF4-FFF2-40B4-BE49-F238E27FC236}">
+                <a16:creationId xmlns:a16="http://schemas.microsoft.com/office/drawing/2014/main" id="{54CB6B7B-1C30-4006-93A4-C52798CB8A70}"/>
+              </a:ext>
+            </a:extLst>
+          </p:cNvPr>
+          <p:cNvSpPr>
+            <a:spLocks noGrp="1"/>
+          </p:cNvSpPr>
+          <p:nvPr>
+            <p:ph idx="1"/>
+          </p:nvPr>
+        </p:nvSpPr>
+        <p:spPr/>
+        <p:txBody>
+          <a:bodyPr>
+            <a:normAutofit/>
+          </a:bodyPr>
+          <a:lstStyle/>
+          <a:p>
+            <a:endParaRPr lang="en-US" altLang="zh-TW" sz="2800"/>
+          </a:p>
+          <a:p>
+            <a:r>
+              <a:rPr lang="zh-TW" altLang="en-US" sz="2800"/>
+              <a:t>使程式碼整潔、易讀、易維護</a:t>
+            </a:r>
+            <a:endParaRPr lang="en-US" altLang="zh-TW" sz="2800"/>
+          </a:p>
+          <a:p>
+            <a:r>
+              <a:rPr lang="zh-TW" altLang="en-US" sz="2800"/>
+              <a:t>不實作重複的程式</a:t>
+            </a:r>
+            <a:endParaRPr lang="en-US" altLang="zh-TW" sz="2800"/>
+          </a:p>
+        </p:txBody>
+      </p:sp>
+    </p:spTree>
+    <p:extLst>
+      <p:ext uri="{BB962C8B-B14F-4D97-AF65-F5344CB8AC3E}">
+        <p14:creationId xmlns:p14="http://schemas.microsoft.com/office/powerpoint/2010/main" val="213826684"/>
+      </p:ext>
+    </p:extLst>
+  </p:cSld>
+  <p:clrMapOvr>
+    <a:masterClrMapping/>
+  </p:clrMapOvr>
+</p:sld>
+</file>
+
 <file path=ppt/theme/theme1.xml><?xml version="1.0" encoding="utf-8"?>
 <a:theme xmlns:a="http://schemas.openxmlformats.org/drawingml/2006/main" name="視圖">
   <a:themeElements>

</xml_diff>

<commit_message>
modified:   "Class 4 \345\255\227\344\270\262\343\200\201\344\270\262\345\210\227\343\200\201\350\277\255\344\273\243.pptx" 	modified:   "Class 6 \345\207\275\346\225\270\343\200\201\351\201\236\350\277\264.pptx"
</commit_message>
<xml_diff>
--- a/Class 6 函數、遞迴.pptx
+++ b/Class 6 函數、遞迴.pptx
@@ -23,31 +23,39 @@
     <p:sldId id="288" r:id="rId17"/>
     <p:sldId id="290" r:id="rId18"/>
     <p:sldId id="291" r:id="rId19"/>
+    <p:sldId id="292" r:id="rId20"/>
+    <p:sldId id="293" r:id="rId21"/>
+    <p:sldId id="294" r:id="rId22"/>
+    <p:sldId id="295" r:id="rId23"/>
+    <p:sldId id="297" r:id="rId24"/>
+    <p:sldId id="298" r:id="rId25"/>
+    <p:sldId id="299" r:id="rId26"/>
+    <p:sldId id="300" r:id="rId27"/>
   </p:sldIdLst>
   <p:sldSz cx="12192000" cy="6858000"/>
   <p:notesSz cx="6858000" cy="9144000"/>
   <p:embeddedFontLst>
     <p:embeddedFont>
       <p:font typeface="Calibri" panose="020F0502020204030204" pitchFamily="34" charset="0"/>
-      <p:regular r:id="rId20"/>
-      <p:bold r:id="rId21"/>
-      <p:italic r:id="rId22"/>
-      <p:boldItalic r:id="rId23"/>
+      <p:regular r:id="rId28"/>
+      <p:bold r:id="rId29"/>
+      <p:italic r:id="rId30"/>
+      <p:boldItalic r:id="rId31"/>
     </p:embeddedFont>
     <p:embeddedFont>
       <p:font typeface="Consolas" panose="020B0609020204030204" pitchFamily="49" charset="0"/>
-      <p:regular r:id="rId24"/>
-      <p:bold r:id="rId25"/>
-      <p:italic r:id="rId26"/>
-      <p:boldItalic r:id="rId27"/>
+      <p:regular r:id="rId32"/>
+      <p:bold r:id="rId33"/>
+      <p:italic r:id="rId34"/>
+      <p:boldItalic r:id="rId35"/>
     </p:embeddedFont>
     <p:embeddedFont>
       <p:font typeface="Wingdings 2" panose="05020102010507070707" pitchFamily="18" charset="2"/>
-      <p:regular r:id="rId28"/>
+      <p:regular r:id="rId36"/>
     </p:embeddedFont>
     <p:embeddedFont>
       <p:font typeface="源流明體 SB" panose="02020600000000000000" pitchFamily="18" charset="-120"/>
-      <p:bold r:id="rId29"/>
+      <p:bold r:id="rId37"/>
     </p:embeddedFont>
   </p:embeddedFontLst>
   <p:defaultTextStyle>
@@ -6196,7 +6204,7 @@
           <p:cNvPr id="2" name="標題 1">
             <a:extLst>
               <a:ext uri="{FF2B5EF4-FFF2-40B4-BE49-F238E27FC236}">
-                <a16:creationId xmlns:a16="http://schemas.microsoft.com/office/drawing/2014/main" id="{D170B1AE-B119-47B7-A1F9-818FE42DB75A}"/>
+                <a16:creationId xmlns:a16="http://schemas.microsoft.com/office/drawing/2014/main" id="{63044166-F6E2-4B15-8FD2-93A824A79179}"/>
               </a:ext>
             </a:extLst>
           </p:cNvPr>
@@ -6213,8 +6221,12 @@
           <a:lstStyle/>
           <a:p>
             <a:r>
+              <a:rPr lang="en-US" altLang="zh-TW"/>
+              <a:t>lambda </a:t>
+            </a:r>
+            <a:r>
               <a:rPr lang="zh-TW" altLang="en-US"/>
-              <a:t>淺拷貝</a:t>
+              <a:t>函數</a:t>
             </a:r>
           </a:p>
         </p:txBody>
@@ -6224,7 +6236,7 @@
           <p:cNvPr id="3" name="內容版面配置區 2">
             <a:extLst>
               <a:ext uri="{FF2B5EF4-FFF2-40B4-BE49-F238E27FC236}">
-                <a16:creationId xmlns:a16="http://schemas.microsoft.com/office/drawing/2014/main" id="{D9646E35-219F-4BDA-9348-62866F8234E0}"/>
+                <a16:creationId xmlns:a16="http://schemas.microsoft.com/office/drawing/2014/main" id="{B93EB926-B590-4B3D-A1FD-89ADF3BAC63C}"/>
               </a:ext>
             </a:extLst>
           </p:cNvPr>
@@ -6237,17 +6249,424 @@
         </p:nvSpPr>
         <p:spPr/>
         <p:txBody>
-          <a:bodyPr/>
-          <a:lstStyle/>
-          <a:p>
-            <a:endParaRPr lang="zh-TW" altLang="en-US"/>
+          <a:bodyPr>
+            <a:normAutofit/>
+          </a:bodyPr>
+          <a:lstStyle/>
+          <a:p>
+            <a:pPr marL="0" indent="0">
+              <a:buNone/>
+            </a:pPr>
+            <a:r>
+              <a:rPr lang="en-US" altLang="zh-TW" sz="2400"/>
+              <a:t>def foo(</a:t>
+            </a:r>
+            <a:r>
+              <a:rPr lang="en-US" altLang="zh-TW" sz="2400">
+                <a:solidFill>
+                  <a:srgbClr val="FF0000"/>
+                </a:solidFill>
+              </a:rPr>
+              <a:t>x</a:t>
+            </a:r>
+            <a:r>
+              <a:rPr lang="en-US" altLang="zh-TW" sz="2400"/>
+              <a:t>):</a:t>
+            </a:r>
+          </a:p>
+          <a:p>
+            <a:pPr marL="0" indent="0">
+              <a:buNone/>
+            </a:pPr>
+            <a:r>
+              <a:rPr lang="en-US" altLang="zh-TW" sz="2400"/>
+              <a:t>	return </a:t>
+            </a:r>
+            <a:r>
+              <a:rPr lang="en-US" altLang="zh-TW" sz="2400">
+                <a:solidFill>
+                  <a:srgbClr val="0070C0"/>
+                </a:solidFill>
+              </a:rPr>
+              <a:t>x ** 2</a:t>
+            </a:r>
+          </a:p>
+          <a:p>
+            <a:pPr marL="0" indent="0">
+              <a:buNone/>
+            </a:pPr>
+            <a:r>
+              <a:rPr lang="en-US" altLang="zh-TW" sz="2400"/>
+              <a:t>print(foo(3)) </a:t>
+            </a:r>
+            <a:r>
+              <a:rPr lang="zh-TW" altLang="en-US" sz="2400"/>
+              <a:t>→ </a:t>
+            </a:r>
+            <a:r>
+              <a:rPr lang="en-US" altLang="zh-TW" sz="2400"/>
+              <a:t>9</a:t>
+            </a:r>
+          </a:p>
+          <a:p>
+            <a:pPr marL="0" indent="0">
+              <a:buNone/>
+            </a:pPr>
+            <a:endParaRPr lang="en-US" altLang="zh-TW" sz="2400"/>
+          </a:p>
+          <a:p>
+            <a:pPr marL="0" indent="0">
+              <a:buNone/>
+            </a:pPr>
+            <a:r>
+              <a:rPr lang="en-US" altLang="zh-TW" sz="2400"/>
+              <a:t>lam = lambda </a:t>
+            </a:r>
+            <a:r>
+              <a:rPr lang="en-US" altLang="zh-TW" sz="2400">
+                <a:solidFill>
+                  <a:srgbClr val="FF0000"/>
+                </a:solidFill>
+              </a:rPr>
+              <a:t>x</a:t>
+            </a:r>
+            <a:r>
+              <a:rPr lang="en-US" altLang="zh-TW" sz="2400"/>
+              <a:t>: </a:t>
+            </a:r>
+            <a:r>
+              <a:rPr lang="en-US" altLang="zh-TW" sz="2400">
+                <a:solidFill>
+                  <a:srgbClr val="0070C0"/>
+                </a:solidFill>
+              </a:rPr>
+              <a:t>x ** 2</a:t>
+            </a:r>
+          </a:p>
+          <a:p>
+            <a:pPr marL="0" indent="0">
+              <a:buNone/>
+            </a:pPr>
+            <a:r>
+              <a:rPr lang="en-US" altLang="zh-TW" sz="2400"/>
+              <a:t>print(lam(3)) </a:t>
+            </a:r>
+            <a:r>
+              <a:rPr lang="zh-TW" altLang="en-US" sz="2400"/>
+              <a:t>→ </a:t>
+            </a:r>
+            <a:r>
+              <a:rPr lang="en-US" altLang="zh-TW" sz="2400"/>
+              <a:t>9</a:t>
+            </a:r>
+          </a:p>
+          <a:p>
+            <a:pPr marL="0" indent="0">
+              <a:buNone/>
+            </a:pPr>
+            <a:endParaRPr lang="en-US" altLang="zh-TW" sz="2400"/>
+          </a:p>
+          <a:p>
+            <a:pPr marL="0" indent="0">
+              <a:buNone/>
+            </a:pPr>
+            <a:r>
+              <a:rPr lang="en-US" altLang="zh-TW" sz="2400"/>
+              <a:t>print((lambda </a:t>
+            </a:r>
+            <a:r>
+              <a:rPr lang="en-US" altLang="zh-TW" sz="2400">
+                <a:solidFill>
+                  <a:srgbClr val="FF0000"/>
+                </a:solidFill>
+              </a:rPr>
+              <a:t>x</a:t>
+            </a:r>
+            <a:r>
+              <a:rPr lang="en-US" altLang="zh-TW" sz="2400"/>
+              <a:t>: </a:t>
+            </a:r>
+            <a:r>
+              <a:rPr lang="en-US" altLang="zh-TW" sz="2400">
+                <a:solidFill>
+                  <a:srgbClr val="0070C0"/>
+                </a:solidFill>
+              </a:rPr>
+              <a:t>x ** 2</a:t>
+            </a:r>
+            <a:r>
+              <a:rPr lang="en-US" altLang="zh-TW" sz="2400"/>
+              <a:t>)(3)) </a:t>
+            </a:r>
+            <a:r>
+              <a:rPr lang="zh-TW" altLang="en-US" sz="2400"/>
+              <a:t>→ </a:t>
+            </a:r>
+            <a:r>
+              <a:rPr lang="en-US" altLang="zh-TW" sz="2400"/>
+              <a:t>9</a:t>
+            </a:r>
+            <a:endParaRPr lang="zh-TW" altLang="en-US" sz="2400"/>
           </a:p>
         </p:txBody>
       </p:sp>
     </p:spTree>
     <p:extLst>
       <p:ext uri="{BB962C8B-B14F-4D97-AF65-F5344CB8AC3E}">
-        <p14:creationId xmlns:p14="http://schemas.microsoft.com/office/powerpoint/2010/main" val="116632808"/>
+        <p14:creationId xmlns:p14="http://schemas.microsoft.com/office/powerpoint/2010/main" val="961270594"/>
+      </p:ext>
+    </p:extLst>
+  </p:cSld>
+  <p:clrMapOvr>
+    <a:masterClrMapping/>
+  </p:clrMapOvr>
+</p:sld>
+</file>
+
+<file path=ppt/slides/slide19.xml><?xml version="1.0" encoding="utf-8"?>
+<p:sld xmlns:a="http://schemas.openxmlformats.org/drawingml/2006/main" xmlns:r="http://schemas.openxmlformats.org/officeDocument/2006/relationships" xmlns:p="http://schemas.openxmlformats.org/presentationml/2006/main">
+  <p:cSld>
+    <p:spTree>
+      <p:nvGrpSpPr>
+        <p:cNvPr id="1" name=""/>
+        <p:cNvGrpSpPr/>
+        <p:nvPr/>
+      </p:nvGrpSpPr>
+      <p:grpSpPr>
+        <a:xfrm>
+          <a:off x="0" y="0"/>
+          <a:ext cx="0" cy="0"/>
+          <a:chOff x="0" y="0"/>
+          <a:chExt cx="0" cy="0"/>
+        </a:xfrm>
+      </p:grpSpPr>
+      <p:sp>
+        <p:nvSpPr>
+          <p:cNvPr id="2" name="標題 1">
+            <a:extLst>
+              <a:ext uri="{FF2B5EF4-FFF2-40B4-BE49-F238E27FC236}">
+                <a16:creationId xmlns:a16="http://schemas.microsoft.com/office/drawing/2014/main" id="{330BA418-EDE8-4B04-8796-28735EAC200D}"/>
+              </a:ext>
+            </a:extLst>
+          </p:cNvPr>
+          <p:cNvSpPr>
+            <a:spLocks noGrp="1"/>
+          </p:cNvSpPr>
+          <p:nvPr>
+            <p:ph type="title"/>
+          </p:nvPr>
+        </p:nvSpPr>
+        <p:spPr/>
+        <p:txBody>
+          <a:bodyPr/>
+          <a:lstStyle/>
+          <a:p>
+            <a:r>
+              <a:rPr lang="en-US" altLang="zh-TW"/>
+              <a:t>sort </a:t>
+            </a:r>
+            <a:r>
+              <a:rPr lang="zh-TW" altLang="en-US"/>
+              <a:t>與 </a:t>
+            </a:r>
+            <a:r>
+              <a:rPr lang="en-US" altLang="zh-TW"/>
+              <a:t>lambda</a:t>
+            </a:r>
+            <a:endParaRPr lang="zh-TW" altLang="en-US"/>
+          </a:p>
+        </p:txBody>
+      </p:sp>
+      <p:sp>
+        <p:nvSpPr>
+          <p:cNvPr id="3" name="內容版面配置區 2">
+            <a:extLst>
+              <a:ext uri="{FF2B5EF4-FFF2-40B4-BE49-F238E27FC236}">
+                <a16:creationId xmlns:a16="http://schemas.microsoft.com/office/drawing/2014/main" id="{41E7FE64-E409-4D78-9141-035E40212E70}"/>
+              </a:ext>
+            </a:extLst>
+          </p:cNvPr>
+          <p:cNvSpPr>
+            <a:spLocks noGrp="1"/>
+          </p:cNvSpPr>
+          <p:nvPr>
+            <p:ph idx="1"/>
+          </p:nvPr>
+        </p:nvSpPr>
+        <p:spPr>
+          <a:xfrm>
+            <a:off x="1261871" y="1828800"/>
+            <a:ext cx="9092363" cy="4351337"/>
+          </a:xfrm>
+        </p:spPr>
+        <p:txBody>
+          <a:bodyPr>
+            <a:normAutofit/>
+          </a:bodyPr>
+          <a:lstStyle/>
+          <a:p>
+            <a:pPr marL="0" indent="0">
+              <a:buNone/>
+            </a:pPr>
+            <a:endParaRPr lang="en-US" altLang="zh-TW" sz="2800"/>
+          </a:p>
+          <a:p>
+            <a:pPr marL="0" indent="0">
+              <a:buNone/>
+            </a:pPr>
+            <a:r>
+              <a:rPr lang="en-US" altLang="zh-TW" sz="2800"/>
+              <a:t>lst = [(0, 0), (1, -1), (2, 3)]</a:t>
+            </a:r>
+          </a:p>
+          <a:p>
+            <a:pPr marL="0" indent="0">
+              <a:buNone/>
+            </a:pPr>
+            <a:endParaRPr lang="en-US" altLang="zh-TW" sz="2800"/>
+          </a:p>
+          <a:p>
+            <a:pPr marL="0" indent="0">
+              <a:buNone/>
+            </a:pPr>
+            <a:r>
+              <a:rPr lang="en-US" altLang="zh-TW" sz="2800"/>
+              <a:t>print(sorted(lst))</a:t>
+            </a:r>
+          </a:p>
+          <a:p>
+            <a:pPr marL="0" indent="0">
+              <a:buNone/>
+            </a:pPr>
+            <a:r>
+              <a:rPr lang="zh-TW" altLang="en-US" sz="2800"/>
+              <a:t>→ </a:t>
+            </a:r>
+            <a:r>
+              <a:rPr lang="en-US" altLang="zh-TW" sz="2800"/>
+              <a:t>[(</a:t>
+            </a:r>
+            <a:r>
+              <a:rPr lang="en-US" altLang="zh-TW" sz="2800">
+                <a:solidFill>
+                  <a:srgbClr val="0070C0"/>
+                </a:solidFill>
+              </a:rPr>
+              <a:t>0</a:t>
+            </a:r>
+            <a:r>
+              <a:rPr lang="en-US" altLang="zh-TW" sz="2800"/>
+              <a:t>, 0), (</a:t>
+            </a:r>
+            <a:r>
+              <a:rPr lang="en-US" altLang="zh-TW" sz="2800">
+                <a:solidFill>
+                  <a:srgbClr val="0070C0"/>
+                </a:solidFill>
+              </a:rPr>
+              <a:t>1</a:t>
+            </a:r>
+            <a:r>
+              <a:rPr lang="en-US" altLang="zh-TW" sz="2800"/>
+              <a:t>, -1), (</a:t>
+            </a:r>
+            <a:r>
+              <a:rPr lang="en-US" altLang="zh-TW" sz="2800">
+                <a:solidFill>
+                  <a:srgbClr val="0070C0"/>
+                </a:solidFill>
+              </a:rPr>
+              <a:t>2</a:t>
+            </a:r>
+            <a:r>
+              <a:rPr lang="en-US" altLang="zh-TW" sz="2800"/>
+              <a:t>, 3)]</a:t>
+            </a:r>
+          </a:p>
+          <a:p>
+            <a:pPr marL="0" indent="0">
+              <a:buNone/>
+            </a:pPr>
+            <a:r>
+              <a:rPr lang="en-US" altLang="zh-TW" sz="2800"/>
+              <a:t>print(sorted(lst, </a:t>
+            </a:r>
+            <a:r>
+              <a:rPr lang="en-US" altLang="zh-TW" sz="2800">
+                <a:solidFill>
+                  <a:srgbClr val="0070C0"/>
+                </a:solidFill>
+              </a:rPr>
+              <a:t>key= </a:t>
+            </a:r>
+            <a:r>
+              <a:rPr lang="en-US" altLang="zh-TW" sz="2800">
+                <a:solidFill>
+                  <a:srgbClr val="FF0000"/>
+                </a:solidFill>
+              </a:rPr>
+              <a:t>lambda tup: tup[1]</a:t>
+            </a:r>
+            <a:r>
+              <a:rPr lang="en-US" altLang="zh-TW" sz="2800"/>
+              <a:t>))</a:t>
+            </a:r>
+          </a:p>
+          <a:p>
+            <a:pPr marL="0" indent="0">
+              <a:buNone/>
+            </a:pPr>
+            <a:r>
+              <a:rPr lang="zh-TW" altLang="en-US" sz="2800"/>
+              <a:t>→ </a:t>
+            </a:r>
+            <a:r>
+              <a:rPr lang="en-US" altLang="zh-TW" sz="2800"/>
+              <a:t>[(1, </a:t>
+            </a:r>
+            <a:r>
+              <a:rPr lang="en-US" altLang="zh-TW" sz="2800">
+                <a:solidFill>
+                  <a:srgbClr val="0070C0"/>
+                </a:solidFill>
+              </a:rPr>
+              <a:t>-1</a:t>
+            </a:r>
+            <a:r>
+              <a:rPr lang="en-US" altLang="zh-TW" sz="2800"/>
+              <a:t>), (0, </a:t>
+            </a:r>
+            <a:r>
+              <a:rPr lang="en-US" altLang="zh-TW" sz="2800">
+                <a:solidFill>
+                  <a:srgbClr val="0070C0"/>
+                </a:solidFill>
+              </a:rPr>
+              <a:t>0</a:t>
+            </a:r>
+            <a:r>
+              <a:rPr lang="en-US" altLang="zh-TW" sz="2800"/>
+              <a:t>), (2, </a:t>
+            </a:r>
+            <a:r>
+              <a:rPr lang="en-US" altLang="zh-TW" sz="2800">
+                <a:solidFill>
+                  <a:srgbClr val="0070C0"/>
+                </a:solidFill>
+              </a:rPr>
+              <a:t>3</a:t>
+            </a:r>
+            <a:r>
+              <a:rPr lang="en-US" altLang="zh-TW" sz="2800"/>
+              <a:t>)]</a:t>
+            </a:r>
+          </a:p>
+        </p:txBody>
+      </p:sp>
+    </p:spTree>
+    <p:extLst>
+      <p:ext uri="{BB962C8B-B14F-4D97-AF65-F5344CB8AC3E}">
+        <p14:creationId xmlns:p14="http://schemas.microsoft.com/office/powerpoint/2010/main" val="2592677079"/>
       </p:ext>
     </p:extLst>
   </p:cSld>
@@ -6342,6 +6761,1038 @@
 </p:sld>
 </file>
 
+<file path=ppt/slides/slide20.xml><?xml version="1.0" encoding="utf-8"?>
+<p:sld xmlns:a="http://schemas.openxmlformats.org/drawingml/2006/main" xmlns:r="http://schemas.openxmlformats.org/officeDocument/2006/relationships" xmlns:p="http://schemas.openxmlformats.org/presentationml/2006/main">
+  <p:cSld>
+    <p:spTree>
+      <p:nvGrpSpPr>
+        <p:cNvPr id="1" name=""/>
+        <p:cNvGrpSpPr/>
+        <p:nvPr/>
+      </p:nvGrpSpPr>
+      <p:grpSpPr>
+        <a:xfrm>
+          <a:off x="0" y="0"/>
+          <a:ext cx="0" cy="0"/>
+          <a:chOff x="0" y="0"/>
+          <a:chExt cx="0" cy="0"/>
+        </a:xfrm>
+      </p:grpSpPr>
+      <p:sp>
+        <p:nvSpPr>
+          <p:cNvPr id="2" name="標題 1">
+            <a:extLst>
+              <a:ext uri="{FF2B5EF4-FFF2-40B4-BE49-F238E27FC236}">
+                <a16:creationId xmlns:a16="http://schemas.microsoft.com/office/drawing/2014/main" id="{64ED9F1B-F8F0-46AD-A236-CBB4804D1DD1}"/>
+              </a:ext>
+            </a:extLst>
+          </p:cNvPr>
+          <p:cNvSpPr>
+            <a:spLocks noGrp="1"/>
+          </p:cNvSpPr>
+          <p:nvPr>
+            <p:ph type="title"/>
+          </p:nvPr>
+        </p:nvSpPr>
+        <p:spPr/>
+        <p:txBody>
+          <a:bodyPr/>
+          <a:lstStyle/>
+          <a:p>
+            <a:r>
+              <a:rPr lang="en-US" altLang="zh-TW"/>
+              <a:t>filter </a:t>
+            </a:r>
+            <a:r>
+              <a:rPr lang="zh-TW" altLang="en-US"/>
+              <a:t>與 </a:t>
+            </a:r>
+            <a:r>
+              <a:rPr lang="en-US" altLang="zh-TW"/>
+              <a:t>lambda</a:t>
+            </a:r>
+            <a:endParaRPr lang="zh-TW" altLang="en-US"/>
+          </a:p>
+        </p:txBody>
+      </p:sp>
+      <p:sp>
+        <p:nvSpPr>
+          <p:cNvPr id="3" name="內容版面配置區 2">
+            <a:extLst>
+              <a:ext uri="{FF2B5EF4-FFF2-40B4-BE49-F238E27FC236}">
+                <a16:creationId xmlns:a16="http://schemas.microsoft.com/office/drawing/2014/main" id="{CB19DE5E-FADF-4C0A-9281-FFDB618A9A11}"/>
+              </a:ext>
+            </a:extLst>
+          </p:cNvPr>
+          <p:cNvSpPr>
+            <a:spLocks noGrp="1"/>
+          </p:cNvSpPr>
+          <p:nvPr>
+            <p:ph idx="1"/>
+          </p:nvPr>
+        </p:nvSpPr>
+        <p:spPr>
+          <a:xfrm>
+            <a:off x="1261872" y="1828800"/>
+            <a:ext cx="9782646" cy="4351337"/>
+          </a:xfrm>
+        </p:spPr>
+        <p:txBody>
+          <a:bodyPr>
+            <a:normAutofit/>
+          </a:bodyPr>
+          <a:lstStyle/>
+          <a:p>
+            <a:pPr marL="0" indent="0">
+              <a:buNone/>
+            </a:pPr>
+            <a:endParaRPr lang="en-US" altLang="zh-TW" sz="2800"/>
+          </a:p>
+          <a:p>
+            <a:pPr marL="0" indent="0">
+              <a:buNone/>
+            </a:pPr>
+            <a:r>
+              <a:rPr lang="en-US" altLang="zh-TW" sz="2800"/>
+              <a:t>lst = [</a:t>
+            </a:r>
+            <a:r>
+              <a:rPr lang="en-US" altLang="zh-TW" sz="2800">
+                <a:solidFill>
+                  <a:srgbClr val="0070C0"/>
+                </a:solidFill>
+              </a:rPr>
+              <a:t>0</a:t>
+            </a:r>
+            <a:r>
+              <a:rPr lang="en-US" altLang="zh-TW" sz="2800"/>
+              <a:t>, </a:t>
+            </a:r>
+            <a:r>
+              <a:rPr lang="en-US" altLang="zh-TW" sz="2800">
+                <a:solidFill>
+                  <a:srgbClr val="0070C0"/>
+                </a:solidFill>
+              </a:rPr>
+              <a:t>1</a:t>
+            </a:r>
+            <a:r>
+              <a:rPr lang="en-US" altLang="zh-TW" sz="2800"/>
+              <a:t>, "abc", 2.5, True, </a:t>
+            </a:r>
+            <a:r>
+              <a:rPr lang="en-US" altLang="zh-TW" sz="2800">
+                <a:solidFill>
+                  <a:srgbClr val="0070C0"/>
+                </a:solidFill>
+              </a:rPr>
+              <a:t>-4</a:t>
+            </a:r>
+            <a:r>
+              <a:rPr lang="en-US" altLang="zh-TW" sz="2800"/>
+              <a:t>]</a:t>
+            </a:r>
+          </a:p>
+          <a:p>
+            <a:pPr marL="0" indent="0">
+              <a:buNone/>
+            </a:pPr>
+            <a:endParaRPr lang="en-US" altLang="zh-TW" sz="2800"/>
+          </a:p>
+          <a:p>
+            <a:pPr marL="0" indent="0">
+              <a:buNone/>
+            </a:pPr>
+            <a:r>
+              <a:rPr lang="en-US" altLang="zh-TW" sz="2800"/>
+              <a:t>print(list(filter(</a:t>
+            </a:r>
+          </a:p>
+          <a:p>
+            <a:pPr marL="0" indent="0">
+              <a:buNone/>
+            </a:pPr>
+            <a:r>
+              <a:rPr lang="en-US" altLang="zh-TW" sz="2800"/>
+              <a:t>	</a:t>
+            </a:r>
+            <a:r>
+              <a:rPr lang="en-US" altLang="zh-TW" sz="2800">
+                <a:solidFill>
+                  <a:srgbClr val="FF0000"/>
+                </a:solidFill>
+              </a:rPr>
+              <a:t>lambda elm: type(elm) == int</a:t>
+            </a:r>
+            <a:r>
+              <a:rPr lang="en-US" altLang="zh-TW" sz="2800"/>
+              <a:t>, lst)))</a:t>
+            </a:r>
+          </a:p>
+          <a:p>
+            <a:pPr marL="0" indent="0">
+              <a:buNone/>
+            </a:pPr>
+            <a:r>
+              <a:rPr lang="zh-TW" altLang="en-US" sz="2800"/>
+              <a:t>→ </a:t>
+            </a:r>
+            <a:r>
+              <a:rPr lang="en-US" altLang="zh-TW" sz="2800"/>
+              <a:t>[0, 1, -4]</a:t>
+            </a:r>
+            <a:endParaRPr lang="zh-TW" altLang="en-US" sz="2800"/>
+          </a:p>
+        </p:txBody>
+      </p:sp>
+    </p:spTree>
+    <p:extLst>
+      <p:ext uri="{BB962C8B-B14F-4D97-AF65-F5344CB8AC3E}">
+        <p14:creationId xmlns:p14="http://schemas.microsoft.com/office/powerpoint/2010/main" val="2056080965"/>
+      </p:ext>
+    </p:extLst>
+  </p:cSld>
+  <p:clrMapOvr>
+    <a:masterClrMapping/>
+  </p:clrMapOvr>
+</p:sld>
+</file>
+
+<file path=ppt/slides/slide21.xml><?xml version="1.0" encoding="utf-8"?>
+<p:sld xmlns:a="http://schemas.openxmlformats.org/drawingml/2006/main" xmlns:r="http://schemas.openxmlformats.org/officeDocument/2006/relationships" xmlns:p="http://schemas.openxmlformats.org/presentationml/2006/main">
+  <p:cSld>
+    <p:spTree>
+      <p:nvGrpSpPr>
+        <p:cNvPr id="1" name=""/>
+        <p:cNvGrpSpPr/>
+        <p:nvPr/>
+      </p:nvGrpSpPr>
+      <p:grpSpPr>
+        <a:xfrm>
+          <a:off x="0" y="0"/>
+          <a:ext cx="0" cy="0"/>
+          <a:chOff x="0" y="0"/>
+          <a:chExt cx="0" cy="0"/>
+        </a:xfrm>
+      </p:grpSpPr>
+      <p:sp>
+        <p:nvSpPr>
+          <p:cNvPr id="2" name="標題 1">
+            <a:extLst>
+              <a:ext uri="{FF2B5EF4-FFF2-40B4-BE49-F238E27FC236}">
+                <a16:creationId xmlns:a16="http://schemas.microsoft.com/office/drawing/2014/main" id="{C7C71444-0932-4233-8959-9EEA85F1FB17}"/>
+              </a:ext>
+            </a:extLst>
+          </p:cNvPr>
+          <p:cNvSpPr>
+            <a:spLocks noGrp="1"/>
+          </p:cNvSpPr>
+          <p:nvPr>
+            <p:ph type="title"/>
+          </p:nvPr>
+        </p:nvSpPr>
+        <p:spPr/>
+        <p:txBody>
+          <a:bodyPr/>
+          <a:lstStyle/>
+          <a:p>
+            <a:r>
+              <a:rPr lang="en-US" altLang="zh-TW"/>
+              <a:t>map </a:t>
+            </a:r>
+            <a:r>
+              <a:rPr lang="zh-TW" altLang="en-US"/>
+              <a:t>與 </a:t>
+            </a:r>
+            <a:r>
+              <a:rPr lang="en-US" altLang="zh-TW"/>
+              <a:t>lambda</a:t>
+            </a:r>
+            <a:endParaRPr lang="zh-TW" altLang="en-US"/>
+          </a:p>
+        </p:txBody>
+      </p:sp>
+      <p:sp>
+        <p:nvSpPr>
+          <p:cNvPr id="3" name="內容版面配置區 2">
+            <a:extLst>
+              <a:ext uri="{FF2B5EF4-FFF2-40B4-BE49-F238E27FC236}">
+                <a16:creationId xmlns:a16="http://schemas.microsoft.com/office/drawing/2014/main" id="{094AE04C-92A6-453F-8131-EE9E4EB9B3C3}"/>
+              </a:ext>
+            </a:extLst>
+          </p:cNvPr>
+          <p:cNvSpPr>
+            <a:spLocks noGrp="1"/>
+          </p:cNvSpPr>
+          <p:nvPr>
+            <p:ph idx="1"/>
+          </p:nvPr>
+        </p:nvSpPr>
+        <p:spPr/>
+        <p:txBody>
+          <a:bodyPr>
+            <a:normAutofit/>
+          </a:bodyPr>
+          <a:lstStyle/>
+          <a:p>
+            <a:pPr marL="0" indent="0">
+              <a:buNone/>
+            </a:pPr>
+            <a:endParaRPr lang="en-US" altLang="zh-TW" sz="2800"/>
+          </a:p>
+          <a:p>
+            <a:pPr marL="0" indent="0">
+              <a:buNone/>
+            </a:pPr>
+            <a:r>
+              <a:rPr lang="en-US" altLang="zh-TW" sz="2800"/>
+              <a:t>lst = ["abc</a:t>
+            </a:r>
+            <a:r>
+              <a:rPr lang="en-US" altLang="zh-TW" sz="2800">
+                <a:solidFill>
+                  <a:srgbClr val="0070C0"/>
+                </a:solidFill>
+              </a:rPr>
+              <a:t>\n</a:t>
+            </a:r>
+            <a:r>
+              <a:rPr lang="en-US" altLang="zh-TW" sz="2800"/>
+              <a:t>", "defg</a:t>
+            </a:r>
+            <a:r>
+              <a:rPr lang="en-US" altLang="zh-TW" sz="2800">
+                <a:solidFill>
+                  <a:srgbClr val="0070C0"/>
+                </a:solidFill>
+              </a:rPr>
+              <a:t>\n</a:t>
+            </a:r>
+            <a:r>
+              <a:rPr lang="en-US" altLang="zh-TW" sz="2800"/>
+              <a:t>", "ijk"]</a:t>
+            </a:r>
+          </a:p>
+          <a:p>
+            <a:pPr marL="0" indent="0">
+              <a:buNone/>
+            </a:pPr>
+            <a:endParaRPr lang="en-US" altLang="zh-TW" sz="2800"/>
+          </a:p>
+          <a:p>
+            <a:pPr marL="0" indent="0">
+              <a:buNone/>
+            </a:pPr>
+            <a:r>
+              <a:rPr lang="en-US" altLang="zh-TW" sz="2800"/>
+              <a:t>print(list(map(</a:t>
+            </a:r>
+          </a:p>
+          <a:p>
+            <a:pPr marL="0" indent="0">
+              <a:buNone/>
+            </a:pPr>
+            <a:r>
+              <a:rPr lang="en-US" altLang="zh-TW" sz="2800"/>
+              <a:t>	</a:t>
+            </a:r>
+            <a:r>
+              <a:rPr lang="en-US" altLang="zh-TW" sz="2800">
+                <a:solidFill>
+                  <a:srgbClr val="FF0000"/>
+                </a:solidFill>
+              </a:rPr>
+              <a:t>lambda s: s.strip("\n")</a:t>
+            </a:r>
+            <a:r>
+              <a:rPr lang="en-US" altLang="zh-TW" sz="2800"/>
+              <a:t>, lst)))</a:t>
+            </a:r>
+          </a:p>
+          <a:p>
+            <a:pPr marL="0" indent="0">
+              <a:buNone/>
+            </a:pPr>
+            <a:r>
+              <a:rPr lang="zh-TW" altLang="en-US" sz="2800"/>
+              <a:t>→ </a:t>
+            </a:r>
+            <a:r>
+              <a:rPr lang="en-US" altLang="zh-TW" sz="2800"/>
+              <a:t>['abc', 'defg', 'ijk']</a:t>
+            </a:r>
+            <a:endParaRPr lang="zh-TW" altLang="en-US" sz="2800"/>
+          </a:p>
+        </p:txBody>
+      </p:sp>
+    </p:spTree>
+    <p:extLst>
+      <p:ext uri="{BB962C8B-B14F-4D97-AF65-F5344CB8AC3E}">
+        <p14:creationId xmlns:p14="http://schemas.microsoft.com/office/powerpoint/2010/main" val="4137739968"/>
+      </p:ext>
+    </p:extLst>
+  </p:cSld>
+  <p:clrMapOvr>
+    <a:masterClrMapping/>
+  </p:clrMapOvr>
+</p:sld>
+</file>
+
+<file path=ppt/slides/slide22.xml><?xml version="1.0" encoding="utf-8"?>
+<p:sld xmlns:a="http://schemas.openxmlformats.org/drawingml/2006/main" xmlns:r="http://schemas.openxmlformats.org/officeDocument/2006/relationships" xmlns:p="http://schemas.openxmlformats.org/presentationml/2006/main">
+  <p:cSld>
+    <p:spTree>
+      <p:nvGrpSpPr>
+        <p:cNvPr id="1" name=""/>
+        <p:cNvGrpSpPr/>
+        <p:nvPr/>
+      </p:nvGrpSpPr>
+      <p:grpSpPr>
+        <a:xfrm>
+          <a:off x="0" y="0"/>
+          <a:ext cx="0" cy="0"/>
+          <a:chOff x="0" y="0"/>
+          <a:chExt cx="0" cy="0"/>
+        </a:xfrm>
+      </p:grpSpPr>
+      <p:sp>
+        <p:nvSpPr>
+          <p:cNvPr id="2" name="標題 1">
+            <a:extLst>
+              <a:ext uri="{FF2B5EF4-FFF2-40B4-BE49-F238E27FC236}">
+                <a16:creationId xmlns:a16="http://schemas.microsoft.com/office/drawing/2014/main" id="{DC20EA12-AF3D-4763-9CAF-4FB26E462C86}"/>
+              </a:ext>
+            </a:extLst>
+          </p:cNvPr>
+          <p:cNvSpPr>
+            <a:spLocks noGrp="1"/>
+          </p:cNvSpPr>
+          <p:nvPr>
+            <p:ph type="title"/>
+          </p:nvPr>
+        </p:nvSpPr>
+        <p:spPr/>
+        <p:txBody>
+          <a:bodyPr/>
+          <a:lstStyle/>
+          <a:p>
+            <a:r>
+              <a:rPr lang="zh-TW" altLang="en-US"/>
+              <a:t>遞迴</a:t>
+            </a:r>
+          </a:p>
+        </p:txBody>
+      </p:sp>
+      <p:sp>
+        <p:nvSpPr>
+          <p:cNvPr id="3" name="文字版面配置區 2">
+            <a:extLst>
+              <a:ext uri="{FF2B5EF4-FFF2-40B4-BE49-F238E27FC236}">
+                <a16:creationId xmlns:a16="http://schemas.microsoft.com/office/drawing/2014/main" id="{9885BF53-1CF3-4777-9843-F9784E1A9448}"/>
+              </a:ext>
+            </a:extLst>
+          </p:cNvPr>
+          <p:cNvSpPr>
+            <a:spLocks noGrp="1"/>
+          </p:cNvSpPr>
+          <p:nvPr>
+            <p:ph type="body" idx="1"/>
+          </p:nvPr>
+        </p:nvSpPr>
+        <p:spPr/>
+        <p:txBody>
+          <a:bodyPr/>
+          <a:lstStyle/>
+          <a:p>
+            <a:endParaRPr lang="zh-TW" altLang="en-US"/>
+          </a:p>
+        </p:txBody>
+      </p:sp>
+    </p:spTree>
+    <p:extLst>
+      <p:ext uri="{BB962C8B-B14F-4D97-AF65-F5344CB8AC3E}">
+        <p14:creationId xmlns:p14="http://schemas.microsoft.com/office/powerpoint/2010/main" val="1703151788"/>
+      </p:ext>
+    </p:extLst>
+  </p:cSld>
+  <p:clrMapOvr>
+    <a:masterClrMapping/>
+  </p:clrMapOvr>
+</p:sld>
+</file>
+
+<file path=ppt/slides/slide23.xml><?xml version="1.0" encoding="utf-8"?>
+<p:sld xmlns:a="http://schemas.openxmlformats.org/drawingml/2006/main" xmlns:r="http://schemas.openxmlformats.org/officeDocument/2006/relationships" xmlns:p="http://schemas.openxmlformats.org/presentationml/2006/main">
+  <p:cSld>
+    <p:spTree>
+      <p:nvGrpSpPr>
+        <p:cNvPr id="1" name=""/>
+        <p:cNvGrpSpPr/>
+        <p:nvPr/>
+      </p:nvGrpSpPr>
+      <p:grpSpPr>
+        <a:xfrm>
+          <a:off x="0" y="0"/>
+          <a:ext cx="0" cy="0"/>
+          <a:chOff x="0" y="0"/>
+          <a:chExt cx="0" cy="0"/>
+        </a:xfrm>
+      </p:grpSpPr>
+      <p:sp>
+        <p:nvSpPr>
+          <p:cNvPr id="2" name="標題 1">
+            <a:extLst>
+              <a:ext uri="{FF2B5EF4-FFF2-40B4-BE49-F238E27FC236}">
+                <a16:creationId xmlns:a16="http://schemas.microsoft.com/office/drawing/2014/main" id="{947045FD-3AB0-4C0A-82A1-8DB8B710477A}"/>
+              </a:ext>
+            </a:extLst>
+          </p:cNvPr>
+          <p:cNvSpPr>
+            <a:spLocks noGrp="1"/>
+          </p:cNvSpPr>
+          <p:nvPr>
+            <p:ph type="title"/>
+          </p:nvPr>
+        </p:nvSpPr>
+        <p:spPr/>
+        <p:txBody>
+          <a:bodyPr/>
+          <a:lstStyle/>
+          <a:p>
+            <a:r>
+              <a:rPr lang="zh-TW" altLang="en-US"/>
+              <a:t>遞迴</a:t>
+            </a:r>
+          </a:p>
+        </p:txBody>
+      </p:sp>
+      <p:sp>
+        <p:nvSpPr>
+          <p:cNvPr id="3" name="內容版面配置區 2">
+            <a:extLst>
+              <a:ext uri="{FF2B5EF4-FFF2-40B4-BE49-F238E27FC236}">
+                <a16:creationId xmlns:a16="http://schemas.microsoft.com/office/drawing/2014/main" id="{D2DE5F0C-8411-468A-8FA7-C7F9C83932D5}"/>
+              </a:ext>
+            </a:extLst>
+          </p:cNvPr>
+          <p:cNvSpPr>
+            <a:spLocks noGrp="1"/>
+          </p:cNvSpPr>
+          <p:nvPr>
+            <p:ph idx="1"/>
+          </p:nvPr>
+        </p:nvSpPr>
+        <p:spPr/>
+        <p:txBody>
+          <a:bodyPr>
+            <a:normAutofit/>
+          </a:bodyPr>
+          <a:lstStyle/>
+          <a:p>
+            <a:pPr marL="0" indent="0">
+              <a:buNone/>
+            </a:pPr>
+            <a:endParaRPr lang="en-US" altLang="zh-TW" sz="2800"/>
+          </a:p>
+          <a:p>
+            <a:pPr marL="514350" indent="-514350">
+              <a:buAutoNum type="arabicPeriod"/>
+            </a:pPr>
+            <a:r>
+              <a:rPr lang="zh-TW" altLang="en-US" sz="2800"/>
+              <a:t>函數呼叫函數自己</a:t>
+            </a:r>
+            <a:endParaRPr lang="en-US" altLang="zh-TW" sz="2800"/>
+          </a:p>
+          <a:p>
+            <a:pPr marL="514350" indent="-514350">
+              <a:buFont typeface="Arial" pitchFamily="34" charset="0"/>
+              <a:buAutoNum type="arabicPeriod"/>
+            </a:pPr>
+            <a:r>
+              <a:rPr lang="zh-TW" altLang="en-US" sz="2800"/>
+              <a:t>必須設一個條件中斷遞迴</a:t>
+            </a:r>
+            <a:endParaRPr lang="en-US" altLang="zh-TW" sz="2800"/>
+          </a:p>
+        </p:txBody>
+      </p:sp>
+    </p:spTree>
+    <p:extLst>
+      <p:ext uri="{BB962C8B-B14F-4D97-AF65-F5344CB8AC3E}">
+        <p14:creationId xmlns:p14="http://schemas.microsoft.com/office/powerpoint/2010/main" val="3827399143"/>
+      </p:ext>
+    </p:extLst>
+  </p:cSld>
+  <p:clrMapOvr>
+    <a:masterClrMapping/>
+  </p:clrMapOvr>
+</p:sld>
+</file>
+
+<file path=ppt/slides/slide24.xml><?xml version="1.0" encoding="utf-8"?>
+<p:sld xmlns:a="http://schemas.openxmlformats.org/drawingml/2006/main" xmlns:r="http://schemas.openxmlformats.org/officeDocument/2006/relationships" xmlns:p="http://schemas.openxmlformats.org/presentationml/2006/main">
+  <p:cSld>
+    <p:spTree>
+      <p:nvGrpSpPr>
+        <p:cNvPr id="1" name=""/>
+        <p:cNvGrpSpPr/>
+        <p:nvPr/>
+      </p:nvGrpSpPr>
+      <p:grpSpPr>
+        <a:xfrm>
+          <a:off x="0" y="0"/>
+          <a:ext cx="0" cy="0"/>
+          <a:chOff x="0" y="0"/>
+          <a:chExt cx="0" cy="0"/>
+        </a:xfrm>
+      </p:grpSpPr>
+      <p:sp>
+        <p:nvSpPr>
+          <p:cNvPr id="2" name="標題 1">
+            <a:extLst>
+              <a:ext uri="{FF2B5EF4-FFF2-40B4-BE49-F238E27FC236}">
+                <a16:creationId xmlns:a16="http://schemas.microsoft.com/office/drawing/2014/main" id="{DF317238-E64D-40B0-90D1-E49D1E09706B}"/>
+              </a:ext>
+            </a:extLst>
+          </p:cNvPr>
+          <p:cNvSpPr>
+            <a:spLocks noGrp="1"/>
+          </p:cNvSpPr>
+          <p:nvPr>
+            <p:ph type="title"/>
+          </p:nvPr>
+        </p:nvSpPr>
+        <p:spPr/>
+        <p:txBody>
+          <a:bodyPr/>
+          <a:lstStyle/>
+          <a:p>
+            <a:r>
+              <a:rPr lang="zh-TW" altLang="en-US"/>
+              <a:t>費氏數列</a:t>
+            </a:r>
+          </a:p>
+        </p:txBody>
+      </p:sp>
+      <p:sp>
+        <p:nvSpPr>
+          <p:cNvPr id="3" name="內容版面配置區 2">
+            <a:extLst>
+              <a:ext uri="{FF2B5EF4-FFF2-40B4-BE49-F238E27FC236}">
+                <a16:creationId xmlns:a16="http://schemas.microsoft.com/office/drawing/2014/main" id="{0CA05960-7CF6-47CD-9B04-834E3CDD4197}"/>
+              </a:ext>
+            </a:extLst>
+          </p:cNvPr>
+          <p:cNvSpPr>
+            <a:spLocks noGrp="1"/>
+          </p:cNvSpPr>
+          <p:nvPr>
+            <p:ph idx="1"/>
+          </p:nvPr>
+        </p:nvSpPr>
+        <p:spPr/>
+        <p:txBody>
+          <a:bodyPr>
+            <a:normAutofit/>
+          </a:bodyPr>
+          <a:lstStyle/>
+          <a:p>
+            <a:pPr marL="0" indent="0">
+              <a:buNone/>
+            </a:pPr>
+            <a:r>
+              <a:rPr lang="en-US" altLang="zh-TW" sz="2800"/>
+              <a:t>a = b = 1</a:t>
+            </a:r>
+          </a:p>
+          <a:p>
+            <a:pPr marL="0" indent="0">
+              <a:buNone/>
+            </a:pPr>
+            <a:r>
+              <a:rPr lang="en-US" altLang="zh-TW" sz="2800"/>
+              <a:t>while </a:t>
+            </a:r>
+            <a:r>
+              <a:rPr lang="en-US" altLang="zh-TW" sz="2800">
+                <a:solidFill>
+                  <a:srgbClr val="0070C0"/>
+                </a:solidFill>
+              </a:rPr>
+              <a:t>a &lt;= 1E6</a:t>
+            </a:r>
+            <a:r>
+              <a:rPr lang="en-US" altLang="zh-TW" sz="2800"/>
+              <a:t>:</a:t>
+            </a:r>
+          </a:p>
+          <a:p>
+            <a:pPr marL="0" indent="0">
+              <a:buNone/>
+            </a:pPr>
+            <a:r>
+              <a:rPr lang="en-US" altLang="zh-TW" sz="2800"/>
+              <a:t>	print(a)</a:t>
+            </a:r>
+          </a:p>
+          <a:p>
+            <a:pPr marL="0" indent="0">
+              <a:buNone/>
+            </a:pPr>
+            <a:r>
+              <a:rPr lang="en-US" altLang="zh-TW" sz="2800"/>
+              <a:t>	b += a</a:t>
+            </a:r>
+          </a:p>
+          <a:p>
+            <a:pPr marL="0" indent="0">
+              <a:buNone/>
+            </a:pPr>
+            <a:r>
+              <a:rPr lang="en-US" altLang="zh-TW" sz="2800"/>
+              <a:t>	a = b - a</a:t>
+            </a:r>
+          </a:p>
+        </p:txBody>
+      </p:sp>
+    </p:spTree>
+    <p:extLst>
+      <p:ext uri="{BB962C8B-B14F-4D97-AF65-F5344CB8AC3E}">
+        <p14:creationId xmlns:p14="http://schemas.microsoft.com/office/powerpoint/2010/main" val="1619881089"/>
+      </p:ext>
+    </p:extLst>
+  </p:cSld>
+  <p:clrMapOvr>
+    <a:masterClrMapping/>
+  </p:clrMapOvr>
+</p:sld>
+</file>
+
+<file path=ppt/slides/slide25.xml><?xml version="1.0" encoding="utf-8"?>
+<p:sld xmlns:a="http://schemas.openxmlformats.org/drawingml/2006/main" xmlns:r="http://schemas.openxmlformats.org/officeDocument/2006/relationships" xmlns:p="http://schemas.openxmlformats.org/presentationml/2006/main">
+  <p:cSld>
+    <p:spTree>
+      <p:nvGrpSpPr>
+        <p:cNvPr id="1" name=""/>
+        <p:cNvGrpSpPr/>
+        <p:nvPr/>
+      </p:nvGrpSpPr>
+      <p:grpSpPr>
+        <a:xfrm>
+          <a:off x="0" y="0"/>
+          <a:ext cx="0" cy="0"/>
+          <a:chOff x="0" y="0"/>
+          <a:chExt cx="0" cy="0"/>
+        </a:xfrm>
+      </p:grpSpPr>
+      <p:sp>
+        <p:nvSpPr>
+          <p:cNvPr id="2" name="標題 1">
+            <a:extLst>
+              <a:ext uri="{FF2B5EF4-FFF2-40B4-BE49-F238E27FC236}">
+                <a16:creationId xmlns:a16="http://schemas.microsoft.com/office/drawing/2014/main" id="{DF317238-E64D-40B0-90D1-E49D1E09706B}"/>
+              </a:ext>
+            </a:extLst>
+          </p:cNvPr>
+          <p:cNvSpPr>
+            <a:spLocks noGrp="1"/>
+          </p:cNvSpPr>
+          <p:nvPr>
+            <p:ph type="title"/>
+          </p:nvPr>
+        </p:nvSpPr>
+        <p:spPr/>
+        <p:txBody>
+          <a:bodyPr/>
+          <a:lstStyle/>
+          <a:p>
+            <a:r>
+              <a:rPr lang="zh-TW" altLang="en-US"/>
+              <a:t>費氏數列</a:t>
+            </a:r>
+          </a:p>
+        </p:txBody>
+      </p:sp>
+      <p:sp>
+        <p:nvSpPr>
+          <p:cNvPr id="3" name="內容版面配置區 2">
+            <a:extLst>
+              <a:ext uri="{FF2B5EF4-FFF2-40B4-BE49-F238E27FC236}">
+                <a16:creationId xmlns:a16="http://schemas.microsoft.com/office/drawing/2014/main" id="{0CA05960-7CF6-47CD-9B04-834E3CDD4197}"/>
+              </a:ext>
+            </a:extLst>
+          </p:cNvPr>
+          <p:cNvSpPr>
+            <a:spLocks noGrp="1"/>
+          </p:cNvSpPr>
+          <p:nvPr>
+            <p:ph idx="1"/>
+          </p:nvPr>
+        </p:nvSpPr>
+        <p:spPr/>
+        <p:txBody>
+          <a:bodyPr>
+            <a:normAutofit/>
+          </a:bodyPr>
+          <a:lstStyle/>
+          <a:p>
+            <a:pPr marL="0" indent="0">
+              <a:buNone/>
+            </a:pPr>
+            <a:r>
+              <a:rPr lang="en-US" altLang="zh-TW" sz="2800"/>
+              <a:t>def </a:t>
+            </a:r>
+            <a:r>
+              <a:rPr lang="en-US" altLang="zh-TW" sz="2800">
+                <a:solidFill>
+                  <a:srgbClr val="FF0000"/>
+                </a:solidFill>
+              </a:rPr>
+              <a:t>fibonacci</a:t>
+            </a:r>
+            <a:r>
+              <a:rPr lang="en-US" altLang="zh-TW" sz="2800"/>
+              <a:t>(a, b):</a:t>
+            </a:r>
+          </a:p>
+          <a:p>
+            <a:pPr marL="0" indent="0">
+              <a:buNone/>
+            </a:pPr>
+            <a:r>
+              <a:rPr lang="en-US" altLang="zh-TW" sz="2800"/>
+              <a:t>	if</a:t>
+            </a:r>
+            <a:r>
+              <a:rPr lang="zh-TW" altLang="en-US" sz="2800"/>
+              <a:t> </a:t>
+            </a:r>
+            <a:r>
+              <a:rPr lang="en-US" altLang="zh-TW" sz="2800">
+                <a:solidFill>
+                  <a:srgbClr val="0070C0"/>
+                </a:solidFill>
+              </a:rPr>
+              <a:t>a &gt; 1E6</a:t>
+            </a:r>
+            <a:r>
+              <a:rPr lang="en-US" altLang="zh-TW" sz="2800"/>
+              <a:t>:</a:t>
+            </a:r>
+          </a:p>
+          <a:p>
+            <a:pPr marL="0" indent="0">
+              <a:buNone/>
+            </a:pPr>
+            <a:r>
+              <a:rPr lang="en-US" altLang="zh-TW" sz="2800"/>
+              <a:t>		return</a:t>
+            </a:r>
+          </a:p>
+          <a:p>
+            <a:pPr marL="0" indent="0">
+              <a:buNone/>
+            </a:pPr>
+            <a:r>
+              <a:rPr lang="en-US" altLang="zh-TW" sz="2800"/>
+              <a:t>	print(a)</a:t>
+            </a:r>
+          </a:p>
+          <a:p>
+            <a:pPr marL="0" indent="0">
+              <a:buNone/>
+            </a:pPr>
+            <a:r>
+              <a:rPr lang="en-US" altLang="zh-TW" sz="2800"/>
+              <a:t>	</a:t>
+            </a:r>
+            <a:r>
+              <a:rPr lang="en-US" altLang="zh-TW" sz="2800">
+                <a:solidFill>
+                  <a:srgbClr val="FF0000"/>
+                </a:solidFill>
+              </a:rPr>
+              <a:t>fibonacci</a:t>
+            </a:r>
+            <a:r>
+              <a:rPr lang="en-US" altLang="zh-TW" sz="2800"/>
+              <a:t>(b, a + b)</a:t>
+            </a:r>
+          </a:p>
+          <a:p>
+            <a:pPr marL="0" indent="0">
+              <a:buNone/>
+            </a:pPr>
+            <a:endParaRPr lang="en-US" altLang="zh-TW" sz="2800"/>
+          </a:p>
+          <a:p>
+            <a:pPr marL="0" indent="0">
+              <a:buNone/>
+            </a:pPr>
+            <a:r>
+              <a:rPr lang="en-US" altLang="zh-TW" sz="2800">
+                <a:solidFill>
+                  <a:srgbClr val="FF0000"/>
+                </a:solidFill>
+              </a:rPr>
+              <a:t>fibonacci</a:t>
+            </a:r>
+            <a:r>
+              <a:rPr lang="en-US" altLang="zh-TW" sz="2800"/>
+              <a:t>(1, 1)</a:t>
+            </a:r>
+          </a:p>
+        </p:txBody>
+      </p:sp>
+    </p:spTree>
+    <p:extLst>
+      <p:ext uri="{BB962C8B-B14F-4D97-AF65-F5344CB8AC3E}">
+        <p14:creationId xmlns:p14="http://schemas.microsoft.com/office/powerpoint/2010/main" val="174128057"/>
+      </p:ext>
+    </p:extLst>
+  </p:cSld>
+  <p:clrMapOvr>
+    <a:masterClrMapping/>
+  </p:clrMapOvr>
+</p:sld>
+</file>
+
+<file path=ppt/slides/slide26.xml><?xml version="1.0" encoding="utf-8"?>
+<p:sld xmlns:a="http://schemas.openxmlformats.org/drawingml/2006/main" xmlns:r="http://schemas.openxmlformats.org/officeDocument/2006/relationships" xmlns:p="http://schemas.openxmlformats.org/presentationml/2006/main">
+  <p:cSld>
+    <p:spTree>
+      <p:nvGrpSpPr>
+        <p:cNvPr id="1" name=""/>
+        <p:cNvGrpSpPr/>
+        <p:nvPr/>
+      </p:nvGrpSpPr>
+      <p:grpSpPr>
+        <a:xfrm>
+          <a:off x="0" y="0"/>
+          <a:ext cx="0" cy="0"/>
+          <a:chOff x="0" y="0"/>
+          <a:chExt cx="0" cy="0"/>
+        </a:xfrm>
+      </p:grpSpPr>
+      <p:sp>
+        <p:nvSpPr>
+          <p:cNvPr id="2" name="標題 1">
+            <a:extLst>
+              <a:ext uri="{FF2B5EF4-FFF2-40B4-BE49-F238E27FC236}">
+                <a16:creationId xmlns:a16="http://schemas.microsoft.com/office/drawing/2014/main" id="{26FD94C9-57D3-45F4-95CC-D35E13BCBA29}"/>
+              </a:ext>
+            </a:extLst>
+          </p:cNvPr>
+          <p:cNvSpPr>
+            <a:spLocks noGrp="1"/>
+          </p:cNvSpPr>
+          <p:nvPr>
+            <p:ph type="title"/>
+          </p:nvPr>
+        </p:nvSpPr>
+        <p:spPr/>
+        <p:txBody>
+          <a:bodyPr/>
+          <a:lstStyle/>
+          <a:p>
+            <a:r>
+              <a:rPr lang="zh-TW" altLang="en-US"/>
+              <a:t>遞迴 </a:t>
+            </a:r>
+            <a:r>
+              <a:rPr lang="en-US" altLang="zh-TW"/>
+              <a:t>v.s. </a:t>
+            </a:r>
+            <a:r>
+              <a:rPr lang="zh-TW" altLang="en-US"/>
+              <a:t>迴圈</a:t>
+            </a:r>
+          </a:p>
+        </p:txBody>
+      </p:sp>
+      <p:sp>
+        <p:nvSpPr>
+          <p:cNvPr id="3" name="內容版面配置區 2">
+            <a:extLst>
+              <a:ext uri="{FF2B5EF4-FFF2-40B4-BE49-F238E27FC236}">
+                <a16:creationId xmlns:a16="http://schemas.microsoft.com/office/drawing/2014/main" id="{DA9222B5-FD7F-4338-9472-B16276205CDE}"/>
+              </a:ext>
+            </a:extLst>
+          </p:cNvPr>
+          <p:cNvSpPr>
+            <a:spLocks noGrp="1"/>
+          </p:cNvSpPr>
+          <p:nvPr>
+            <p:ph idx="1"/>
+          </p:nvPr>
+        </p:nvSpPr>
+        <p:spPr>
+          <a:xfrm>
+            <a:off x="1261871" y="1828800"/>
+            <a:ext cx="9047541" cy="4351337"/>
+          </a:xfrm>
+        </p:spPr>
+        <p:txBody>
+          <a:bodyPr>
+            <a:normAutofit/>
+          </a:bodyPr>
+          <a:lstStyle/>
+          <a:p>
+            <a:pPr marL="0" indent="0">
+              <a:buNone/>
+            </a:pPr>
+            <a:endParaRPr lang="en-US" altLang="zh-TW" sz="2800"/>
+          </a:p>
+          <a:p>
+            <a:r>
+              <a:rPr lang="zh-TW" altLang="en-US" sz="2800"/>
+              <a:t>效率：因為每次呼叫遞迴函數都需要傳遞資料，理論上遞迴會比迴圈慢一點點</a:t>
+            </a:r>
+            <a:endParaRPr lang="en-US" altLang="zh-TW" sz="2800"/>
+          </a:p>
+          <a:p>
+            <a:r>
+              <a:rPr lang="zh-TW" altLang="en-US" sz="2800"/>
+              <a:t>易讀：遞迴較容易驗證正確性</a:t>
+            </a:r>
+            <a:endParaRPr lang="en-US" altLang="zh-TW" sz="2800"/>
+          </a:p>
+          <a:p>
+            <a:r>
+              <a:rPr lang="zh-TW" altLang="en-US" sz="2800"/>
+              <a:t>使用情境：各有各適合的情況</a:t>
+            </a:r>
+            <a:endParaRPr lang="en-US" altLang="zh-TW" sz="2800"/>
+          </a:p>
+          <a:p>
+            <a:pPr marL="0" indent="0">
+              <a:buNone/>
+            </a:pPr>
+            <a:endParaRPr lang="en-US" altLang="zh-TW" sz="2800"/>
+          </a:p>
+          <a:p>
+            <a:pPr marL="0" indent="0">
+              <a:buNone/>
+            </a:pPr>
+            <a:endParaRPr lang="en-US" altLang="zh-TW" sz="2800"/>
+          </a:p>
+        </p:txBody>
+      </p:sp>
+    </p:spTree>
+    <p:extLst>
+      <p:ext uri="{BB962C8B-B14F-4D97-AF65-F5344CB8AC3E}">
+        <p14:creationId xmlns:p14="http://schemas.microsoft.com/office/powerpoint/2010/main" val="3281171738"/>
+      </p:ext>
+    </p:extLst>
+  </p:cSld>
+  <p:clrMapOvr>
+    <a:masterClrMapping/>
+  </p:clrMapOvr>
+</p:sld>
+</file>
+
 <file path=ppt/slides/slide3.xml><?xml version="1.0" encoding="utf-8"?>
 <p:sld xmlns:a="http://schemas.openxmlformats.org/drawingml/2006/main" xmlns:r="http://schemas.openxmlformats.org/officeDocument/2006/relationships" xmlns:p="http://schemas.openxmlformats.org/presentationml/2006/main">
   <p:cSld>
@@ -6418,10 +7869,11 @@
             <a:endParaRPr lang="en-US" altLang="zh-TW" sz="2800"/>
           </a:p>
           <a:p>
-            <a:pPr>
+            <a:pPr marL="0" indent="0">
               <a:spcAft>
                 <a:spcPts val="0"/>
               </a:spcAft>
+              <a:buNone/>
             </a:pPr>
             <a:r>
               <a:rPr lang="en-US" altLang="zh-TW" sz="2800"/>
@@ -6458,22 +7910,29 @@
             </a:endParaRPr>
           </a:p>
           <a:p>
+            <a:pPr marL="0" indent="0">
+              <a:buNone/>
+            </a:pPr>
             <a:r>
               <a:rPr lang="en-US" altLang="zh-TW" sz="2800"/>
               <a:t>f(x, y) = x + 3y + 2</a:t>
             </a:r>
           </a:p>
           <a:p>
+            <a:pPr marL="0" indent="0">
+              <a:buNone/>
+            </a:pPr>
             <a:r>
               <a:rPr lang="en-US" altLang="zh-TW" sz="2800"/>
               <a:t>f(g(x))</a:t>
             </a:r>
           </a:p>
           <a:p>
-            <a:pPr>
+            <a:pPr marL="0" indent="0">
               <a:spcAft>
                 <a:spcPts val="0"/>
               </a:spcAft>
+              <a:buNone/>
             </a:pPr>
             <a:r>
               <a:rPr lang="en-US" altLang="zh-TW" sz="2800" kern="100">
@@ -7702,6 +9161,9 @@
             <a:endParaRPr lang="en-US" altLang="zh-TW" sz="2800"/>
           </a:p>
           <a:p>
+            <a:pPr marL="514350" indent="-514350">
+              <a:buAutoNum type="arabicPeriod"/>
+            </a:pPr>
             <a:r>
               <a:rPr lang="zh-TW" altLang="en-US" sz="2800"/>
               <a:t>使程式碼整潔、易讀、易維護</a:t>
@@ -7709,6 +9171,9 @@
             <a:endParaRPr lang="en-US" altLang="zh-TW" sz="2800"/>
           </a:p>
           <a:p>
+            <a:pPr marL="514350" indent="-514350">
+              <a:buAutoNum type="arabicPeriod"/>
+            </a:pPr>
             <a:r>
               <a:rPr lang="zh-TW" altLang="en-US" sz="2800"/>
               <a:t>不實作重複的程式</a:t>

</xml_diff>